<commit_message>
Corretto chapter2 post bascetta
</commit_message>
<xml_diff>
--- a/IMMAGINI/powerpointimmagini.pptx
+++ b/IMMAGINI/powerpointimmagini.pptx
@@ -262,7 +262,7 @@
           <a:p>
             <a:fld id="{5BCC69EF-8925-47FB-9BAA-DDFE83E229BC}" type="datetimeFigureOut">
               <a:rPr lang="it-IT" smtClean="0"/>
-              <a:t>11/02/2019</a:t>
+              <a:t>12/02/2019</a:t>
             </a:fld>
             <a:endParaRPr lang="it-IT"/>
           </a:p>
@@ -460,7 +460,7 @@
           <a:p>
             <a:fld id="{5BCC69EF-8925-47FB-9BAA-DDFE83E229BC}" type="datetimeFigureOut">
               <a:rPr lang="it-IT" smtClean="0"/>
-              <a:t>11/02/2019</a:t>
+              <a:t>12/02/2019</a:t>
             </a:fld>
             <a:endParaRPr lang="it-IT"/>
           </a:p>
@@ -668,7 +668,7 @@
           <a:p>
             <a:fld id="{5BCC69EF-8925-47FB-9BAA-DDFE83E229BC}" type="datetimeFigureOut">
               <a:rPr lang="it-IT" smtClean="0"/>
-              <a:t>11/02/2019</a:t>
+              <a:t>12/02/2019</a:t>
             </a:fld>
             <a:endParaRPr lang="it-IT"/>
           </a:p>
@@ -866,7 +866,7 @@
           <a:p>
             <a:fld id="{5BCC69EF-8925-47FB-9BAA-DDFE83E229BC}" type="datetimeFigureOut">
               <a:rPr lang="it-IT" smtClean="0"/>
-              <a:t>11/02/2019</a:t>
+              <a:t>12/02/2019</a:t>
             </a:fld>
             <a:endParaRPr lang="it-IT"/>
           </a:p>
@@ -1141,7 +1141,7 @@
           <a:p>
             <a:fld id="{5BCC69EF-8925-47FB-9BAA-DDFE83E229BC}" type="datetimeFigureOut">
               <a:rPr lang="it-IT" smtClean="0"/>
-              <a:t>11/02/2019</a:t>
+              <a:t>12/02/2019</a:t>
             </a:fld>
             <a:endParaRPr lang="it-IT"/>
           </a:p>
@@ -1406,7 +1406,7 @@
           <a:p>
             <a:fld id="{5BCC69EF-8925-47FB-9BAA-DDFE83E229BC}" type="datetimeFigureOut">
               <a:rPr lang="it-IT" smtClean="0"/>
-              <a:t>11/02/2019</a:t>
+              <a:t>12/02/2019</a:t>
             </a:fld>
             <a:endParaRPr lang="it-IT"/>
           </a:p>
@@ -1818,7 +1818,7 @@
           <a:p>
             <a:fld id="{5BCC69EF-8925-47FB-9BAA-DDFE83E229BC}" type="datetimeFigureOut">
               <a:rPr lang="it-IT" smtClean="0"/>
-              <a:t>11/02/2019</a:t>
+              <a:t>12/02/2019</a:t>
             </a:fld>
             <a:endParaRPr lang="it-IT"/>
           </a:p>
@@ -1959,7 +1959,7 @@
           <a:p>
             <a:fld id="{5BCC69EF-8925-47FB-9BAA-DDFE83E229BC}" type="datetimeFigureOut">
               <a:rPr lang="it-IT" smtClean="0"/>
-              <a:t>11/02/2019</a:t>
+              <a:t>12/02/2019</a:t>
             </a:fld>
             <a:endParaRPr lang="it-IT"/>
           </a:p>
@@ -2072,7 +2072,7 @@
           <a:p>
             <a:fld id="{5BCC69EF-8925-47FB-9BAA-DDFE83E229BC}" type="datetimeFigureOut">
               <a:rPr lang="it-IT" smtClean="0"/>
-              <a:t>11/02/2019</a:t>
+              <a:t>12/02/2019</a:t>
             </a:fld>
             <a:endParaRPr lang="it-IT"/>
           </a:p>
@@ -2383,7 +2383,7 @@
           <a:p>
             <a:fld id="{5BCC69EF-8925-47FB-9BAA-DDFE83E229BC}" type="datetimeFigureOut">
               <a:rPr lang="it-IT" smtClean="0"/>
-              <a:t>11/02/2019</a:t>
+              <a:t>12/02/2019</a:t>
             </a:fld>
             <a:endParaRPr lang="it-IT"/>
           </a:p>
@@ -2671,7 +2671,7 @@
           <a:p>
             <a:fld id="{5BCC69EF-8925-47FB-9BAA-DDFE83E229BC}" type="datetimeFigureOut">
               <a:rPr lang="it-IT" smtClean="0"/>
-              <a:t>11/02/2019</a:t>
+              <a:t>12/02/2019</a:t>
             </a:fld>
             <a:endParaRPr lang="it-IT"/>
           </a:p>
@@ -2912,7 +2912,7 @@
           <a:p>
             <a:fld id="{5BCC69EF-8925-47FB-9BAA-DDFE83E229BC}" type="datetimeFigureOut">
               <a:rPr lang="it-IT" smtClean="0"/>
-              <a:t>11/02/2019</a:t>
+              <a:t>12/02/2019</a:t>
             </a:fld>
             <a:endParaRPr lang="it-IT"/>
           </a:p>
@@ -11103,7 +11103,7 @@
         </p:nvGrpSpPr>
         <p:grpSpPr>
           <a:xfrm>
-            <a:off x="1879483" y="1278021"/>
+            <a:off x="1529775" y="1637776"/>
             <a:ext cx="4191003" cy="3558089"/>
             <a:chOff x="1862295" y="1303935"/>
             <a:chExt cx="4191003" cy="3558089"/>
@@ -14362,8 +14362,8 @@
               </a:p>
             </p:txBody>
           </p:sp>
-          <mc:AlternateContent xmlns:mc="http://schemas.openxmlformats.org/markup-compatibility/2006">
-            <mc:Choice xmlns:a14="http://schemas.microsoft.com/office/drawing/2010/main" Requires="a14">
+          <mc:AlternateContent xmlns:mc="http://schemas.openxmlformats.org/markup-compatibility/2006" xmlns:a14="http://schemas.microsoft.com/office/drawing/2010/main">
+            <mc:Choice Requires="a14">
               <p:sp>
                 <p:nvSpPr>
                   <p:cNvPr id="131" name="CasellaDiTesto 130">
@@ -14450,7 +14450,6 @@
                     </a:endParaRPr>
                   </a:p>
                   <a:p>
-                    <a:pPr/>
                     <a:endParaRPr lang="it-IT" dirty="0">
                       <a:solidFill>
                         <a:schemeClr val="accent2"/>
@@ -14460,7 +14459,7 @@
                 </p:txBody>
               </p:sp>
             </mc:Choice>
-            <mc:Fallback>
+            <mc:Fallback xmlns="">
               <p:sp>
                 <p:nvSpPr>
                   <p:cNvPr id="131" name="CasellaDiTesto 130">
@@ -16018,6 +16017,3756 @@
           </mc:Fallback>
         </mc:AlternateContent>
       </p:grpSp>
+      <p:grpSp>
+        <p:nvGrpSpPr>
+          <p:cNvPr id="123" name="Gruppo 122">
+            <a:extLst>
+              <a:ext uri="{FF2B5EF4-FFF2-40B4-BE49-F238E27FC236}">
+                <a16:creationId xmlns:a16="http://schemas.microsoft.com/office/drawing/2014/main" id="{50A37DB7-10EF-4F34-9E5D-7154B2B29194}"/>
+              </a:ext>
+            </a:extLst>
+          </p:cNvPr>
+          <p:cNvGrpSpPr/>
+          <p:nvPr/>
+        </p:nvGrpSpPr>
+        <p:grpSpPr>
+          <a:xfrm>
+            <a:off x="6683384" y="2121645"/>
+            <a:ext cx="3518243" cy="2073043"/>
+            <a:chOff x="1862295" y="2788981"/>
+            <a:chExt cx="3518243" cy="2073043"/>
+          </a:xfrm>
+        </p:grpSpPr>
+        <p:cxnSp>
+          <p:nvCxnSpPr>
+            <p:cNvPr id="143" name="Connettore diritto 142">
+              <a:extLst>
+                <a:ext uri="{FF2B5EF4-FFF2-40B4-BE49-F238E27FC236}">
+                  <a16:creationId xmlns:a16="http://schemas.microsoft.com/office/drawing/2014/main" id="{5AB613AD-9741-45C5-9CDF-74EFBFC0BA5A}"/>
+                </a:ext>
+              </a:extLst>
+            </p:cNvPr>
+            <p:cNvCxnSpPr>
+              <a:cxnSpLocks/>
+            </p:cNvCxnSpPr>
+            <p:nvPr/>
+          </p:nvCxnSpPr>
+          <p:spPr>
+            <a:xfrm flipV="1">
+              <a:off x="2229249" y="3293664"/>
+              <a:ext cx="0" cy="1196240"/>
+            </a:xfrm>
+            <a:prstGeom prst="line">
+              <a:avLst/>
+            </a:prstGeom>
+            <a:ln w="9525" cap="flat" cmpd="sng" algn="ctr">
+              <a:solidFill>
+                <a:schemeClr val="accent2"/>
+              </a:solidFill>
+              <a:prstDash val="solid"/>
+              <a:round/>
+              <a:headEnd type="none" w="med" len="med"/>
+              <a:tailEnd type="arrow" w="med" len="med"/>
+            </a:ln>
+          </p:spPr>
+          <p:style>
+            <a:lnRef idx="0">
+              <a:scrgbClr r="0" g="0" b="0"/>
+            </a:lnRef>
+            <a:fillRef idx="0">
+              <a:scrgbClr r="0" g="0" b="0"/>
+            </a:fillRef>
+            <a:effectRef idx="0">
+              <a:scrgbClr r="0" g="0" b="0"/>
+            </a:effectRef>
+            <a:fontRef idx="minor">
+              <a:schemeClr val="tx1"/>
+            </a:fontRef>
+          </p:style>
+        </p:cxnSp>
+        <p:cxnSp>
+          <p:nvCxnSpPr>
+            <p:cNvPr id="135" name="Connettore diritto 134">
+              <a:extLst>
+                <a:ext uri="{FF2B5EF4-FFF2-40B4-BE49-F238E27FC236}">
+                  <a16:creationId xmlns:a16="http://schemas.microsoft.com/office/drawing/2014/main" id="{4C1EE123-3603-49C1-B1FC-2CD18B6CC4E5}"/>
+                </a:ext>
+              </a:extLst>
+            </p:cNvPr>
+            <p:cNvCxnSpPr>
+              <a:cxnSpLocks/>
+            </p:cNvCxnSpPr>
+            <p:nvPr/>
+          </p:nvCxnSpPr>
+          <p:spPr>
+            <a:xfrm flipV="1">
+              <a:off x="2225167" y="4467294"/>
+              <a:ext cx="2336643" cy="22610"/>
+            </a:xfrm>
+            <a:prstGeom prst="line">
+              <a:avLst/>
+            </a:prstGeom>
+            <a:ln w="9525" cap="flat" cmpd="sng" algn="ctr">
+              <a:solidFill>
+                <a:schemeClr val="accent2"/>
+              </a:solidFill>
+              <a:prstDash val="solid"/>
+              <a:round/>
+              <a:headEnd type="none" w="med" len="med"/>
+              <a:tailEnd type="arrow" w="med" len="med"/>
+            </a:ln>
+          </p:spPr>
+          <p:style>
+            <a:lnRef idx="0">
+              <a:scrgbClr r="0" g="0" b="0"/>
+            </a:lnRef>
+            <a:fillRef idx="0">
+              <a:scrgbClr r="0" g="0" b="0"/>
+            </a:fillRef>
+            <a:effectRef idx="0">
+              <a:scrgbClr r="0" g="0" b="0"/>
+            </a:effectRef>
+            <a:fontRef idx="minor">
+              <a:schemeClr val="tx1"/>
+            </a:fontRef>
+          </p:style>
+        </p:cxnSp>
+        <p:grpSp>
+          <p:nvGrpSpPr>
+            <p:cNvPr id="136" name="Gruppo 135">
+              <a:extLst>
+                <a:ext uri="{FF2B5EF4-FFF2-40B4-BE49-F238E27FC236}">
+                  <a16:creationId xmlns:a16="http://schemas.microsoft.com/office/drawing/2014/main" id="{C0DFAA5D-6CEA-45DF-A754-2EDB760056F6}"/>
+                </a:ext>
+              </a:extLst>
+            </p:cNvPr>
+            <p:cNvGrpSpPr/>
+            <p:nvPr/>
+          </p:nvGrpSpPr>
+          <p:grpSpPr>
+            <a:xfrm>
+              <a:off x="1935724" y="3711584"/>
+              <a:ext cx="1010678" cy="1150440"/>
+              <a:chOff x="2079835" y="4549193"/>
+              <a:chExt cx="961250" cy="1094178"/>
+            </a:xfrm>
+          </p:grpSpPr>
+          <p:cxnSp>
+            <p:nvCxnSpPr>
+              <p:cNvPr id="252" name="Connettore 2 251">
+                <a:extLst>
+                  <a:ext uri="{FF2B5EF4-FFF2-40B4-BE49-F238E27FC236}">
+                    <a16:creationId xmlns:a16="http://schemas.microsoft.com/office/drawing/2014/main" id="{F4E26D68-9328-4A5F-BDF5-5E65CE99DE3B}"/>
+                  </a:ext>
+                </a:extLst>
+              </p:cNvPr>
+              <p:cNvCxnSpPr>
+                <a:cxnSpLocks/>
+              </p:cNvCxnSpPr>
+              <p:nvPr/>
+            </p:nvCxnSpPr>
+            <p:spPr>
+              <a:xfrm flipV="1">
+                <a:off x="2358275" y="4549193"/>
+                <a:ext cx="0" cy="742909"/>
+              </a:xfrm>
+              <a:prstGeom prst="straightConnector1">
+                <a:avLst/>
+              </a:prstGeom>
+              <a:ln w="19050">
+                <a:solidFill>
+                  <a:srgbClr val="FF0000"/>
+                </a:solidFill>
+                <a:tailEnd type="triangle"/>
+              </a:ln>
+            </p:spPr>
+            <p:style>
+              <a:lnRef idx="1">
+                <a:schemeClr val="accent2"/>
+              </a:lnRef>
+              <a:fillRef idx="0">
+                <a:schemeClr val="accent2"/>
+              </a:fillRef>
+              <a:effectRef idx="0">
+                <a:schemeClr val="accent2"/>
+              </a:effectRef>
+              <a:fontRef idx="minor">
+                <a:schemeClr val="tx1"/>
+              </a:fontRef>
+            </p:style>
+          </p:cxnSp>
+          <p:cxnSp>
+            <p:nvCxnSpPr>
+              <p:cNvPr id="253" name="Connettore 2 252">
+                <a:extLst>
+                  <a:ext uri="{FF2B5EF4-FFF2-40B4-BE49-F238E27FC236}">
+                    <a16:creationId xmlns:a16="http://schemas.microsoft.com/office/drawing/2014/main" id="{8E639FBA-E3D9-4AE5-A1C5-E948619EFD10}"/>
+                  </a:ext>
+                </a:extLst>
+              </p:cNvPr>
+              <p:cNvCxnSpPr>
+                <a:cxnSpLocks/>
+              </p:cNvCxnSpPr>
+              <p:nvPr/>
+            </p:nvCxnSpPr>
+            <p:spPr>
+              <a:xfrm>
+                <a:off x="2355123" y="5292162"/>
+                <a:ext cx="685962" cy="0"/>
+              </a:xfrm>
+              <a:prstGeom prst="straightConnector1">
+                <a:avLst/>
+              </a:prstGeom>
+              <a:ln w="19050">
+                <a:solidFill>
+                  <a:srgbClr val="FF0000"/>
+                </a:solidFill>
+                <a:tailEnd type="triangle"/>
+              </a:ln>
+            </p:spPr>
+            <p:style>
+              <a:lnRef idx="1">
+                <a:schemeClr val="accent2"/>
+              </a:lnRef>
+              <a:fillRef idx="0">
+                <a:schemeClr val="accent2"/>
+              </a:fillRef>
+              <a:effectRef idx="0">
+                <a:schemeClr val="accent2"/>
+              </a:effectRef>
+              <a:fontRef idx="minor">
+                <a:schemeClr val="tx1"/>
+              </a:fontRef>
+            </p:style>
+          </p:cxnSp>
+          <mc:AlternateContent xmlns:mc="http://schemas.openxmlformats.org/markup-compatibility/2006" xmlns:a14="http://schemas.microsoft.com/office/drawing/2010/main">
+            <mc:Choice Requires="a14">
+              <p:sp>
+                <p:nvSpPr>
+                  <p:cNvPr id="254" name="CasellaDiTesto 253">
+                    <a:extLst>
+                      <a:ext uri="{FF2B5EF4-FFF2-40B4-BE49-F238E27FC236}">
+                        <a16:creationId xmlns:a16="http://schemas.microsoft.com/office/drawing/2014/main" id="{BE1D6CA4-84D3-453E-8F4D-4A4512AA1070}"/>
+                      </a:ext>
+                    </a:extLst>
+                  </p:cNvPr>
+                  <p:cNvSpPr txBox="1"/>
+                  <p:nvPr/>
+                </p:nvSpPr>
+                <p:spPr>
+                  <a:xfrm>
+                    <a:off x="2636717" y="5292101"/>
+                    <a:ext cx="301544" cy="351270"/>
+                  </a:xfrm>
+                  <a:prstGeom prst="rect">
+                    <a:avLst/>
+                  </a:prstGeom>
+                  <a:noFill/>
+                </p:spPr>
+                <p:txBody>
+                  <a:bodyPr wrap="square" rtlCol="0">
+                    <a:spAutoFit/>
+                  </a:bodyPr>
+                  <a:lstStyle/>
+                  <a:p>
+                    <a:pPr/>
+                    <a14:m>
+                      <m:oMathPara xmlns:m="http://schemas.openxmlformats.org/officeDocument/2006/math">
+                        <m:oMathParaPr>
+                          <m:jc m:val="centerGroup"/>
+                        </m:oMathParaPr>
+                        <m:oMath xmlns:m="http://schemas.openxmlformats.org/officeDocument/2006/math">
+                          <m:r>
+                            <a:rPr lang="it-IT" b="0" i="1" smtClean="0">
+                              <a:solidFill>
+                                <a:srgbClr val="FF0000"/>
+                              </a:solidFill>
+                              <a:latin typeface="Cambria Math" panose="02040503050406030204" pitchFamily="18" charset="0"/>
+                            </a:rPr>
+                            <m:t>𝑥</m:t>
+                          </m:r>
+                        </m:oMath>
+                      </m:oMathPara>
+                    </a14:m>
+                    <a:endParaRPr lang="it-IT" dirty="0">
+                      <a:solidFill>
+                        <a:srgbClr val="FF0000"/>
+                      </a:solidFill>
+                    </a:endParaRPr>
+                  </a:p>
+                </p:txBody>
+              </p:sp>
+            </mc:Choice>
+            <mc:Fallback xmlns="">
+              <p:sp>
+                <p:nvSpPr>
+                  <p:cNvPr id="91" name="CasellaDiTesto 90">
+                    <a:extLst>
+                      <a:ext uri="{FF2B5EF4-FFF2-40B4-BE49-F238E27FC236}">
+                        <a16:creationId xmlns:a16="http://schemas.microsoft.com/office/drawing/2014/main" id="{56892706-5CDC-4E1E-99FC-5FBE6456ADB2}"/>
+                      </a:ext>
+                    </a:extLst>
+                  </p:cNvPr>
+                  <p:cNvSpPr txBox="1">
+                    <a:spLocks noRot="1" noChangeAspect="1" noMove="1" noResize="1" noEditPoints="1" noAdjustHandles="1" noChangeArrowheads="1" noChangeShapeType="1" noTextEdit="1"/>
+                  </p:cNvSpPr>
+                  <p:nvPr/>
+                </p:nvSpPr>
+                <p:spPr>
+                  <a:xfrm>
+                    <a:off x="2636717" y="5292101"/>
+                    <a:ext cx="301544" cy="351270"/>
+                  </a:xfrm>
+                  <a:prstGeom prst="rect">
+                    <a:avLst/>
+                  </a:prstGeom>
+                  <a:blipFill>
+                    <a:blip r:embed="rId2"/>
+                    <a:stretch>
+                      <a:fillRect/>
+                    </a:stretch>
+                  </a:blipFill>
+                </p:spPr>
+                <p:txBody>
+                  <a:bodyPr/>
+                  <a:lstStyle/>
+                  <a:p>
+                    <a:r>
+                      <a:rPr lang="it-IT">
+                        <a:noFill/>
+                      </a:rPr>
+                      <a:t> </a:t>
+                    </a:r>
+                  </a:p>
+                </p:txBody>
+              </p:sp>
+            </mc:Fallback>
+          </mc:AlternateContent>
+          <mc:AlternateContent xmlns:mc="http://schemas.openxmlformats.org/markup-compatibility/2006" xmlns:a14="http://schemas.microsoft.com/office/drawing/2010/main">
+            <mc:Choice Requires="a14">
+              <p:sp>
+                <p:nvSpPr>
+                  <p:cNvPr id="255" name="CasellaDiTesto 254">
+                    <a:extLst>
+                      <a:ext uri="{FF2B5EF4-FFF2-40B4-BE49-F238E27FC236}">
+                        <a16:creationId xmlns:a16="http://schemas.microsoft.com/office/drawing/2014/main" id="{78849591-31D2-41E6-8B25-6DF342E0DA01}"/>
+                      </a:ext>
+                    </a:extLst>
+                  </p:cNvPr>
+                  <p:cNvSpPr txBox="1"/>
+                  <p:nvPr/>
+                </p:nvSpPr>
+                <p:spPr>
+                  <a:xfrm>
+                    <a:off x="2079835" y="4739744"/>
+                    <a:ext cx="301544" cy="351270"/>
+                  </a:xfrm>
+                  <a:prstGeom prst="rect">
+                    <a:avLst/>
+                  </a:prstGeom>
+                  <a:noFill/>
+                </p:spPr>
+                <p:txBody>
+                  <a:bodyPr wrap="square" rtlCol="0">
+                    <a:spAutoFit/>
+                  </a:bodyPr>
+                  <a:lstStyle/>
+                  <a:p>
+                    <a:pPr/>
+                    <a14:m>
+                      <m:oMathPara xmlns:m="http://schemas.openxmlformats.org/officeDocument/2006/math">
+                        <m:oMathParaPr>
+                          <m:jc m:val="centerGroup"/>
+                        </m:oMathParaPr>
+                        <m:oMath xmlns:m="http://schemas.openxmlformats.org/officeDocument/2006/math">
+                          <m:r>
+                            <a:rPr lang="it-IT" b="0" i="1" smtClean="0">
+                              <a:solidFill>
+                                <a:srgbClr val="FF0000"/>
+                              </a:solidFill>
+                              <a:latin typeface="Cambria Math" panose="02040503050406030204" pitchFamily="18" charset="0"/>
+                            </a:rPr>
+                            <m:t>𝑦</m:t>
+                          </m:r>
+                        </m:oMath>
+                      </m:oMathPara>
+                    </a14:m>
+                    <a:endParaRPr lang="it-IT" dirty="0">
+                      <a:solidFill>
+                        <a:srgbClr val="FF0000"/>
+                      </a:solidFill>
+                    </a:endParaRPr>
+                  </a:p>
+                </p:txBody>
+              </p:sp>
+            </mc:Choice>
+            <mc:Fallback xmlns="">
+              <p:sp>
+                <p:nvSpPr>
+                  <p:cNvPr id="92" name="CasellaDiTesto 91">
+                    <a:extLst>
+                      <a:ext uri="{FF2B5EF4-FFF2-40B4-BE49-F238E27FC236}">
+                        <a16:creationId xmlns:a16="http://schemas.microsoft.com/office/drawing/2014/main" id="{3E18A23B-1409-493C-BC3F-3BCF8413E35F}"/>
+                      </a:ext>
+                    </a:extLst>
+                  </p:cNvPr>
+                  <p:cNvSpPr txBox="1">
+                    <a:spLocks noRot="1" noChangeAspect="1" noMove="1" noResize="1" noEditPoints="1" noAdjustHandles="1" noChangeArrowheads="1" noChangeShapeType="1" noTextEdit="1"/>
+                  </p:cNvSpPr>
+                  <p:nvPr/>
+                </p:nvSpPr>
+                <p:spPr>
+                  <a:xfrm>
+                    <a:off x="2079835" y="4739744"/>
+                    <a:ext cx="301544" cy="351270"/>
+                  </a:xfrm>
+                  <a:prstGeom prst="rect">
+                    <a:avLst/>
+                  </a:prstGeom>
+                  <a:blipFill>
+                    <a:blip r:embed="rId3"/>
+                    <a:stretch>
+                      <a:fillRect b="-6667"/>
+                    </a:stretch>
+                  </a:blipFill>
+                </p:spPr>
+                <p:txBody>
+                  <a:bodyPr/>
+                  <a:lstStyle/>
+                  <a:p>
+                    <a:r>
+                      <a:rPr lang="it-IT">
+                        <a:noFill/>
+                      </a:rPr>
+                      <a:t> </a:t>
+                    </a:r>
+                  </a:p>
+                </p:txBody>
+              </p:sp>
+            </mc:Fallback>
+          </mc:AlternateContent>
+        </p:grpSp>
+        <p:grpSp>
+          <p:nvGrpSpPr>
+            <p:cNvPr id="137" name="Gruppo 136">
+              <a:extLst>
+                <a:ext uri="{FF2B5EF4-FFF2-40B4-BE49-F238E27FC236}">
+                  <a16:creationId xmlns:a16="http://schemas.microsoft.com/office/drawing/2014/main" id="{B5B8269D-B10D-498F-8C28-EFC77A742883}"/>
+                </a:ext>
+              </a:extLst>
+            </p:cNvPr>
+            <p:cNvGrpSpPr/>
+            <p:nvPr/>
+          </p:nvGrpSpPr>
+          <p:grpSpPr>
+            <a:xfrm rot="20839521">
+              <a:off x="2725168" y="2788981"/>
+              <a:ext cx="2655370" cy="1647337"/>
+              <a:chOff x="4289142" y="3396531"/>
+              <a:chExt cx="4138813" cy="2567638"/>
+            </a:xfrm>
+          </p:grpSpPr>
+          <p:grpSp>
+            <p:nvGrpSpPr>
+              <p:cNvPr id="160" name="Gruppo 159">
+                <a:extLst>
+                  <a:ext uri="{FF2B5EF4-FFF2-40B4-BE49-F238E27FC236}">
+                    <a16:creationId xmlns:a16="http://schemas.microsoft.com/office/drawing/2014/main" id="{9DAB33B0-23C2-4F16-ADC1-3208D14B5FAD}"/>
+                  </a:ext>
+                </a:extLst>
+              </p:cNvPr>
+              <p:cNvGrpSpPr/>
+              <p:nvPr/>
+            </p:nvGrpSpPr>
+            <p:grpSpPr>
+              <a:xfrm rot="20407896">
+                <a:off x="6086098" y="3396531"/>
+                <a:ext cx="2341857" cy="1924260"/>
+                <a:chOff x="0" y="0"/>
+                <a:chExt cx="2011680" cy="1771623"/>
+              </a:xfrm>
+            </p:grpSpPr>
+            <p:grpSp>
+              <p:nvGrpSpPr>
+                <p:cNvPr id="163" name="Gruppo 162">
+                  <a:extLst>
+                    <a:ext uri="{FF2B5EF4-FFF2-40B4-BE49-F238E27FC236}">
+                      <a16:creationId xmlns:a16="http://schemas.microsoft.com/office/drawing/2014/main" id="{631FA15A-FD51-4217-AA95-5C3650802483}"/>
+                    </a:ext>
+                  </a:extLst>
+                </p:cNvPr>
+                <p:cNvGrpSpPr/>
+                <p:nvPr/>
+              </p:nvGrpSpPr>
+              <p:grpSpPr>
+                <a:xfrm>
+                  <a:off x="0" y="0"/>
+                  <a:ext cx="2011680" cy="1771623"/>
+                  <a:chOff x="0" y="0"/>
+                  <a:chExt cx="2011680" cy="1771623"/>
+                </a:xfrm>
+              </p:grpSpPr>
+              <p:sp>
+                <p:nvSpPr>
+                  <p:cNvPr id="247" name="Rettangolo 246">
+                    <a:extLst>
+                      <a:ext uri="{FF2B5EF4-FFF2-40B4-BE49-F238E27FC236}">
+                        <a16:creationId xmlns:a16="http://schemas.microsoft.com/office/drawing/2014/main" id="{0245B1F7-8839-44CE-8259-A33D080ED354}"/>
+                      </a:ext>
+                    </a:extLst>
+                  </p:cNvPr>
+                  <p:cNvSpPr/>
+                  <p:nvPr/>
+                </p:nvSpPr>
+                <p:spPr>
+                  <a:xfrm>
+                    <a:off x="0" y="326004"/>
+                    <a:ext cx="2011680" cy="1120775"/>
+                  </a:xfrm>
+                  <a:prstGeom prst="rect">
+                    <a:avLst/>
+                  </a:prstGeom>
+                  <a:ln w="38100"/>
+                </p:spPr>
+                <p:style>
+                  <a:lnRef idx="2">
+                    <a:schemeClr val="dk1"/>
+                  </a:lnRef>
+                  <a:fillRef idx="1">
+                    <a:schemeClr val="lt1"/>
+                  </a:fillRef>
+                  <a:effectRef idx="0">
+                    <a:schemeClr val="dk1"/>
+                  </a:effectRef>
+                  <a:fontRef idx="minor">
+                    <a:schemeClr val="dk1"/>
+                  </a:fontRef>
+                </p:style>
+                <p:txBody>
+                  <a:bodyPr rot="0" spcFirstLastPara="0" vert="horz" wrap="square" lIns="91440" tIns="45720" rIns="91440" bIns="45720" numCol="1" spcCol="0" rtlCol="0" fromWordArt="0" anchor="ctr" anchorCtr="0" forceAA="0" compatLnSpc="1">
+                    <a:prstTxWarp prst="textNoShape">
+                      <a:avLst/>
+                    </a:prstTxWarp>
+                    <a:noAutofit/>
+                  </a:bodyPr>
+                  <a:lstStyle/>
+                  <a:p>
+                    <a:endParaRPr lang="it-IT"/>
+                  </a:p>
+                </p:txBody>
+              </p:sp>
+              <p:sp>
+                <p:nvSpPr>
+                  <p:cNvPr id="248" name="Rettangolo 247">
+                    <a:extLst>
+                      <a:ext uri="{FF2B5EF4-FFF2-40B4-BE49-F238E27FC236}">
+                        <a16:creationId xmlns:a16="http://schemas.microsoft.com/office/drawing/2014/main" id="{170B5A5C-44F8-427E-A073-92C7FBFC6DF6}"/>
+                      </a:ext>
+                    </a:extLst>
+                  </p:cNvPr>
+                  <p:cNvSpPr/>
+                  <p:nvPr/>
+                </p:nvSpPr>
+                <p:spPr>
+                  <a:xfrm>
+                    <a:off x="182880" y="0"/>
+                    <a:ext cx="704215" cy="324485"/>
+                  </a:xfrm>
+                  <a:prstGeom prst="rect">
+                    <a:avLst/>
+                  </a:prstGeom>
+                  <a:ln w="38100"/>
+                </p:spPr>
+                <p:style>
+                  <a:lnRef idx="2">
+                    <a:schemeClr val="dk1"/>
+                  </a:lnRef>
+                  <a:fillRef idx="1">
+                    <a:schemeClr val="lt1"/>
+                  </a:fillRef>
+                  <a:effectRef idx="0">
+                    <a:schemeClr val="dk1"/>
+                  </a:effectRef>
+                  <a:fontRef idx="minor">
+                    <a:schemeClr val="dk1"/>
+                  </a:fontRef>
+                </p:style>
+                <p:txBody>
+                  <a:bodyPr rot="0" spcFirstLastPara="0" vert="horz" wrap="square" lIns="91440" tIns="45720" rIns="91440" bIns="45720" numCol="1" spcCol="0" rtlCol="0" fromWordArt="0" anchor="ctr" anchorCtr="0" forceAA="0" compatLnSpc="1">
+                    <a:prstTxWarp prst="textNoShape">
+                      <a:avLst/>
+                    </a:prstTxWarp>
+                    <a:noAutofit/>
+                  </a:bodyPr>
+                  <a:lstStyle/>
+                  <a:p>
+                    <a:endParaRPr lang="it-IT"/>
+                  </a:p>
+                </p:txBody>
+              </p:sp>
+              <p:sp>
+                <p:nvSpPr>
+                  <p:cNvPr id="249" name="Rettangolo 248">
+                    <a:extLst>
+                      <a:ext uri="{FF2B5EF4-FFF2-40B4-BE49-F238E27FC236}">
+                        <a16:creationId xmlns:a16="http://schemas.microsoft.com/office/drawing/2014/main" id="{45FF4AAB-E203-434F-9903-4D2E93898EA2}"/>
+                      </a:ext>
+                    </a:extLst>
+                  </p:cNvPr>
+                  <p:cNvSpPr/>
+                  <p:nvPr/>
+                </p:nvSpPr>
+                <p:spPr>
+                  <a:xfrm>
+                    <a:off x="182880" y="1447138"/>
+                    <a:ext cx="704215" cy="324485"/>
+                  </a:xfrm>
+                  <a:prstGeom prst="rect">
+                    <a:avLst/>
+                  </a:prstGeom>
+                  <a:ln w="38100"/>
+                </p:spPr>
+                <p:style>
+                  <a:lnRef idx="2">
+                    <a:schemeClr val="dk1"/>
+                  </a:lnRef>
+                  <a:fillRef idx="1">
+                    <a:schemeClr val="lt1"/>
+                  </a:fillRef>
+                  <a:effectRef idx="0">
+                    <a:schemeClr val="dk1"/>
+                  </a:effectRef>
+                  <a:fontRef idx="minor">
+                    <a:schemeClr val="dk1"/>
+                  </a:fontRef>
+                </p:style>
+                <p:txBody>
+                  <a:bodyPr rot="0" spcFirstLastPara="0" vert="horz" wrap="square" lIns="91440" tIns="45720" rIns="91440" bIns="45720" numCol="1" spcCol="0" rtlCol="0" fromWordArt="0" anchor="ctr" anchorCtr="0" forceAA="0" compatLnSpc="1">
+                    <a:prstTxWarp prst="textNoShape">
+                      <a:avLst/>
+                    </a:prstTxWarp>
+                    <a:noAutofit/>
+                  </a:bodyPr>
+                  <a:lstStyle/>
+                  <a:p>
+                    <a:endParaRPr lang="it-IT"/>
+                  </a:p>
+                </p:txBody>
+              </p:sp>
+              <p:sp>
+                <p:nvSpPr>
+                  <p:cNvPr id="250" name="Rettangolo 249">
+                    <a:extLst>
+                      <a:ext uri="{FF2B5EF4-FFF2-40B4-BE49-F238E27FC236}">
+                        <a16:creationId xmlns:a16="http://schemas.microsoft.com/office/drawing/2014/main" id="{4FD5CBFB-E07F-4BE6-8279-A740198378E5}"/>
+                      </a:ext>
+                    </a:extLst>
+                  </p:cNvPr>
+                  <p:cNvSpPr/>
+                  <p:nvPr/>
+                </p:nvSpPr>
+                <p:spPr>
+                  <a:xfrm>
+                    <a:off x="1073426" y="0"/>
+                    <a:ext cx="704215" cy="324485"/>
+                  </a:xfrm>
+                  <a:prstGeom prst="rect">
+                    <a:avLst/>
+                  </a:prstGeom>
+                  <a:ln w="38100"/>
+                </p:spPr>
+                <p:style>
+                  <a:lnRef idx="2">
+                    <a:schemeClr val="dk1"/>
+                  </a:lnRef>
+                  <a:fillRef idx="1">
+                    <a:schemeClr val="lt1"/>
+                  </a:fillRef>
+                  <a:effectRef idx="0">
+                    <a:schemeClr val="dk1"/>
+                  </a:effectRef>
+                  <a:fontRef idx="minor">
+                    <a:schemeClr val="dk1"/>
+                  </a:fontRef>
+                </p:style>
+                <p:txBody>
+                  <a:bodyPr rot="0" spcFirstLastPara="0" vert="horz" wrap="square" lIns="91440" tIns="45720" rIns="91440" bIns="45720" numCol="1" spcCol="0" rtlCol="0" fromWordArt="0" anchor="ctr" anchorCtr="0" forceAA="0" compatLnSpc="1">
+                    <a:prstTxWarp prst="textNoShape">
+                      <a:avLst/>
+                    </a:prstTxWarp>
+                    <a:noAutofit/>
+                  </a:bodyPr>
+                  <a:lstStyle/>
+                  <a:p>
+                    <a:endParaRPr lang="it-IT"/>
+                  </a:p>
+                </p:txBody>
+              </p:sp>
+              <p:sp>
+                <p:nvSpPr>
+                  <p:cNvPr id="251" name="Rettangolo 250">
+                    <a:extLst>
+                      <a:ext uri="{FF2B5EF4-FFF2-40B4-BE49-F238E27FC236}">
+                        <a16:creationId xmlns:a16="http://schemas.microsoft.com/office/drawing/2014/main" id="{A8D5092D-CD66-4C49-A5FB-562AD642CD2D}"/>
+                      </a:ext>
+                    </a:extLst>
+                  </p:cNvPr>
+                  <p:cNvSpPr/>
+                  <p:nvPr/>
+                </p:nvSpPr>
+                <p:spPr>
+                  <a:xfrm>
+                    <a:off x="1073426" y="1447138"/>
+                    <a:ext cx="704215" cy="324485"/>
+                  </a:xfrm>
+                  <a:prstGeom prst="rect">
+                    <a:avLst/>
+                  </a:prstGeom>
+                  <a:ln w="38100"/>
+                </p:spPr>
+                <p:style>
+                  <a:lnRef idx="2">
+                    <a:schemeClr val="dk1"/>
+                  </a:lnRef>
+                  <a:fillRef idx="1">
+                    <a:schemeClr val="lt1"/>
+                  </a:fillRef>
+                  <a:effectRef idx="0">
+                    <a:schemeClr val="dk1"/>
+                  </a:effectRef>
+                  <a:fontRef idx="minor">
+                    <a:schemeClr val="dk1"/>
+                  </a:fontRef>
+                </p:style>
+                <p:txBody>
+                  <a:bodyPr rot="0" spcFirstLastPara="0" vert="horz" wrap="square" lIns="91440" tIns="45720" rIns="91440" bIns="45720" numCol="1" spcCol="0" rtlCol="0" fromWordArt="0" anchor="ctr" anchorCtr="0" forceAA="0" compatLnSpc="1">
+                    <a:prstTxWarp prst="textNoShape">
+                      <a:avLst/>
+                    </a:prstTxWarp>
+                    <a:noAutofit/>
+                  </a:bodyPr>
+                  <a:lstStyle/>
+                  <a:p>
+                    <a:endParaRPr lang="it-IT"/>
+                  </a:p>
+                </p:txBody>
+              </p:sp>
+            </p:grpSp>
+            <p:grpSp>
+              <p:nvGrpSpPr>
+                <p:cNvPr id="164" name="Gruppo 163">
+                  <a:extLst>
+                    <a:ext uri="{FF2B5EF4-FFF2-40B4-BE49-F238E27FC236}">
+                      <a16:creationId xmlns:a16="http://schemas.microsoft.com/office/drawing/2014/main" id="{537689FF-214E-487C-900C-E3567C417F5C}"/>
+                    </a:ext>
+                  </a:extLst>
+                </p:cNvPr>
+                <p:cNvGrpSpPr/>
+                <p:nvPr/>
+              </p:nvGrpSpPr>
+              <p:grpSpPr>
+                <a:xfrm>
+                  <a:off x="1080052" y="0"/>
+                  <a:ext cx="687030" cy="315240"/>
+                  <a:chOff x="0" y="0"/>
+                  <a:chExt cx="687030" cy="315240"/>
+                </a:xfrm>
+              </p:grpSpPr>
+              <p:grpSp>
+                <p:nvGrpSpPr>
+                  <p:cNvPr id="229" name="Gruppo 228">
+                    <a:extLst>
+                      <a:ext uri="{FF2B5EF4-FFF2-40B4-BE49-F238E27FC236}">
+                        <a16:creationId xmlns:a16="http://schemas.microsoft.com/office/drawing/2014/main" id="{17264430-4A65-4E46-A6CE-080D3FFF60A5}"/>
+                      </a:ext>
+                    </a:extLst>
+                  </p:cNvPr>
+                  <p:cNvGrpSpPr/>
+                  <p:nvPr/>
+                </p:nvGrpSpPr>
+                <p:grpSpPr>
+                  <a:xfrm>
+                    <a:off x="568285" y="2339"/>
+                    <a:ext cx="118745" cy="308224"/>
+                    <a:chOff x="0" y="0"/>
+                    <a:chExt cx="118745" cy="308224"/>
+                  </a:xfrm>
+                </p:grpSpPr>
+                <p:cxnSp>
+                  <p:nvCxnSpPr>
+                    <p:cNvPr id="245" name="Connettore diritto 244">
+                      <a:extLst>
+                        <a:ext uri="{FF2B5EF4-FFF2-40B4-BE49-F238E27FC236}">
+                          <a16:creationId xmlns:a16="http://schemas.microsoft.com/office/drawing/2014/main" id="{1D6686D4-C480-4FD8-AF8D-8364E8F90773}"/>
+                        </a:ext>
+                      </a:extLst>
+                    </p:cNvPr>
+                    <p:cNvCxnSpPr/>
+                    <p:nvPr/>
+                  </p:nvCxnSpPr>
+                  <p:spPr>
+                    <a:xfrm>
+                      <a:off x="0" y="0"/>
+                      <a:ext cx="118745" cy="158750"/>
+                    </a:xfrm>
+                    <a:prstGeom prst="line">
+                      <a:avLst/>
+                    </a:prstGeom>
+                    <a:ln w="38100"/>
+                  </p:spPr>
+                  <p:style>
+                    <a:lnRef idx="1">
+                      <a:schemeClr val="dk1"/>
+                    </a:lnRef>
+                    <a:fillRef idx="0">
+                      <a:schemeClr val="dk1"/>
+                    </a:fillRef>
+                    <a:effectRef idx="0">
+                      <a:schemeClr val="dk1"/>
+                    </a:effectRef>
+                    <a:fontRef idx="minor">
+                      <a:schemeClr val="tx1"/>
+                    </a:fontRef>
+                  </p:style>
+                </p:cxnSp>
+                <p:cxnSp>
+                  <p:nvCxnSpPr>
+                    <p:cNvPr id="246" name="Connettore diritto 245">
+                      <a:extLst>
+                        <a:ext uri="{FF2B5EF4-FFF2-40B4-BE49-F238E27FC236}">
+                          <a16:creationId xmlns:a16="http://schemas.microsoft.com/office/drawing/2014/main" id="{DB2C99A2-D27C-4E2F-8C84-A45D49856452}"/>
+                        </a:ext>
+                      </a:extLst>
+                    </p:cNvPr>
+                    <p:cNvCxnSpPr/>
+                    <p:nvPr/>
+                  </p:nvCxnSpPr>
+                  <p:spPr>
+                    <a:xfrm flipV="1">
+                      <a:off x="0" y="143124"/>
+                      <a:ext cx="117475" cy="165100"/>
+                    </a:xfrm>
+                    <a:prstGeom prst="line">
+                      <a:avLst/>
+                    </a:prstGeom>
+                    <a:ln w="38100"/>
+                  </p:spPr>
+                  <p:style>
+                    <a:lnRef idx="1">
+                      <a:schemeClr val="dk1"/>
+                    </a:lnRef>
+                    <a:fillRef idx="0">
+                      <a:schemeClr val="dk1"/>
+                    </a:fillRef>
+                    <a:effectRef idx="0">
+                      <a:schemeClr val="dk1"/>
+                    </a:effectRef>
+                    <a:fontRef idx="minor">
+                      <a:schemeClr val="tx1"/>
+                    </a:fontRef>
+                  </p:style>
+                </p:cxnSp>
+              </p:grpSp>
+              <p:grpSp>
+                <p:nvGrpSpPr>
+                  <p:cNvPr id="230" name="Gruppo 229">
+                    <a:extLst>
+                      <a:ext uri="{FF2B5EF4-FFF2-40B4-BE49-F238E27FC236}">
+                        <a16:creationId xmlns:a16="http://schemas.microsoft.com/office/drawing/2014/main" id="{867ECD80-61CA-43A5-9963-A68159F65CF6}"/>
+                      </a:ext>
+                    </a:extLst>
+                  </p:cNvPr>
+                  <p:cNvGrpSpPr/>
+                  <p:nvPr/>
+                </p:nvGrpSpPr>
+                <p:grpSpPr>
+                  <a:xfrm>
+                    <a:off x="100561" y="7016"/>
+                    <a:ext cx="118745" cy="308224"/>
+                    <a:chOff x="0" y="0"/>
+                    <a:chExt cx="118745" cy="308224"/>
+                  </a:xfrm>
+                </p:grpSpPr>
+                <p:cxnSp>
+                  <p:nvCxnSpPr>
+                    <p:cNvPr id="243" name="Connettore diritto 242">
+                      <a:extLst>
+                        <a:ext uri="{FF2B5EF4-FFF2-40B4-BE49-F238E27FC236}">
+                          <a16:creationId xmlns:a16="http://schemas.microsoft.com/office/drawing/2014/main" id="{50C03867-896E-4D08-9B48-D173A8C637D4}"/>
+                        </a:ext>
+                      </a:extLst>
+                    </p:cNvPr>
+                    <p:cNvCxnSpPr/>
+                    <p:nvPr/>
+                  </p:nvCxnSpPr>
+                  <p:spPr>
+                    <a:xfrm>
+                      <a:off x="0" y="0"/>
+                      <a:ext cx="118745" cy="158750"/>
+                    </a:xfrm>
+                    <a:prstGeom prst="line">
+                      <a:avLst/>
+                    </a:prstGeom>
+                    <a:ln w="38100"/>
+                  </p:spPr>
+                  <p:style>
+                    <a:lnRef idx="1">
+                      <a:schemeClr val="dk1"/>
+                    </a:lnRef>
+                    <a:fillRef idx="0">
+                      <a:schemeClr val="dk1"/>
+                    </a:fillRef>
+                    <a:effectRef idx="0">
+                      <a:schemeClr val="dk1"/>
+                    </a:effectRef>
+                    <a:fontRef idx="minor">
+                      <a:schemeClr val="tx1"/>
+                    </a:fontRef>
+                  </p:style>
+                </p:cxnSp>
+                <p:cxnSp>
+                  <p:nvCxnSpPr>
+                    <p:cNvPr id="244" name="Connettore diritto 243">
+                      <a:extLst>
+                        <a:ext uri="{FF2B5EF4-FFF2-40B4-BE49-F238E27FC236}">
+                          <a16:creationId xmlns:a16="http://schemas.microsoft.com/office/drawing/2014/main" id="{FDA5931A-0996-408C-8A5F-8CE8F4774EBD}"/>
+                        </a:ext>
+                      </a:extLst>
+                    </p:cNvPr>
+                    <p:cNvCxnSpPr/>
+                    <p:nvPr/>
+                  </p:nvCxnSpPr>
+                  <p:spPr>
+                    <a:xfrm flipV="1">
+                      <a:off x="0" y="143124"/>
+                      <a:ext cx="117475" cy="165100"/>
+                    </a:xfrm>
+                    <a:prstGeom prst="line">
+                      <a:avLst/>
+                    </a:prstGeom>
+                    <a:ln w="38100"/>
+                  </p:spPr>
+                  <p:style>
+                    <a:lnRef idx="1">
+                      <a:schemeClr val="dk1"/>
+                    </a:lnRef>
+                    <a:fillRef idx="0">
+                      <a:schemeClr val="dk1"/>
+                    </a:fillRef>
+                    <a:effectRef idx="0">
+                      <a:schemeClr val="dk1"/>
+                    </a:effectRef>
+                    <a:fontRef idx="minor">
+                      <a:schemeClr val="tx1"/>
+                    </a:fontRef>
+                  </p:style>
+                </p:cxnSp>
+              </p:grpSp>
+              <p:grpSp>
+                <p:nvGrpSpPr>
+                  <p:cNvPr id="231" name="Gruppo 230">
+                    <a:extLst>
+                      <a:ext uri="{FF2B5EF4-FFF2-40B4-BE49-F238E27FC236}">
+                        <a16:creationId xmlns:a16="http://schemas.microsoft.com/office/drawing/2014/main" id="{0DAC0152-3FAE-4ABC-9C23-9AA20F369C36}"/>
+                      </a:ext>
+                    </a:extLst>
+                  </p:cNvPr>
+                  <p:cNvGrpSpPr/>
+                  <p:nvPr/>
+                </p:nvGrpSpPr>
+                <p:grpSpPr>
+                  <a:xfrm>
+                    <a:off x="210476" y="2339"/>
+                    <a:ext cx="118745" cy="308224"/>
+                    <a:chOff x="0" y="0"/>
+                    <a:chExt cx="118745" cy="308224"/>
+                  </a:xfrm>
+                </p:grpSpPr>
+                <p:cxnSp>
+                  <p:nvCxnSpPr>
+                    <p:cNvPr id="241" name="Connettore diritto 240">
+                      <a:extLst>
+                        <a:ext uri="{FF2B5EF4-FFF2-40B4-BE49-F238E27FC236}">
+                          <a16:creationId xmlns:a16="http://schemas.microsoft.com/office/drawing/2014/main" id="{29B88B01-9398-4901-8709-C249C326A220}"/>
+                        </a:ext>
+                      </a:extLst>
+                    </p:cNvPr>
+                    <p:cNvCxnSpPr/>
+                    <p:nvPr/>
+                  </p:nvCxnSpPr>
+                  <p:spPr>
+                    <a:xfrm>
+                      <a:off x="0" y="0"/>
+                      <a:ext cx="118745" cy="158750"/>
+                    </a:xfrm>
+                    <a:prstGeom prst="line">
+                      <a:avLst/>
+                    </a:prstGeom>
+                    <a:ln w="38100"/>
+                  </p:spPr>
+                  <p:style>
+                    <a:lnRef idx="1">
+                      <a:schemeClr val="dk1"/>
+                    </a:lnRef>
+                    <a:fillRef idx="0">
+                      <a:schemeClr val="dk1"/>
+                    </a:fillRef>
+                    <a:effectRef idx="0">
+                      <a:schemeClr val="dk1"/>
+                    </a:effectRef>
+                    <a:fontRef idx="minor">
+                      <a:schemeClr val="tx1"/>
+                    </a:fontRef>
+                  </p:style>
+                </p:cxnSp>
+                <p:cxnSp>
+                  <p:nvCxnSpPr>
+                    <p:cNvPr id="242" name="Connettore diritto 241">
+                      <a:extLst>
+                        <a:ext uri="{FF2B5EF4-FFF2-40B4-BE49-F238E27FC236}">
+                          <a16:creationId xmlns:a16="http://schemas.microsoft.com/office/drawing/2014/main" id="{3476233D-E9EB-416E-A1E0-B38C96623984}"/>
+                        </a:ext>
+                      </a:extLst>
+                    </p:cNvPr>
+                    <p:cNvCxnSpPr/>
+                    <p:nvPr/>
+                  </p:nvCxnSpPr>
+                  <p:spPr>
+                    <a:xfrm flipV="1">
+                      <a:off x="0" y="143124"/>
+                      <a:ext cx="117475" cy="165100"/>
+                    </a:xfrm>
+                    <a:prstGeom prst="line">
+                      <a:avLst/>
+                    </a:prstGeom>
+                    <a:ln w="38100"/>
+                  </p:spPr>
+                  <p:style>
+                    <a:lnRef idx="1">
+                      <a:schemeClr val="dk1"/>
+                    </a:lnRef>
+                    <a:fillRef idx="0">
+                      <a:schemeClr val="dk1"/>
+                    </a:fillRef>
+                    <a:effectRef idx="0">
+                      <a:schemeClr val="dk1"/>
+                    </a:effectRef>
+                    <a:fontRef idx="minor">
+                      <a:schemeClr val="tx1"/>
+                    </a:fontRef>
+                  </p:style>
+                </p:cxnSp>
+              </p:grpSp>
+              <p:grpSp>
+                <p:nvGrpSpPr>
+                  <p:cNvPr id="232" name="Gruppo 231">
+                    <a:extLst>
+                      <a:ext uri="{FF2B5EF4-FFF2-40B4-BE49-F238E27FC236}">
+                        <a16:creationId xmlns:a16="http://schemas.microsoft.com/office/drawing/2014/main" id="{D8032EC4-8F5B-4416-91F7-2D88298BBBEA}"/>
+                      </a:ext>
+                    </a:extLst>
+                  </p:cNvPr>
+                  <p:cNvGrpSpPr/>
+                  <p:nvPr/>
+                </p:nvGrpSpPr>
+                <p:grpSpPr>
+                  <a:xfrm>
+                    <a:off x="332084" y="0"/>
+                    <a:ext cx="118745" cy="308224"/>
+                    <a:chOff x="0" y="0"/>
+                    <a:chExt cx="118745" cy="308224"/>
+                  </a:xfrm>
+                </p:grpSpPr>
+                <p:cxnSp>
+                  <p:nvCxnSpPr>
+                    <p:cNvPr id="239" name="Connettore diritto 238">
+                      <a:extLst>
+                        <a:ext uri="{FF2B5EF4-FFF2-40B4-BE49-F238E27FC236}">
+                          <a16:creationId xmlns:a16="http://schemas.microsoft.com/office/drawing/2014/main" id="{521BC501-9FA2-4450-9422-CC2FA4B3B48F}"/>
+                        </a:ext>
+                      </a:extLst>
+                    </p:cNvPr>
+                    <p:cNvCxnSpPr/>
+                    <p:nvPr/>
+                  </p:nvCxnSpPr>
+                  <p:spPr>
+                    <a:xfrm>
+                      <a:off x="0" y="0"/>
+                      <a:ext cx="118745" cy="158750"/>
+                    </a:xfrm>
+                    <a:prstGeom prst="line">
+                      <a:avLst/>
+                    </a:prstGeom>
+                    <a:ln w="38100"/>
+                  </p:spPr>
+                  <p:style>
+                    <a:lnRef idx="1">
+                      <a:schemeClr val="dk1"/>
+                    </a:lnRef>
+                    <a:fillRef idx="0">
+                      <a:schemeClr val="dk1"/>
+                    </a:fillRef>
+                    <a:effectRef idx="0">
+                      <a:schemeClr val="dk1"/>
+                    </a:effectRef>
+                    <a:fontRef idx="minor">
+                      <a:schemeClr val="tx1"/>
+                    </a:fontRef>
+                  </p:style>
+                </p:cxnSp>
+                <p:cxnSp>
+                  <p:nvCxnSpPr>
+                    <p:cNvPr id="240" name="Connettore diritto 239">
+                      <a:extLst>
+                        <a:ext uri="{FF2B5EF4-FFF2-40B4-BE49-F238E27FC236}">
+                          <a16:creationId xmlns:a16="http://schemas.microsoft.com/office/drawing/2014/main" id="{664B9986-E9D5-4E62-AA64-42EBD80C4FB1}"/>
+                        </a:ext>
+                      </a:extLst>
+                    </p:cNvPr>
+                    <p:cNvCxnSpPr/>
+                    <p:nvPr/>
+                  </p:nvCxnSpPr>
+                  <p:spPr>
+                    <a:xfrm flipV="1">
+                      <a:off x="0" y="143124"/>
+                      <a:ext cx="117475" cy="165100"/>
+                    </a:xfrm>
+                    <a:prstGeom prst="line">
+                      <a:avLst/>
+                    </a:prstGeom>
+                    <a:ln w="38100"/>
+                  </p:spPr>
+                  <p:style>
+                    <a:lnRef idx="1">
+                      <a:schemeClr val="dk1"/>
+                    </a:lnRef>
+                    <a:fillRef idx="0">
+                      <a:schemeClr val="dk1"/>
+                    </a:fillRef>
+                    <a:effectRef idx="0">
+                      <a:schemeClr val="dk1"/>
+                    </a:effectRef>
+                    <a:fontRef idx="minor">
+                      <a:schemeClr val="tx1"/>
+                    </a:fontRef>
+                  </p:style>
+                </p:cxnSp>
+              </p:grpSp>
+              <p:grpSp>
+                <p:nvGrpSpPr>
+                  <p:cNvPr id="233" name="Gruppo 232">
+                    <a:extLst>
+                      <a:ext uri="{FF2B5EF4-FFF2-40B4-BE49-F238E27FC236}">
+                        <a16:creationId xmlns:a16="http://schemas.microsoft.com/office/drawing/2014/main" id="{86E93FAC-865D-4F9D-8BC9-36B92FBF1A0C}"/>
+                      </a:ext>
+                    </a:extLst>
+                  </p:cNvPr>
+                  <p:cNvGrpSpPr/>
+                  <p:nvPr/>
+                </p:nvGrpSpPr>
+                <p:grpSpPr>
+                  <a:xfrm>
+                    <a:off x="451354" y="0"/>
+                    <a:ext cx="118745" cy="308224"/>
+                    <a:chOff x="0" y="0"/>
+                    <a:chExt cx="118745" cy="308224"/>
+                  </a:xfrm>
+                </p:grpSpPr>
+                <p:cxnSp>
+                  <p:nvCxnSpPr>
+                    <p:cNvPr id="237" name="Connettore diritto 236">
+                      <a:extLst>
+                        <a:ext uri="{FF2B5EF4-FFF2-40B4-BE49-F238E27FC236}">
+                          <a16:creationId xmlns:a16="http://schemas.microsoft.com/office/drawing/2014/main" id="{101D8971-9C04-4140-838E-5992E94E1975}"/>
+                        </a:ext>
+                      </a:extLst>
+                    </p:cNvPr>
+                    <p:cNvCxnSpPr/>
+                    <p:nvPr/>
+                  </p:nvCxnSpPr>
+                  <p:spPr>
+                    <a:xfrm>
+                      <a:off x="0" y="0"/>
+                      <a:ext cx="118745" cy="158750"/>
+                    </a:xfrm>
+                    <a:prstGeom prst="line">
+                      <a:avLst/>
+                    </a:prstGeom>
+                    <a:ln w="38100"/>
+                  </p:spPr>
+                  <p:style>
+                    <a:lnRef idx="1">
+                      <a:schemeClr val="dk1"/>
+                    </a:lnRef>
+                    <a:fillRef idx="0">
+                      <a:schemeClr val="dk1"/>
+                    </a:fillRef>
+                    <a:effectRef idx="0">
+                      <a:schemeClr val="dk1"/>
+                    </a:effectRef>
+                    <a:fontRef idx="minor">
+                      <a:schemeClr val="tx1"/>
+                    </a:fontRef>
+                  </p:style>
+                </p:cxnSp>
+                <p:cxnSp>
+                  <p:nvCxnSpPr>
+                    <p:cNvPr id="238" name="Connettore diritto 237">
+                      <a:extLst>
+                        <a:ext uri="{FF2B5EF4-FFF2-40B4-BE49-F238E27FC236}">
+                          <a16:creationId xmlns:a16="http://schemas.microsoft.com/office/drawing/2014/main" id="{2EE9CB4B-E5EF-46C7-8347-188E4E7AF158}"/>
+                        </a:ext>
+                      </a:extLst>
+                    </p:cNvPr>
+                    <p:cNvCxnSpPr/>
+                    <p:nvPr/>
+                  </p:nvCxnSpPr>
+                  <p:spPr>
+                    <a:xfrm flipV="1">
+                      <a:off x="0" y="143124"/>
+                      <a:ext cx="117475" cy="165100"/>
+                    </a:xfrm>
+                    <a:prstGeom prst="line">
+                      <a:avLst/>
+                    </a:prstGeom>
+                    <a:ln w="38100"/>
+                  </p:spPr>
+                  <p:style>
+                    <a:lnRef idx="1">
+                      <a:schemeClr val="dk1"/>
+                    </a:lnRef>
+                    <a:fillRef idx="0">
+                      <a:schemeClr val="dk1"/>
+                    </a:fillRef>
+                    <a:effectRef idx="0">
+                      <a:schemeClr val="dk1"/>
+                    </a:effectRef>
+                    <a:fontRef idx="minor">
+                      <a:schemeClr val="tx1"/>
+                    </a:fontRef>
+                  </p:style>
+                </p:cxnSp>
+              </p:grpSp>
+              <p:grpSp>
+                <p:nvGrpSpPr>
+                  <p:cNvPr id="234" name="Gruppo 233">
+                    <a:extLst>
+                      <a:ext uri="{FF2B5EF4-FFF2-40B4-BE49-F238E27FC236}">
+                        <a16:creationId xmlns:a16="http://schemas.microsoft.com/office/drawing/2014/main" id="{69803AFC-1BE1-4548-B3A4-3D39973F17BC}"/>
+                      </a:ext>
+                    </a:extLst>
+                  </p:cNvPr>
+                  <p:cNvGrpSpPr/>
+                  <p:nvPr/>
+                </p:nvGrpSpPr>
+                <p:grpSpPr>
+                  <a:xfrm>
+                    <a:off x="0" y="7016"/>
+                    <a:ext cx="118745" cy="308224"/>
+                    <a:chOff x="0" y="0"/>
+                    <a:chExt cx="118745" cy="308224"/>
+                  </a:xfrm>
+                </p:grpSpPr>
+                <p:cxnSp>
+                  <p:nvCxnSpPr>
+                    <p:cNvPr id="235" name="Connettore diritto 234">
+                      <a:extLst>
+                        <a:ext uri="{FF2B5EF4-FFF2-40B4-BE49-F238E27FC236}">
+                          <a16:creationId xmlns:a16="http://schemas.microsoft.com/office/drawing/2014/main" id="{0D8719B6-43E0-4546-8CB1-679F1E555F94}"/>
+                        </a:ext>
+                      </a:extLst>
+                    </p:cNvPr>
+                    <p:cNvCxnSpPr/>
+                    <p:nvPr/>
+                  </p:nvCxnSpPr>
+                  <p:spPr>
+                    <a:xfrm>
+                      <a:off x="0" y="0"/>
+                      <a:ext cx="118745" cy="158750"/>
+                    </a:xfrm>
+                    <a:prstGeom prst="line">
+                      <a:avLst/>
+                    </a:prstGeom>
+                    <a:ln w="38100"/>
+                  </p:spPr>
+                  <p:style>
+                    <a:lnRef idx="1">
+                      <a:schemeClr val="dk1"/>
+                    </a:lnRef>
+                    <a:fillRef idx="0">
+                      <a:schemeClr val="dk1"/>
+                    </a:fillRef>
+                    <a:effectRef idx="0">
+                      <a:schemeClr val="dk1"/>
+                    </a:effectRef>
+                    <a:fontRef idx="minor">
+                      <a:schemeClr val="tx1"/>
+                    </a:fontRef>
+                  </p:style>
+                </p:cxnSp>
+                <p:cxnSp>
+                  <p:nvCxnSpPr>
+                    <p:cNvPr id="236" name="Connettore diritto 235">
+                      <a:extLst>
+                        <a:ext uri="{FF2B5EF4-FFF2-40B4-BE49-F238E27FC236}">
+                          <a16:creationId xmlns:a16="http://schemas.microsoft.com/office/drawing/2014/main" id="{0FA3B7A6-229E-40D7-9692-6AF101749FD6}"/>
+                        </a:ext>
+                      </a:extLst>
+                    </p:cNvPr>
+                    <p:cNvCxnSpPr/>
+                    <p:nvPr/>
+                  </p:nvCxnSpPr>
+                  <p:spPr>
+                    <a:xfrm flipV="1">
+                      <a:off x="0" y="143124"/>
+                      <a:ext cx="117475" cy="165100"/>
+                    </a:xfrm>
+                    <a:prstGeom prst="line">
+                      <a:avLst/>
+                    </a:prstGeom>
+                    <a:ln w="38100"/>
+                  </p:spPr>
+                  <p:style>
+                    <a:lnRef idx="1">
+                      <a:schemeClr val="dk1"/>
+                    </a:lnRef>
+                    <a:fillRef idx="0">
+                      <a:schemeClr val="dk1"/>
+                    </a:fillRef>
+                    <a:effectRef idx="0">
+                      <a:schemeClr val="dk1"/>
+                    </a:effectRef>
+                    <a:fontRef idx="minor">
+                      <a:schemeClr val="tx1"/>
+                    </a:fontRef>
+                  </p:style>
+                </p:cxnSp>
+              </p:grpSp>
+            </p:grpSp>
+            <p:grpSp>
+              <p:nvGrpSpPr>
+                <p:cNvPr id="165" name="Gruppo 164">
+                  <a:extLst>
+                    <a:ext uri="{FF2B5EF4-FFF2-40B4-BE49-F238E27FC236}">
+                      <a16:creationId xmlns:a16="http://schemas.microsoft.com/office/drawing/2014/main" id="{455980A4-C40E-42CB-B032-AE2AF005022C}"/>
+                    </a:ext>
+                  </a:extLst>
+                </p:cNvPr>
+                <p:cNvGrpSpPr/>
+                <p:nvPr/>
+              </p:nvGrpSpPr>
+              <p:grpSpPr>
+                <a:xfrm>
+                  <a:off x="1093304" y="1451113"/>
+                  <a:ext cx="687030" cy="315240"/>
+                  <a:chOff x="0" y="0"/>
+                  <a:chExt cx="687030" cy="315240"/>
+                </a:xfrm>
+              </p:grpSpPr>
+              <p:grpSp>
+                <p:nvGrpSpPr>
+                  <p:cNvPr id="209" name="Gruppo 208">
+                    <a:extLst>
+                      <a:ext uri="{FF2B5EF4-FFF2-40B4-BE49-F238E27FC236}">
+                        <a16:creationId xmlns:a16="http://schemas.microsoft.com/office/drawing/2014/main" id="{A4D36FC8-5416-4F7F-A05F-BEE270CE15B2}"/>
+                      </a:ext>
+                    </a:extLst>
+                  </p:cNvPr>
+                  <p:cNvGrpSpPr/>
+                  <p:nvPr/>
+                </p:nvGrpSpPr>
+                <p:grpSpPr>
+                  <a:xfrm>
+                    <a:off x="568285" y="2339"/>
+                    <a:ext cx="118745" cy="308224"/>
+                    <a:chOff x="0" y="0"/>
+                    <a:chExt cx="118745" cy="308224"/>
+                  </a:xfrm>
+                </p:grpSpPr>
+                <p:cxnSp>
+                  <p:nvCxnSpPr>
+                    <p:cNvPr id="227" name="Connettore diritto 226">
+                      <a:extLst>
+                        <a:ext uri="{FF2B5EF4-FFF2-40B4-BE49-F238E27FC236}">
+                          <a16:creationId xmlns:a16="http://schemas.microsoft.com/office/drawing/2014/main" id="{83B5381A-9A5E-4973-A524-3F242B0469D7}"/>
+                        </a:ext>
+                      </a:extLst>
+                    </p:cNvPr>
+                    <p:cNvCxnSpPr/>
+                    <p:nvPr/>
+                  </p:nvCxnSpPr>
+                  <p:spPr>
+                    <a:xfrm>
+                      <a:off x="0" y="0"/>
+                      <a:ext cx="118745" cy="158750"/>
+                    </a:xfrm>
+                    <a:prstGeom prst="line">
+                      <a:avLst/>
+                    </a:prstGeom>
+                    <a:ln w="38100"/>
+                  </p:spPr>
+                  <p:style>
+                    <a:lnRef idx="1">
+                      <a:schemeClr val="dk1"/>
+                    </a:lnRef>
+                    <a:fillRef idx="0">
+                      <a:schemeClr val="dk1"/>
+                    </a:fillRef>
+                    <a:effectRef idx="0">
+                      <a:schemeClr val="dk1"/>
+                    </a:effectRef>
+                    <a:fontRef idx="minor">
+                      <a:schemeClr val="tx1"/>
+                    </a:fontRef>
+                  </p:style>
+                </p:cxnSp>
+                <p:cxnSp>
+                  <p:nvCxnSpPr>
+                    <p:cNvPr id="228" name="Connettore diritto 227">
+                      <a:extLst>
+                        <a:ext uri="{FF2B5EF4-FFF2-40B4-BE49-F238E27FC236}">
+                          <a16:creationId xmlns:a16="http://schemas.microsoft.com/office/drawing/2014/main" id="{B516224A-2792-4DDB-AD55-8BF8867F0605}"/>
+                        </a:ext>
+                      </a:extLst>
+                    </p:cNvPr>
+                    <p:cNvCxnSpPr/>
+                    <p:nvPr/>
+                  </p:nvCxnSpPr>
+                  <p:spPr>
+                    <a:xfrm flipV="1">
+                      <a:off x="0" y="143124"/>
+                      <a:ext cx="117475" cy="165100"/>
+                    </a:xfrm>
+                    <a:prstGeom prst="line">
+                      <a:avLst/>
+                    </a:prstGeom>
+                    <a:ln w="38100"/>
+                  </p:spPr>
+                  <p:style>
+                    <a:lnRef idx="1">
+                      <a:schemeClr val="dk1"/>
+                    </a:lnRef>
+                    <a:fillRef idx="0">
+                      <a:schemeClr val="dk1"/>
+                    </a:fillRef>
+                    <a:effectRef idx="0">
+                      <a:schemeClr val="dk1"/>
+                    </a:effectRef>
+                    <a:fontRef idx="minor">
+                      <a:schemeClr val="tx1"/>
+                    </a:fontRef>
+                  </p:style>
+                </p:cxnSp>
+              </p:grpSp>
+              <p:grpSp>
+                <p:nvGrpSpPr>
+                  <p:cNvPr id="210" name="Gruppo 209">
+                    <a:extLst>
+                      <a:ext uri="{FF2B5EF4-FFF2-40B4-BE49-F238E27FC236}">
+                        <a16:creationId xmlns:a16="http://schemas.microsoft.com/office/drawing/2014/main" id="{5A990C28-639A-4556-9B9B-E8EB051FCF29}"/>
+                      </a:ext>
+                    </a:extLst>
+                  </p:cNvPr>
+                  <p:cNvGrpSpPr/>
+                  <p:nvPr/>
+                </p:nvGrpSpPr>
+                <p:grpSpPr>
+                  <a:xfrm>
+                    <a:off x="100561" y="7016"/>
+                    <a:ext cx="118745" cy="308224"/>
+                    <a:chOff x="0" y="0"/>
+                    <a:chExt cx="118745" cy="308224"/>
+                  </a:xfrm>
+                </p:grpSpPr>
+                <p:cxnSp>
+                  <p:nvCxnSpPr>
+                    <p:cNvPr id="225" name="Connettore diritto 224">
+                      <a:extLst>
+                        <a:ext uri="{FF2B5EF4-FFF2-40B4-BE49-F238E27FC236}">
+                          <a16:creationId xmlns:a16="http://schemas.microsoft.com/office/drawing/2014/main" id="{6171FA7A-E3B2-41D0-B799-3945F5CFABB4}"/>
+                        </a:ext>
+                      </a:extLst>
+                    </p:cNvPr>
+                    <p:cNvCxnSpPr/>
+                    <p:nvPr/>
+                  </p:nvCxnSpPr>
+                  <p:spPr>
+                    <a:xfrm>
+                      <a:off x="0" y="0"/>
+                      <a:ext cx="118745" cy="158750"/>
+                    </a:xfrm>
+                    <a:prstGeom prst="line">
+                      <a:avLst/>
+                    </a:prstGeom>
+                    <a:ln w="38100"/>
+                  </p:spPr>
+                  <p:style>
+                    <a:lnRef idx="1">
+                      <a:schemeClr val="dk1"/>
+                    </a:lnRef>
+                    <a:fillRef idx="0">
+                      <a:schemeClr val="dk1"/>
+                    </a:fillRef>
+                    <a:effectRef idx="0">
+                      <a:schemeClr val="dk1"/>
+                    </a:effectRef>
+                    <a:fontRef idx="minor">
+                      <a:schemeClr val="tx1"/>
+                    </a:fontRef>
+                  </p:style>
+                </p:cxnSp>
+                <p:cxnSp>
+                  <p:nvCxnSpPr>
+                    <p:cNvPr id="226" name="Connettore diritto 225">
+                      <a:extLst>
+                        <a:ext uri="{FF2B5EF4-FFF2-40B4-BE49-F238E27FC236}">
+                          <a16:creationId xmlns:a16="http://schemas.microsoft.com/office/drawing/2014/main" id="{FB72A539-C6BA-4DCE-A992-F335D96AA0C4}"/>
+                        </a:ext>
+                      </a:extLst>
+                    </p:cNvPr>
+                    <p:cNvCxnSpPr/>
+                    <p:nvPr/>
+                  </p:nvCxnSpPr>
+                  <p:spPr>
+                    <a:xfrm flipV="1">
+                      <a:off x="0" y="143124"/>
+                      <a:ext cx="117475" cy="165100"/>
+                    </a:xfrm>
+                    <a:prstGeom prst="line">
+                      <a:avLst/>
+                    </a:prstGeom>
+                    <a:ln w="38100"/>
+                  </p:spPr>
+                  <p:style>
+                    <a:lnRef idx="1">
+                      <a:schemeClr val="dk1"/>
+                    </a:lnRef>
+                    <a:fillRef idx="0">
+                      <a:schemeClr val="dk1"/>
+                    </a:fillRef>
+                    <a:effectRef idx="0">
+                      <a:schemeClr val="dk1"/>
+                    </a:effectRef>
+                    <a:fontRef idx="minor">
+                      <a:schemeClr val="tx1"/>
+                    </a:fontRef>
+                  </p:style>
+                </p:cxnSp>
+              </p:grpSp>
+              <p:grpSp>
+                <p:nvGrpSpPr>
+                  <p:cNvPr id="211" name="Gruppo 210">
+                    <a:extLst>
+                      <a:ext uri="{FF2B5EF4-FFF2-40B4-BE49-F238E27FC236}">
+                        <a16:creationId xmlns:a16="http://schemas.microsoft.com/office/drawing/2014/main" id="{E11AB533-3312-4A62-9B1B-2F27200205E5}"/>
+                      </a:ext>
+                    </a:extLst>
+                  </p:cNvPr>
+                  <p:cNvGrpSpPr/>
+                  <p:nvPr/>
+                </p:nvGrpSpPr>
+                <p:grpSpPr>
+                  <a:xfrm>
+                    <a:off x="210476" y="2339"/>
+                    <a:ext cx="118745" cy="308224"/>
+                    <a:chOff x="0" y="0"/>
+                    <a:chExt cx="118745" cy="308224"/>
+                  </a:xfrm>
+                </p:grpSpPr>
+                <p:cxnSp>
+                  <p:nvCxnSpPr>
+                    <p:cNvPr id="222" name="Connettore diritto 221">
+                      <a:extLst>
+                        <a:ext uri="{FF2B5EF4-FFF2-40B4-BE49-F238E27FC236}">
+                          <a16:creationId xmlns:a16="http://schemas.microsoft.com/office/drawing/2014/main" id="{BBBD9594-A7B3-4FF9-BF58-AB770266F4B9}"/>
+                        </a:ext>
+                      </a:extLst>
+                    </p:cNvPr>
+                    <p:cNvCxnSpPr/>
+                    <p:nvPr/>
+                  </p:nvCxnSpPr>
+                  <p:spPr>
+                    <a:xfrm>
+                      <a:off x="0" y="0"/>
+                      <a:ext cx="118745" cy="158750"/>
+                    </a:xfrm>
+                    <a:prstGeom prst="line">
+                      <a:avLst/>
+                    </a:prstGeom>
+                    <a:ln w="38100"/>
+                  </p:spPr>
+                  <p:style>
+                    <a:lnRef idx="1">
+                      <a:schemeClr val="dk1"/>
+                    </a:lnRef>
+                    <a:fillRef idx="0">
+                      <a:schemeClr val="dk1"/>
+                    </a:fillRef>
+                    <a:effectRef idx="0">
+                      <a:schemeClr val="dk1"/>
+                    </a:effectRef>
+                    <a:fontRef idx="minor">
+                      <a:schemeClr val="tx1"/>
+                    </a:fontRef>
+                  </p:style>
+                </p:cxnSp>
+                <p:cxnSp>
+                  <p:nvCxnSpPr>
+                    <p:cNvPr id="224" name="Connettore diritto 223">
+                      <a:extLst>
+                        <a:ext uri="{FF2B5EF4-FFF2-40B4-BE49-F238E27FC236}">
+                          <a16:creationId xmlns:a16="http://schemas.microsoft.com/office/drawing/2014/main" id="{D474DCD1-75A1-4853-8909-D6DA7B3618B8}"/>
+                        </a:ext>
+                      </a:extLst>
+                    </p:cNvPr>
+                    <p:cNvCxnSpPr/>
+                    <p:nvPr/>
+                  </p:nvCxnSpPr>
+                  <p:spPr>
+                    <a:xfrm flipV="1">
+                      <a:off x="0" y="143124"/>
+                      <a:ext cx="117475" cy="165100"/>
+                    </a:xfrm>
+                    <a:prstGeom prst="line">
+                      <a:avLst/>
+                    </a:prstGeom>
+                    <a:ln w="38100"/>
+                  </p:spPr>
+                  <p:style>
+                    <a:lnRef idx="1">
+                      <a:schemeClr val="dk1"/>
+                    </a:lnRef>
+                    <a:fillRef idx="0">
+                      <a:schemeClr val="dk1"/>
+                    </a:fillRef>
+                    <a:effectRef idx="0">
+                      <a:schemeClr val="dk1"/>
+                    </a:effectRef>
+                    <a:fontRef idx="minor">
+                      <a:schemeClr val="tx1"/>
+                    </a:fontRef>
+                  </p:style>
+                </p:cxnSp>
+              </p:grpSp>
+              <p:grpSp>
+                <p:nvGrpSpPr>
+                  <p:cNvPr id="212" name="Gruppo 211">
+                    <a:extLst>
+                      <a:ext uri="{FF2B5EF4-FFF2-40B4-BE49-F238E27FC236}">
+                        <a16:creationId xmlns:a16="http://schemas.microsoft.com/office/drawing/2014/main" id="{3E9E31F2-9C96-43B2-9518-C1A165687FA9}"/>
+                      </a:ext>
+                    </a:extLst>
+                  </p:cNvPr>
+                  <p:cNvGrpSpPr/>
+                  <p:nvPr/>
+                </p:nvGrpSpPr>
+                <p:grpSpPr>
+                  <a:xfrm>
+                    <a:off x="332084" y="0"/>
+                    <a:ext cx="118745" cy="308224"/>
+                    <a:chOff x="0" y="0"/>
+                    <a:chExt cx="118745" cy="308224"/>
+                  </a:xfrm>
+                </p:grpSpPr>
+                <p:cxnSp>
+                  <p:nvCxnSpPr>
+                    <p:cNvPr id="220" name="Connettore diritto 219">
+                      <a:extLst>
+                        <a:ext uri="{FF2B5EF4-FFF2-40B4-BE49-F238E27FC236}">
+                          <a16:creationId xmlns:a16="http://schemas.microsoft.com/office/drawing/2014/main" id="{BE0ACB95-C5CA-4236-A416-81739A4C7F5A}"/>
+                        </a:ext>
+                      </a:extLst>
+                    </p:cNvPr>
+                    <p:cNvCxnSpPr/>
+                    <p:nvPr/>
+                  </p:nvCxnSpPr>
+                  <p:spPr>
+                    <a:xfrm>
+                      <a:off x="0" y="0"/>
+                      <a:ext cx="118745" cy="158750"/>
+                    </a:xfrm>
+                    <a:prstGeom prst="line">
+                      <a:avLst/>
+                    </a:prstGeom>
+                    <a:ln w="38100"/>
+                  </p:spPr>
+                  <p:style>
+                    <a:lnRef idx="1">
+                      <a:schemeClr val="dk1"/>
+                    </a:lnRef>
+                    <a:fillRef idx="0">
+                      <a:schemeClr val="dk1"/>
+                    </a:fillRef>
+                    <a:effectRef idx="0">
+                      <a:schemeClr val="dk1"/>
+                    </a:effectRef>
+                    <a:fontRef idx="minor">
+                      <a:schemeClr val="tx1"/>
+                    </a:fontRef>
+                  </p:style>
+                </p:cxnSp>
+                <p:cxnSp>
+                  <p:nvCxnSpPr>
+                    <p:cNvPr id="221" name="Connettore diritto 220">
+                      <a:extLst>
+                        <a:ext uri="{FF2B5EF4-FFF2-40B4-BE49-F238E27FC236}">
+                          <a16:creationId xmlns:a16="http://schemas.microsoft.com/office/drawing/2014/main" id="{DC74AF05-C067-4961-BA0A-5D8C45C6D4A5}"/>
+                        </a:ext>
+                      </a:extLst>
+                    </p:cNvPr>
+                    <p:cNvCxnSpPr/>
+                    <p:nvPr/>
+                  </p:nvCxnSpPr>
+                  <p:spPr>
+                    <a:xfrm flipV="1">
+                      <a:off x="0" y="143124"/>
+                      <a:ext cx="117475" cy="165100"/>
+                    </a:xfrm>
+                    <a:prstGeom prst="line">
+                      <a:avLst/>
+                    </a:prstGeom>
+                    <a:ln w="38100"/>
+                  </p:spPr>
+                  <p:style>
+                    <a:lnRef idx="1">
+                      <a:schemeClr val="dk1"/>
+                    </a:lnRef>
+                    <a:fillRef idx="0">
+                      <a:schemeClr val="dk1"/>
+                    </a:fillRef>
+                    <a:effectRef idx="0">
+                      <a:schemeClr val="dk1"/>
+                    </a:effectRef>
+                    <a:fontRef idx="minor">
+                      <a:schemeClr val="tx1"/>
+                    </a:fontRef>
+                  </p:style>
+                </p:cxnSp>
+              </p:grpSp>
+              <p:grpSp>
+                <p:nvGrpSpPr>
+                  <p:cNvPr id="213" name="Gruppo 212">
+                    <a:extLst>
+                      <a:ext uri="{FF2B5EF4-FFF2-40B4-BE49-F238E27FC236}">
+                        <a16:creationId xmlns:a16="http://schemas.microsoft.com/office/drawing/2014/main" id="{92C1C462-506B-406B-B71A-DC8901EB838B}"/>
+                      </a:ext>
+                    </a:extLst>
+                  </p:cNvPr>
+                  <p:cNvGrpSpPr/>
+                  <p:nvPr/>
+                </p:nvGrpSpPr>
+                <p:grpSpPr>
+                  <a:xfrm>
+                    <a:off x="451354" y="0"/>
+                    <a:ext cx="118745" cy="308224"/>
+                    <a:chOff x="0" y="0"/>
+                    <a:chExt cx="118745" cy="308224"/>
+                  </a:xfrm>
+                </p:grpSpPr>
+                <p:cxnSp>
+                  <p:nvCxnSpPr>
+                    <p:cNvPr id="218" name="Connettore diritto 217">
+                      <a:extLst>
+                        <a:ext uri="{FF2B5EF4-FFF2-40B4-BE49-F238E27FC236}">
+                          <a16:creationId xmlns:a16="http://schemas.microsoft.com/office/drawing/2014/main" id="{6928C2C1-17D0-4467-9668-515C7CEE3C36}"/>
+                        </a:ext>
+                      </a:extLst>
+                    </p:cNvPr>
+                    <p:cNvCxnSpPr/>
+                    <p:nvPr/>
+                  </p:nvCxnSpPr>
+                  <p:spPr>
+                    <a:xfrm>
+                      <a:off x="0" y="0"/>
+                      <a:ext cx="118745" cy="158750"/>
+                    </a:xfrm>
+                    <a:prstGeom prst="line">
+                      <a:avLst/>
+                    </a:prstGeom>
+                    <a:ln w="38100"/>
+                  </p:spPr>
+                  <p:style>
+                    <a:lnRef idx="1">
+                      <a:schemeClr val="dk1"/>
+                    </a:lnRef>
+                    <a:fillRef idx="0">
+                      <a:schemeClr val="dk1"/>
+                    </a:fillRef>
+                    <a:effectRef idx="0">
+                      <a:schemeClr val="dk1"/>
+                    </a:effectRef>
+                    <a:fontRef idx="minor">
+                      <a:schemeClr val="tx1"/>
+                    </a:fontRef>
+                  </p:style>
+                </p:cxnSp>
+                <p:cxnSp>
+                  <p:nvCxnSpPr>
+                    <p:cNvPr id="219" name="Connettore diritto 218">
+                      <a:extLst>
+                        <a:ext uri="{FF2B5EF4-FFF2-40B4-BE49-F238E27FC236}">
+                          <a16:creationId xmlns:a16="http://schemas.microsoft.com/office/drawing/2014/main" id="{29617F95-9508-4D4C-9960-91B51639695A}"/>
+                        </a:ext>
+                      </a:extLst>
+                    </p:cNvPr>
+                    <p:cNvCxnSpPr/>
+                    <p:nvPr/>
+                  </p:nvCxnSpPr>
+                  <p:spPr>
+                    <a:xfrm flipV="1">
+                      <a:off x="0" y="143124"/>
+                      <a:ext cx="117475" cy="165100"/>
+                    </a:xfrm>
+                    <a:prstGeom prst="line">
+                      <a:avLst/>
+                    </a:prstGeom>
+                    <a:ln w="38100"/>
+                  </p:spPr>
+                  <p:style>
+                    <a:lnRef idx="1">
+                      <a:schemeClr val="dk1"/>
+                    </a:lnRef>
+                    <a:fillRef idx="0">
+                      <a:schemeClr val="dk1"/>
+                    </a:fillRef>
+                    <a:effectRef idx="0">
+                      <a:schemeClr val="dk1"/>
+                    </a:effectRef>
+                    <a:fontRef idx="minor">
+                      <a:schemeClr val="tx1"/>
+                    </a:fontRef>
+                  </p:style>
+                </p:cxnSp>
+              </p:grpSp>
+              <p:grpSp>
+                <p:nvGrpSpPr>
+                  <p:cNvPr id="214" name="Gruppo 213">
+                    <a:extLst>
+                      <a:ext uri="{FF2B5EF4-FFF2-40B4-BE49-F238E27FC236}">
+                        <a16:creationId xmlns:a16="http://schemas.microsoft.com/office/drawing/2014/main" id="{1A0B5D8B-6B1D-4DE9-8CF1-4BA59F58E476}"/>
+                      </a:ext>
+                    </a:extLst>
+                  </p:cNvPr>
+                  <p:cNvGrpSpPr/>
+                  <p:nvPr/>
+                </p:nvGrpSpPr>
+                <p:grpSpPr>
+                  <a:xfrm>
+                    <a:off x="0" y="7016"/>
+                    <a:ext cx="118745" cy="308224"/>
+                    <a:chOff x="0" y="0"/>
+                    <a:chExt cx="118745" cy="308224"/>
+                  </a:xfrm>
+                </p:grpSpPr>
+                <p:cxnSp>
+                  <p:nvCxnSpPr>
+                    <p:cNvPr id="215" name="Connettore diritto 214">
+                      <a:extLst>
+                        <a:ext uri="{FF2B5EF4-FFF2-40B4-BE49-F238E27FC236}">
+                          <a16:creationId xmlns:a16="http://schemas.microsoft.com/office/drawing/2014/main" id="{3C9F7A33-6A0A-405C-B715-FF3A22731E0C}"/>
+                        </a:ext>
+                      </a:extLst>
+                    </p:cNvPr>
+                    <p:cNvCxnSpPr/>
+                    <p:nvPr/>
+                  </p:nvCxnSpPr>
+                  <p:spPr>
+                    <a:xfrm>
+                      <a:off x="0" y="0"/>
+                      <a:ext cx="118745" cy="158750"/>
+                    </a:xfrm>
+                    <a:prstGeom prst="line">
+                      <a:avLst/>
+                    </a:prstGeom>
+                    <a:ln w="38100"/>
+                  </p:spPr>
+                  <p:style>
+                    <a:lnRef idx="1">
+                      <a:schemeClr val="dk1"/>
+                    </a:lnRef>
+                    <a:fillRef idx="0">
+                      <a:schemeClr val="dk1"/>
+                    </a:fillRef>
+                    <a:effectRef idx="0">
+                      <a:schemeClr val="dk1"/>
+                    </a:effectRef>
+                    <a:fontRef idx="minor">
+                      <a:schemeClr val="tx1"/>
+                    </a:fontRef>
+                  </p:style>
+                </p:cxnSp>
+                <p:cxnSp>
+                  <p:nvCxnSpPr>
+                    <p:cNvPr id="216" name="Connettore diritto 215">
+                      <a:extLst>
+                        <a:ext uri="{FF2B5EF4-FFF2-40B4-BE49-F238E27FC236}">
+                          <a16:creationId xmlns:a16="http://schemas.microsoft.com/office/drawing/2014/main" id="{850E0DC7-88A9-4A4F-A31D-7520C168744A}"/>
+                        </a:ext>
+                      </a:extLst>
+                    </p:cNvPr>
+                    <p:cNvCxnSpPr/>
+                    <p:nvPr/>
+                  </p:nvCxnSpPr>
+                  <p:spPr>
+                    <a:xfrm flipV="1">
+                      <a:off x="0" y="143124"/>
+                      <a:ext cx="117475" cy="165100"/>
+                    </a:xfrm>
+                    <a:prstGeom prst="line">
+                      <a:avLst/>
+                    </a:prstGeom>
+                    <a:ln w="38100"/>
+                  </p:spPr>
+                  <p:style>
+                    <a:lnRef idx="1">
+                      <a:schemeClr val="dk1"/>
+                    </a:lnRef>
+                    <a:fillRef idx="0">
+                      <a:schemeClr val="dk1"/>
+                    </a:fillRef>
+                    <a:effectRef idx="0">
+                      <a:schemeClr val="dk1"/>
+                    </a:effectRef>
+                    <a:fontRef idx="minor">
+                      <a:schemeClr val="tx1"/>
+                    </a:fontRef>
+                  </p:style>
+                </p:cxnSp>
+              </p:grpSp>
+            </p:grpSp>
+            <p:grpSp>
+              <p:nvGrpSpPr>
+                <p:cNvPr id="166" name="Gruppo 165">
+                  <a:extLst>
+                    <a:ext uri="{FF2B5EF4-FFF2-40B4-BE49-F238E27FC236}">
+                      <a16:creationId xmlns:a16="http://schemas.microsoft.com/office/drawing/2014/main" id="{E2D9FE55-5AC9-4F40-8C95-6D00DC244C1E}"/>
+                    </a:ext>
+                  </a:extLst>
+                </p:cNvPr>
+                <p:cNvGrpSpPr/>
+                <p:nvPr/>
+              </p:nvGrpSpPr>
+              <p:grpSpPr>
+                <a:xfrm>
+                  <a:off x="205409" y="1444487"/>
+                  <a:ext cx="687030" cy="315240"/>
+                  <a:chOff x="0" y="0"/>
+                  <a:chExt cx="687030" cy="315240"/>
+                </a:xfrm>
+              </p:grpSpPr>
+              <p:grpSp>
+                <p:nvGrpSpPr>
+                  <p:cNvPr id="190" name="Gruppo 189">
+                    <a:extLst>
+                      <a:ext uri="{FF2B5EF4-FFF2-40B4-BE49-F238E27FC236}">
+                        <a16:creationId xmlns:a16="http://schemas.microsoft.com/office/drawing/2014/main" id="{8D85E40B-0A66-493D-B570-75CC53E7DD79}"/>
+                      </a:ext>
+                    </a:extLst>
+                  </p:cNvPr>
+                  <p:cNvGrpSpPr/>
+                  <p:nvPr/>
+                </p:nvGrpSpPr>
+                <p:grpSpPr>
+                  <a:xfrm>
+                    <a:off x="568285" y="2339"/>
+                    <a:ext cx="118745" cy="308224"/>
+                    <a:chOff x="0" y="0"/>
+                    <a:chExt cx="118745" cy="308224"/>
+                  </a:xfrm>
+                </p:grpSpPr>
+                <p:cxnSp>
+                  <p:nvCxnSpPr>
+                    <p:cNvPr id="207" name="Connettore diritto 206">
+                      <a:extLst>
+                        <a:ext uri="{FF2B5EF4-FFF2-40B4-BE49-F238E27FC236}">
+                          <a16:creationId xmlns:a16="http://schemas.microsoft.com/office/drawing/2014/main" id="{319D73B9-B23D-4167-A989-C0A471DF6472}"/>
+                        </a:ext>
+                      </a:extLst>
+                    </p:cNvPr>
+                    <p:cNvCxnSpPr/>
+                    <p:nvPr/>
+                  </p:nvCxnSpPr>
+                  <p:spPr>
+                    <a:xfrm>
+                      <a:off x="0" y="0"/>
+                      <a:ext cx="118745" cy="158750"/>
+                    </a:xfrm>
+                    <a:prstGeom prst="line">
+                      <a:avLst/>
+                    </a:prstGeom>
+                    <a:ln w="38100"/>
+                  </p:spPr>
+                  <p:style>
+                    <a:lnRef idx="1">
+                      <a:schemeClr val="dk1"/>
+                    </a:lnRef>
+                    <a:fillRef idx="0">
+                      <a:schemeClr val="dk1"/>
+                    </a:fillRef>
+                    <a:effectRef idx="0">
+                      <a:schemeClr val="dk1"/>
+                    </a:effectRef>
+                    <a:fontRef idx="minor">
+                      <a:schemeClr val="tx1"/>
+                    </a:fontRef>
+                  </p:style>
+                </p:cxnSp>
+                <p:cxnSp>
+                  <p:nvCxnSpPr>
+                    <p:cNvPr id="208" name="Connettore diritto 207">
+                      <a:extLst>
+                        <a:ext uri="{FF2B5EF4-FFF2-40B4-BE49-F238E27FC236}">
+                          <a16:creationId xmlns:a16="http://schemas.microsoft.com/office/drawing/2014/main" id="{1FF521A5-BED2-482B-BBE6-A37E60E836C8}"/>
+                        </a:ext>
+                      </a:extLst>
+                    </p:cNvPr>
+                    <p:cNvCxnSpPr/>
+                    <p:nvPr/>
+                  </p:nvCxnSpPr>
+                  <p:spPr>
+                    <a:xfrm flipV="1">
+                      <a:off x="0" y="143124"/>
+                      <a:ext cx="117475" cy="165100"/>
+                    </a:xfrm>
+                    <a:prstGeom prst="line">
+                      <a:avLst/>
+                    </a:prstGeom>
+                    <a:ln w="38100"/>
+                  </p:spPr>
+                  <p:style>
+                    <a:lnRef idx="1">
+                      <a:schemeClr val="dk1"/>
+                    </a:lnRef>
+                    <a:fillRef idx="0">
+                      <a:schemeClr val="dk1"/>
+                    </a:fillRef>
+                    <a:effectRef idx="0">
+                      <a:schemeClr val="dk1"/>
+                    </a:effectRef>
+                    <a:fontRef idx="minor">
+                      <a:schemeClr val="tx1"/>
+                    </a:fontRef>
+                  </p:style>
+                </p:cxnSp>
+              </p:grpSp>
+              <p:grpSp>
+                <p:nvGrpSpPr>
+                  <p:cNvPr id="191" name="Gruppo 190">
+                    <a:extLst>
+                      <a:ext uri="{FF2B5EF4-FFF2-40B4-BE49-F238E27FC236}">
+                        <a16:creationId xmlns:a16="http://schemas.microsoft.com/office/drawing/2014/main" id="{044B5DCA-C889-4248-8FA4-0567B18C31A2}"/>
+                      </a:ext>
+                    </a:extLst>
+                  </p:cNvPr>
+                  <p:cNvGrpSpPr/>
+                  <p:nvPr/>
+                </p:nvGrpSpPr>
+                <p:grpSpPr>
+                  <a:xfrm>
+                    <a:off x="100561" y="7016"/>
+                    <a:ext cx="118745" cy="308224"/>
+                    <a:chOff x="0" y="0"/>
+                    <a:chExt cx="118745" cy="308224"/>
+                  </a:xfrm>
+                </p:grpSpPr>
+                <p:cxnSp>
+                  <p:nvCxnSpPr>
+                    <p:cNvPr id="205" name="Connettore diritto 204">
+                      <a:extLst>
+                        <a:ext uri="{FF2B5EF4-FFF2-40B4-BE49-F238E27FC236}">
+                          <a16:creationId xmlns:a16="http://schemas.microsoft.com/office/drawing/2014/main" id="{201449A9-17D7-4799-869A-A48C2AD02708}"/>
+                        </a:ext>
+                      </a:extLst>
+                    </p:cNvPr>
+                    <p:cNvCxnSpPr/>
+                    <p:nvPr/>
+                  </p:nvCxnSpPr>
+                  <p:spPr>
+                    <a:xfrm>
+                      <a:off x="0" y="0"/>
+                      <a:ext cx="118745" cy="158750"/>
+                    </a:xfrm>
+                    <a:prstGeom prst="line">
+                      <a:avLst/>
+                    </a:prstGeom>
+                    <a:ln w="38100"/>
+                  </p:spPr>
+                  <p:style>
+                    <a:lnRef idx="1">
+                      <a:schemeClr val="dk1"/>
+                    </a:lnRef>
+                    <a:fillRef idx="0">
+                      <a:schemeClr val="dk1"/>
+                    </a:fillRef>
+                    <a:effectRef idx="0">
+                      <a:schemeClr val="dk1"/>
+                    </a:effectRef>
+                    <a:fontRef idx="minor">
+                      <a:schemeClr val="tx1"/>
+                    </a:fontRef>
+                  </p:style>
+                </p:cxnSp>
+                <p:cxnSp>
+                  <p:nvCxnSpPr>
+                    <p:cNvPr id="206" name="Connettore diritto 205">
+                      <a:extLst>
+                        <a:ext uri="{FF2B5EF4-FFF2-40B4-BE49-F238E27FC236}">
+                          <a16:creationId xmlns:a16="http://schemas.microsoft.com/office/drawing/2014/main" id="{93A13F7C-745E-4AC0-A642-95553F1392FD}"/>
+                        </a:ext>
+                      </a:extLst>
+                    </p:cNvPr>
+                    <p:cNvCxnSpPr/>
+                    <p:nvPr/>
+                  </p:nvCxnSpPr>
+                  <p:spPr>
+                    <a:xfrm flipV="1">
+                      <a:off x="0" y="143124"/>
+                      <a:ext cx="117475" cy="165100"/>
+                    </a:xfrm>
+                    <a:prstGeom prst="line">
+                      <a:avLst/>
+                    </a:prstGeom>
+                    <a:ln w="38100"/>
+                  </p:spPr>
+                  <p:style>
+                    <a:lnRef idx="1">
+                      <a:schemeClr val="dk1"/>
+                    </a:lnRef>
+                    <a:fillRef idx="0">
+                      <a:schemeClr val="dk1"/>
+                    </a:fillRef>
+                    <a:effectRef idx="0">
+                      <a:schemeClr val="dk1"/>
+                    </a:effectRef>
+                    <a:fontRef idx="minor">
+                      <a:schemeClr val="tx1"/>
+                    </a:fontRef>
+                  </p:style>
+                </p:cxnSp>
+              </p:grpSp>
+              <p:grpSp>
+                <p:nvGrpSpPr>
+                  <p:cNvPr id="192" name="Gruppo 191">
+                    <a:extLst>
+                      <a:ext uri="{FF2B5EF4-FFF2-40B4-BE49-F238E27FC236}">
+                        <a16:creationId xmlns:a16="http://schemas.microsoft.com/office/drawing/2014/main" id="{FB9F4E98-067A-4E8C-A9F3-615B77700B03}"/>
+                      </a:ext>
+                    </a:extLst>
+                  </p:cNvPr>
+                  <p:cNvGrpSpPr/>
+                  <p:nvPr/>
+                </p:nvGrpSpPr>
+                <p:grpSpPr>
+                  <a:xfrm>
+                    <a:off x="210476" y="2339"/>
+                    <a:ext cx="118745" cy="308224"/>
+                    <a:chOff x="0" y="0"/>
+                    <a:chExt cx="118745" cy="308224"/>
+                  </a:xfrm>
+                </p:grpSpPr>
+                <p:cxnSp>
+                  <p:nvCxnSpPr>
+                    <p:cNvPr id="203" name="Connettore diritto 202">
+                      <a:extLst>
+                        <a:ext uri="{FF2B5EF4-FFF2-40B4-BE49-F238E27FC236}">
+                          <a16:creationId xmlns:a16="http://schemas.microsoft.com/office/drawing/2014/main" id="{9778CDA3-B3B2-426C-BA75-990A4D1D2B31}"/>
+                        </a:ext>
+                      </a:extLst>
+                    </p:cNvPr>
+                    <p:cNvCxnSpPr/>
+                    <p:nvPr/>
+                  </p:nvCxnSpPr>
+                  <p:spPr>
+                    <a:xfrm>
+                      <a:off x="0" y="0"/>
+                      <a:ext cx="118745" cy="158750"/>
+                    </a:xfrm>
+                    <a:prstGeom prst="line">
+                      <a:avLst/>
+                    </a:prstGeom>
+                    <a:ln w="38100"/>
+                  </p:spPr>
+                  <p:style>
+                    <a:lnRef idx="1">
+                      <a:schemeClr val="dk1"/>
+                    </a:lnRef>
+                    <a:fillRef idx="0">
+                      <a:schemeClr val="dk1"/>
+                    </a:fillRef>
+                    <a:effectRef idx="0">
+                      <a:schemeClr val="dk1"/>
+                    </a:effectRef>
+                    <a:fontRef idx="minor">
+                      <a:schemeClr val="tx1"/>
+                    </a:fontRef>
+                  </p:style>
+                </p:cxnSp>
+                <p:cxnSp>
+                  <p:nvCxnSpPr>
+                    <p:cNvPr id="204" name="Connettore diritto 203">
+                      <a:extLst>
+                        <a:ext uri="{FF2B5EF4-FFF2-40B4-BE49-F238E27FC236}">
+                          <a16:creationId xmlns:a16="http://schemas.microsoft.com/office/drawing/2014/main" id="{D71AA374-0803-4F03-9520-A03355E19E26}"/>
+                        </a:ext>
+                      </a:extLst>
+                    </p:cNvPr>
+                    <p:cNvCxnSpPr/>
+                    <p:nvPr/>
+                  </p:nvCxnSpPr>
+                  <p:spPr>
+                    <a:xfrm flipV="1">
+                      <a:off x="0" y="143124"/>
+                      <a:ext cx="117475" cy="165100"/>
+                    </a:xfrm>
+                    <a:prstGeom prst="line">
+                      <a:avLst/>
+                    </a:prstGeom>
+                    <a:ln w="38100"/>
+                  </p:spPr>
+                  <p:style>
+                    <a:lnRef idx="1">
+                      <a:schemeClr val="dk1"/>
+                    </a:lnRef>
+                    <a:fillRef idx="0">
+                      <a:schemeClr val="dk1"/>
+                    </a:fillRef>
+                    <a:effectRef idx="0">
+                      <a:schemeClr val="dk1"/>
+                    </a:effectRef>
+                    <a:fontRef idx="minor">
+                      <a:schemeClr val="tx1"/>
+                    </a:fontRef>
+                  </p:style>
+                </p:cxnSp>
+              </p:grpSp>
+              <p:grpSp>
+                <p:nvGrpSpPr>
+                  <p:cNvPr id="193" name="Gruppo 192">
+                    <a:extLst>
+                      <a:ext uri="{FF2B5EF4-FFF2-40B4-BE49-F238E27FC236}">
+                        <a16:creationId xmlns:a16="http://schemas.microsoft.com/office/drawing/2014/main" id="{9B44F0FE-FF98-48E5-9E81-6FD292FC4C79}"/>
+                      </a:ext>
+                    </a:extLst>
+                  </p:cNvPr>
+                  <p:cNvGrpSpPr/>
+                  <p:nvPr/>
+                </p:nvGrpSpPr>
+                <p:grpSpPr>
+                  <a:xfrm>
+                    <a:off x="332084" y="0"/>
+                    <a:ext cx="118745" cy="308224"/>
+                    <a:chOff x="0" y="0"/>
+                    <a:chExt cx="118745" cy="308224"/>
+                  </a:xfrm>
+                </p:grpSpPr>
+                <p:cxnSp>
+                  <p:nvCxnSpPr>
+                    <p:cNvPr id="201" name="Connettore diritto 200">
+                      <a:extLst>
+                        <a:ext uri="{FF2B5EF4-FFF2-40B4-BE49-F238E27FC236}">
+                          <a16:creationId xmlns:a16="http://schemas.microsoft.com/office/drawing/2014/main" id="{A25E2E5F-B72F-4EC3-8C4F-06FE2869F2F4}"/>
+                        </a:ext>
+                      </a:extLst>
+                    </p:cNvPr>
+                    <p:cNvCxnSpPr/>
+                    <p:nvPr/>
+                  </p:nvCxnSpPr>
+                  <p:spPr>
+                    <a:xfrm>
+                      <a:off x="0" y="0"/>
+                      <a:ext cx="118745" cy="158750"/>
+                    </a:xfrm>
+                    <a:prstGeom prst="line">
+                      <a:avLst/>
+                    </a:prstGeom>
+                    <a:ln w="38100"/>
+                  </p:spPr>
+                  <p:style>
+                    <a:lnRef idx="1">
+                      <a:schemeClr val="dk1"/>
+                    </a:lnRef>
+                    <a:fillRef idx="0">
+                      <a:schemeClr val="dk1"/>
+                    </a:fillRef>
+                    <a:effectRef idx="0">
+                      <a:schemeClr val="dk1"/>
+                    </a:effectRef>
+                    <a:fontRef idx="minor">
+                      <a:schemeClr val="tx1"/>
+                    </a:fontRef>
+                  </p:style>
+                </p:cxnSp>
+                <p:cxnSp>
+                  <p:nvCxnSpPr>
+                    <p:cNvPr id="202" name="Connettore diritto 201">
+                      <a:extLst>
+                        <a:ext uri="{FF2B5EF4-FFF2-40B4-BE49-F238E27FC236}">
+                          <a16:creationId xmlns:a16="http://schemas.microsoft.com/office/drawing/2014/main" id="{1BCB1E44-5DC7-49B2-A7D6-6367741658D0}"/>
+                        </a:ext>
+                      </a:extLst>
+                    </p:cNvPr>
+                    <p:cNvCxnSpPr/>
+                    <p:nvPr/>
+                  </p:nvCxnSpPr>
+                  <p:spPr>
+                    <a:xfrm flipV="1">
+                      <a:off x="0" y="143124"/>
+                      <a:ext cx="117475" cy="165100"/>
+                    </a:xfrm>
+                    <a:prstGeom prst="line">
+                      <a:avLst/>
+                    </a:prstGeom>
+                    <a:ln w="38100"/>
+                  </p:spPr>
+                  <p:style>
+                    <a:lnRef idx="1">
+                      <a:schemeClr val="dk1"/>
+                    </a:lnRef>
+                    <a:fillRef idx="0">
+                      <a:schemeClr val="dk1"/>
+                    </a:fillRef>
+                    <a:effectRef idx="0">
+                      <a:schemeClr val="dk1"/>
+                    </a:effectRef>
+                    <a:fontRef idx="minor">
+                      <a:schemeClr val="tx1"/>
+                    </a:fontRef>
+                  </p:style>
+                </p:cxnSp>
+              </p:grpSp>
+              <p:grpSp>
+                <p:nvGrpSpPr>
+                  <p:cNvPr id="194" name="Gruppo 193">
+                    <a:extLst>
+                      <a:ext uri="{FF2B5EF4-FFF2-40B4-BE49-F238E27FC236}">
+                        <a16:creationId xmlns:a16="http://schemas.microsoft.com/office/drawing/2014/main" id="{DB95027D-69D7-4254-B608-C484C0BCECC1}"/>
+                      </a:ext>
+                    </a:extLst>
+                  </p:cNvPr>
+                  <p:cNvGrpSpPr/>
+                  <p:nvPr/>
+                </p:nvGrpSpPr>
+                <p:grpSpPr>
+                  <a:xfrm>
+                    <a:off x="451354" y="0"/>
+                    <a:ext cx="118745" cy="308224"/>
+                    <a:chOff x="0" y="0"/>
+                    <a:chExt cx="118745" cy="308224"/>
+                  </a:xfrm>
+                </p:grpSpPr>
+                <p:cxnSp>
+                  <p:nvCxnSpPr>
+                    <p:cNvPr id="198" name="Connettore diritto 197">
+                      <a:extLst>
+                        <a:ext uri="{FF2B5EF4-FFF2-40B4-BE49-F238E27FC236}">
+                          <a16:creationId xmlns:a16="http://schemas.microsoft.com/office/drawing/2014/main" id="{FEE36B9B-5967-4887-BBAE-D24A27AEC7CC}"/>
+                        </a:ext>
+                      </a:extLst>
+                    </p:cNvPr>
+                    <p:cNvCxnSpPr/>
+                    <p:nvPr/>
+                  </p:nvCxnSpPr>
+                  <p:spPr>
+                    <a:xfrm>
+                      <a:off x="0" y="0"/>
+                      <a:ext cx="118745" cy="158750"/>
+                    </a:xfrm>
+                    <a:prstGeom prst="line">
+                      <a:avLst/>
+                    </a:prstGeom>
+                    <a:ln w="38100"/>
+                  </p:spPr>
+                  <p:style>
+                    <a:lnRef idx="1">
+                      <a:schemeClr val="dk1"/>
+                    </a:lnRef>
+                    <a:fillRef idx="0">
+                      <a:schemeClr val="dk1"/>
+                    </a:fillRef>
+                    <a:effectRef idx="0">
+                      <a:schemeClr val="dk1"/>
+                    </a:effectRef>
+                    <a:fontRef idx="minor">
+                      <a:schemeClr val="tx1"/>
+                    </a:fontRef>
+                  </p:style>
+                </p:cxnSp>
+                <p:cxnSp>
+                  <p:nvCxnSpPr>
+                    <p:cNvPr id="200" name="Connettore diritto 199">
+                      <a:extLst>
+                        <a:ext uri="{FF2B5EF4-FFF2-40B4-BE49-F238E27FC236}">
+                          <a16:creationId xmlns:a16="http://schemas.microsoft.com/office/drawing/2014/main" id="{53585896-5E5C-4F03-8450-52F46CBD4C7B}"/>
+                        </a:ext>
+                      </a:extLst>
+                    </p:cNvPr>
+                    <p:cNvCxnSpPr/>
+                    <p:nvPr/>
+                  </p:nvCxnSpPr>
+                  <p:spPr>
+                    <a:xfrm flipV="1">
+                      <a:off x="0" y="143124"/>
+                      <a:ext cx="117475" cy="165100"/>
+                    </a:xfrm>
+                    <a:prstGeom prst="line">
+                      <a:avLst/>
+                    </a:prstGeom>
+                    <a:ln w="38100"/>
+                  </p:spPr>
+                  <p:style>
+                    <a:lnRef idx="1">
+                      <a:schemeClr val="dk1"/>
+                    </a:lnRef>
+                    <a:fillRef idx="0">
+                      <a:schemeClr val="dk1"/>
+                    </a:fillRef>
+                    <a:effectRef idx="0">
+                      <a:schemeClr val="dk1"/>
+                    </a:effectRef>
+                    <a:fontRef idx="minor">
+                      <a:schemeClr val="tx1"/>
+                    </a:fontRef>
+                  </p:style>
+                </p:cxnSp>
+              </p:grpSp>
+              <p:grpSp>
+                <p:nvGrpSpPr>
+                  <p:cNvPr id="195" name="Gruppo 194">
+                    <a:extLst>
+                      <a:ext uri="{FF2B5EF4-FFF2-40B4-BE49-F238E27FC236}">
+                        <a16:creationId xmlns:a16="http://schemas.microsoft.com/office/drawing/2014/main" id="{90B1B7A8-11E7-477B-9CE4-5373189BAF27}"/>
+                      </a:ext>
+                    </a:extLst>
+                  </p:cNvPr>
+                  <p:cNvGrpSpPr/>
+                  <p:nvPr/>
+                </p:nvGrpSpPr>
+                <p:grpSpPr>
+                  <a:xfrm>
+                    <a:off x="0" y="7016"/>
+                    <a:ext cx="118745" cy="308224"/>
+                    <a:chOff x="0" y="0"/>
+                    <a:chExt cx="118745" cy="308224"/>
+                  </a:xfrm>
+                </p:grpSpPr>
+                <p:cxnSp>
+                  <p:nvCxnSpPr>
+                    <p:cNvPr id="196" name="Connettore diritto 195">
+                      <a:extLst>
+                        <a:ext uri="{FF2B5EF4-FFF2-40B4-BE49-F238E27FC236}">
+                          <a16:creationId xmlns:a16="http://schemas.microsoft.com/office/drawing/2014/main" id="{3DB6955C-0891-4703-BCD4-F7D4032B9E4A}"/>
+                        </a:ext>
+                      </a:extLst>
+                    </p:cNvPr>
+                    <p:cNvCxnSpPr/>
+                    <p:nvPr/>
+                  </p:nvCxnSpPr>
+                  <p:spPr>
+                    <a:xfrm>
+                      <a:off x="0" y="0"/>
+                      <a:ext cx="118745" cy="158750"/>
+                    </a:xfrm>
+                    <a:prstGeom prst="line">
+                      <a:avLst/>
+                    </a:prstGeom>
+                    <a:ln w="38100"/>
+                  </p:spPr>
+                  <p:style>
+                    <a:lnRef idx="1">
+                      <a:schemeClr val="dk1"/>
+                    </a:lnRef>
+                    <a:fillRef idx="0">
+                      <a:schemeClr val="dk1"/>
+                    </a:fillRef>
+                    <a:effectRef idx="0">
+                      <a:schemeClr val="dk1"/>
+                    </a:effectRef>
+                    <a:fontRef idx="minor">
+                      <a:schemeClr val="tx1"/>
+                    </a:fontRef>
+                  </p:style>
+                </p:cxnSp>
+                <p:cxnSp>
+                  <p:nvCxnSpPr>
+                    <p:cNvPr id="197" name="Connettore diritto 196">
+                      <a:extLst>
+                        <a:ext uri="{FF2B5EF4-FFF2-40B4-BE49-F238E27FC236}">
+                          <a16:creationId xmlns:a16="http://schemas.microsoft.com/office/drawing/2014/main" id="{E30F6426-D0AF-43AA-B577-C56DEE60E076}"/>
+                        </a:ext>
+                      </a:extLst>
+                    </p:cNvPr>
+                    <p:cNvCxnSpPr/>
+                    <p:nvPr/>
+                  </p:nvCxnSpPr>
+                  <p:spPr>
+                    <a:xfrm flipV="1">
+                      <a:off x="0" y="143124"/>
+                      <a:ext cx="117475" cy="165100"/>
+                    </a:xfrm>
+                    <a:prstGeom prst="line">
+                      <a:avLst/>
+                    </a:prstGeom>
+                    <a:ln w="38100"/>
+                  </p:spPr>
+                  <p:style>
+                    <a:lnRef idx="1">
+                      <a:schemeClr val="dk1"/>
+                    </a:lnRef>
+                    <a:fillRef idx="0">
+                      <a:schemeClr val="dk1"/>
+                    </a:fillRef>
+                    <a:effectRef idx="0">
+                      <a:schemeClr val="dk1"/>
+                    </a:effectRef>
+                    <a:fontRef idx="minor">
+                      <a:schemeClr val="tx1"/>
+                    </a:fontRef>
+                  </p:style>
+                </p:cxnSp>
+              </p:grpSp>
+            </p:grpSp>
+            <p:grpSp>
+              <p:nvGrpSpPr>
+                <p:cNvPr id="167" name="Gruppo 166">
+                  <a:extLst>
+                    <a:ext uri="{FF2B5EF4-FFF2-40B4-BE49-F238E27FC236}">
+                      <a16:creationId xmlns:a16="http://schemas.microsoft.com/office/drawing/2014/main" id="{68D9995B-47AF-4D99-9ABA-1DFF17CE4780}"/>
+                    </a:ext>
+                  </a:extLst>
+                </p:cNvPr>
+                <p:cNvGrpSpPr/>
+                <p:nvPr/>
+              </p:nvGrpSpPr>
+              <p:grpSpPr>
+                <a:xfrm>
+                  <a:off x="198783" y="0"/>
+                  <a:ext cx="687030" cy="315240"/>
+                  <a:chOff x="0" y="0"/>
+                  <a:chExt cx="687030" cy="315240"/>
+                </a:xfrm>
+              </p:grpSpPr>
+              <p:grpSp>
+                <p:nvGrpSpPr>
+                  <p:cNvPr id="168" name="Gruppo 167">
+                    <a:extLst>
+                      <a:ext uri="{FF2B5EF4-FFF2-40B4-BE49-F238E27FC236}">
+                        <a16:creationId xmlns:a16="http://schemas.microsoft.com/office/drawing/2014/main" id="{E14AD341-932C-456F-A595-EAFA545DB268}"/>
+                      </a:ext>
+                    </a:extLst>
+                  </p:cNvPr>
+                  <p:cNvGrpSpPr/>
+                  <p:nvPr/>
+                </p:nvGrpSpPr>
+                <p:grpSpPr>
+                  <a:xfrm>
+                    <a:off x="568285" y="2339"/>
+                    <a:ext cx="118745" cy="308224"/>
+                    <a:chOff x="0" y="0"/>
+                    <a:chExt cx="118745" cy="308224"/>
+                  </a:xfrm>
+                </p:grpSpPr>
+                <p:cxnSp>
+                  <p:nvCxnSpPr>
+                    <p:cNvPr id="188" name="Connettore diritto 187">
+                      <a:extLst>
+                        <a:ext uri="{FF2B5EF4-FFF2-40B4-BE49-F238E27FC236}">
+                          <a16:creationId xmlns:a16="http://schemas.microsoft.com/office/drawing/2014/main" id="{8931776F-9B2A-4D55-A467-432276B41262}"/>
+                        </a:ext>
+                      </a:extLst>
+                    </p:cNvPr>
+                    <p:cNvCxnSpPr/>
+                    <p:nvPr/>
+                  </p:nvCxnSpPr>
+                  <p:spPr>
+                    <a:xfrm>
+                      <a:off x="0" y="0"/>
+                      <a:ext cx="118745" cy="158750"/>
+                    </a:xfrm>
+                    <a:prstGeom prst="line">
+                      <a:avLst/>
+                    </a:prstGeom>
+                    <a:ln w="38100"/>
+                  </p:spPr>
+                  <p:style>
+                    <a:lnRef idx="1">
+                      <a:schemeClr val="dk1"/>
+                    </a:lnRef>
+                    <a:fillRef idx="0">
+                      <a:schemeClr val="dk1"/>
+                    </a:fillRef>
+                    <a:effectRef idx="0">
+                      <a:schemeClr val="dk1"/>
+                    </a:effectRef>
+                    <a:fontRef idx="minor">
+                      <a:schemeClr val="tx1"/>
+                    </a:fontRef>
+                  </p:style>
+                </p:cxnSp>
+                <p:cxnSp>
+                  <p:nvCxnSpPr>
+                    <p:cNvPr id="189" name="Connettore diritto 188">
+                      <a:extLst>
+                        <a:ext uri="{FF2B5EF4-FFF2-40B4-BE49-F238E27FC236}">
+                          <a16:creationId xmlns:a16="http://schemas.microsoft.com/office/drawing/2014/main" id="{CF6200CF-449B-4F22-AD54-4829E4193857}"/>
+                        </a:ext>
+                      </a:extLst>
+                    </p:cNvPr>
+                    <p:cNvCxnSpPr/>
+                    <p:nvPr/>
+                  </p:nvCxnSpPr>
+                  <p:spPr>
+                    <a:xfrm flipV="1">
+                      <a:off x="0" y="143124"/>
+                      <a:ext cx="117475" cy="165100"/>
+                    </a:xfrm>
+                    <a:prstGeom prst="line">
+                      <a:avLst/>
+                    </a:prstGeom>
+                    <a:ln w="38100"/>
+                  </p:spPr>
+                  <p:style>
+                    <a:lnRef idx="1">
+                      <a:schemeClr val="dk1"/>
+                    </a:lnRef>
+                    <a:fillRef idx="0">
+                      <a:schemeClr val="dk1"/>
+                    </a:fillRef>
+                    <a:effectRef idx="0">
+                      <a:schemeClr val="dk1"/>
+                    </a:effectRef>
+                    <a:fontRef idx="minor">
+                      <a:schemeClr val="tx1"/>
+                    </a:fontRef>
+                  </p:style>
+                </p:cxnSp>
+              </p:grpSp>
+              <p:grpSp>
+                <p:nvGrpSpPr>
+                  <p:cNvPr id="171" name="Gruppo 170">
+                    <a:extLst>
+                      <a:ext uri="{FF2B5EF4-FFF2-40B4-BE49-F238E27FC236}">
+                        <a16:creationId xmlns:a16="http://schemas.microsoft.com/office/drawing/2014/main" id="{BAA39E53-05B1-40BA-B790-1E5E1E422E5F}"/>
+                      </a:ext>
+                    </a:extLst>
+                  </p:cNvPr>
+                  <p:cNvGrpSpPr/>
+                  <p:nvPr/>
+                </p:nvGrpSpPr>
+                <p:grpSpPr>
+                  <a:xfrm>
+                    <a:off x="100561" y="7016"/>
+                    <a:ext cx="118745" cy="308224"/>
+                    <a:chOff x="0" y="0"/>
+                    <a:chExt cx="118745" cy="308224"/>
+                  </a:xfrm>
+                </p:grpSpPr>
+                <p:cxnSp>
+                  <p:nvCxnSpPr>
+                    <p:cNvPr id="186" name="Connettore diritto 185">
+                      <a:extLst>
+                        <a:ext uri="{FF2B5EF4-FFF2-40B4-BE49-F238E27FC236}">
+                          <a16:creationId xmlns:a16="http://schemas.microsoft.com/office/drawing/2014/main" id="{A0F5D43D-6B3C-4857-B4F2-6F0ADB8C0889}"/>
+                        </a:ext>
+                      </a:extLst>
+                    </p:cNvPr>
+                    <p:cNvCxnSpPr/>
+                    <p:nvPr/>
+                  </p:nvCxnSpPr>
+                  <p:spPr>
+                    <a:xfrm>
+                      <a:off x="0" y="0"/>
+                      <a:ext cx="118745" cy="158750"/>
+                    </a:xfrm>
+                    <a:prstGeom prst="line">
+                      <a:avLst/>
+                    </a:prstGeom>
+                    <a:ln w="38100"/>
+                  </p:spPr>
+                  <p:style>
+                    <a:lnRef idx="1">
+                      <a:schemeClr val="dk1"/>
+                    </a:lnRef>
+                    <a:fillRef idx="0">
+                      <a:schemeClr val="dk1"/>
+                    </a:fillRef>
+                    <a:effectRef idx="0">
+                      <a:schemeClr val="dk1"/>
+                    </a:effectRef>
+                    <a:fontRef idx="minor">
+                      <a:schemeClr val="tx1"/>
+                    </a:fontRef>
+                  </p:style>
+                </p:cxnSp>
+                <p:cxnSp>
+                  <p:nvCxnSpPr>
+                    <p:cNvPr id="187" name="Connettore diritto 186">
+                      <a:extLst>
+                        <a:ext uri="{FF2B5EF4-FFF2-40B4-BE49-F238E27FC236}">
+                          <a16:creationId xmlns:a16="http://schemas.microsoft.com/office/drawing/2014/main" id="{12EEC4DC-1BEB-478A-A598-6AA58826DD92}"/>
+                        </a:ext>
+                      </a:extLst>
+                    </p:cNvPr>
+                    <p:cNvCxnSpPr/>
+                    <p:nvPr/>
+                  </p:nvCxnSpPr>
+                  <p:spPr>
+                    <a:xfrm flipV="1">
+                      <a:off x="0" y="143124"/>
+                      <a:ext cx="117475" cy="165100"/>
+                    </a:xfrm>
+                    <a:prstGeom prst="line">
+                      <a:avLst/>
+                    </a:prstGeom>
+                    <a:ln w="38100"/>
+                  </p:spPr>
+                  <p:style>
+                    <a:lnRef idx="1">
+                      <a:schemeClr val="dk1"/>
+                    </a:lnRef>
+                    <a:fillRef idx="0">
+                      <a:schemeClr val="dk1"/>
+                    </a:fillRef>
+                    <a:effectRef idx="0">
+                      <a:schemeClr val="dk1"/>
+                    </a:effectRef>
+                    <a:fontRef idx="minor">
+                      <a:schemeClr val="tx1"/>
+                    </a:fontRef>
+                  </p:style>
+                </p:cxnSp>
+              </p:grpSp>
+              <p:grpSp>
+                <p:nvGrpSpPr>
+                  <p:cNvPr id="172" name="Gruppo 171">
+                    <a:extLst>
+                      <a:ext uri="{FF2B5EF4-FFF2-40B4-BE49-F238E27FC236}">
+                        <a16:creationId xmlns:a16="http://schemas.microsoft.com/office/drawing/2014/main" id="{BAA98261-1C7E-402D-8292-6E700E21E096}"/>
+                      </a:ext>
+                    </a:extLst>
+                  </p:cNvPr>
+                  <p:cNvGrpSpPr/>
+                  <p:nvPr/>
+                </p:nvGrpSpPr>
+                <p:grpSpPr>
+                  <a:xfrm>
+                    <a:off x="210476" y="2339"/>
+                    <a:ext cx="118745" cy="308224"/>
+                    <a:chOff x="0" y="0"/>
+                    <a:chExt cx="118745" cy="308224"/>
+                  </a:xfrm>
+                </p:grpSpPr>
+                <p:cxnSp>
+                  <p:nvCxnSpPr>
+                    <p:cNvPr id="184" name="Connettore diritto 183">
+                      <a:extLst>
+                        <a:ext uri="{FF2B5EF4-FFF2-40B4-BE49-F238E27FC236}">
+                          <a16:creationId xmlns:a16="http://schemas.microsoft.com/office/drawing/2014/main" id="{542F0787-63FA-406F-B812-E0AD10D98C47}"/>
+                        </a:ext>
+                      </a:extLst>
+                    </p:cNvPr>
+                    <p:cNvCxnSpPr/>
+                    <p:nvPr/>
+                  </p:nvCxnSpPr>
+                  <p:spPr>
+                    <a:xfrm>
+                      <a:off x="0" y="0"/>
+                      <a:ext cx="118745" cy="158750"/>
+                    </a:xfrm>
+                    <a:prstGeom prst="line">
+                      <a:avLst/>
+                    </a:prstGeom>
+                    <a:ln w="38100"/>
+                  </p:spPr>
+                  <p:style>
+                    <a:lnRef idx="1">
+                      <a:schemeClr val="dk1"/>
+                    </a:lnRef>
+                    <a:fillRef idx="0">
+                      <a:schemeClr val="dk1"/>
+                    </a:fillRef>
+                    <a:effectRef idx="0">
+                      <a:schemeClr val="dk1"/>
+                    </a:effectRef>
+                    <a:fontRef idx="minor">
+                      <a:schemeClr val="tx1"/>
+                    </a:fontRef>
+                  </p:style>
+                </p:cxnSp>
+                <p:cxnSp>
+                  <p:nvCxnSpPr>
+                    <p:cNvPr id="185" name="Connettore diritto 184">
+                      <a:extLst>
+                        <a:ext uri="{FF2B5EF4-FFF2-40B4-BE49-F238E27FC236}">
+                          <a16:creationId xmlns:a16="http://schemas.microsoft.com/office/drawing/2014/main" id="{467C4C59-25E6-46B4-94B8-8B459C68BAD5}"/>
+                        </a:ext>
+                      </a:extLst>
+                    </p:cNvPr>
+                    <p:cNvCxnSpPr/>
+                    <p:nvPr/>
+                  </p:nvCxnSpPr>
+                  <p:spPr>
+                    <a:xfrm flipV="1">
+                      <a:off x="0" y="143124"/>
+                      <a:ext cx="117475" cy="165100"/>
+                    </a:xfrm>
+                    <a:prstGeom prst="line">
+                      <a:avLst/>
+                    </a:prstGeom>
+                    <a:ln w="38100"/>
+                  </p:spPr>
+                  <p:style>
+                    <a:lnRef idx="1">
+                      <a:schemeClr val="dk1"/>
+                    </a:lnRef>
+                    <a:fillRef idx="0">
+                      <a:schemeClr val="dk1"/>
+                    </a:fillRef>
+                    <a:effectRef idx="0">
+                      <a:schemeClr val="dk1"/>
+                    </a:effectRef>
+                    <a:fontRef idx="minor">
+                      <a:schemeClr val="tx1"/>
+                    </a:fontRef>
+                  </p:style>
+                </p:cxnSp>
+              </p:grpSp>
+              <p:grpSp>
+                <p:nvGrpSpPr>
+                  <p:cNvPr id="173" name="Gruppo 172">
+                    <a:extLst>
+                      <a:ext uri="{FF2B5EF4-FFF2-40B4-BE49-F238E27FC236}">
+                        <a16:creationId xmlns:a16="http://schemas.microsoft.com/office/drawing/2014/main" id="{2629D92E-8870-4779-84B3-26FEAAD3BE49}"/>
+                      </a:ext>
+                    </a:extLst>
+                  </p:cNvPr>
+                  <p:cNvGrpSpPr/>
+                  <p:nvPr/>
+                </p:nvGrpSpPr>
+                <p:grpSpPr>
+                  <a:xfrm>
+                    <a:off x="332084" y="0"/>
+                    <a:ext cx="118745" cy="308224"/>
+                    <a:chOff x="0" y="0"/>
+                    <a:chExt cx="118745" cy="308224"/>
+                  </a:xfrm>
+                </p:grpSpPr>
+                <p:cxnSp>
+                  <p:nvCxnSpPr>
+                    <p:cNvPr id="182" name="Connettore diritto 181">
+                      <a:extLst>
+                        <a:ext uri="{FF2B5EF4-FFF2-40B4-BE49-F238E27FC236}">
+                          <a16:creationId xmlns:a16="http://schemas.microsoft.com/office/drawing/2014/main" id="{38ACDA75-7C95-41C8-9426-D13ECDDAC5A5}"/>
+                        </a:ext>
+                      </a:extLst>
+                    </p:cNvPr>
+                    <p:cNvCxnSpPr/>
+                    <p:nvPr/>
+                  </p:nvCxnSpPr>
+                  <p:spPr>
+                    <a:xfrm>
+                      <a:off x="0" y="0"/>
+                      <a:ext cx="118745" cy="158750"/>
+                    </a:xfrm>
+                    <a:prstGeom prst="line">
+                      <a:avLst/>
+                    </a:prstGeom>
+                    <a:ln w="38100"/>
+                  </p:spPr>
+                  <p:style>
+                    <a:lnRef idx="1">
+                      <a:schemeClr val="dk1"/>
+                    </a:lnRef>
+                    <a:fillRef idx="0">
+                      <a:schemeClr val="dk1"/>
+                    </a:fillRef>
+                    <a:effectRef idx="0">
+                      <a:schemeClr val="dk1"/>
+                    </a:effectRef>
+                    <a:fontRef idx="minor">
+                      <a:schemeClr val="tx1"/>
+                    </a:fontRef>
+                  </p:style>
+                </p:cxnSp>
+                <p:cxnSp>
+                  <p:nvCxnSpPr>
+                    <p:cNvPr id="183" name="Connettore diritto 182">
+                      <a:extLst>
+                        <a:ext uri="{FF2B5EF4-FFF2-40B4-BE49-F238E27FC236}">
+                          <a16:creationId xmlns:a16="http://schemas.microsoft.com/office/drawing/2014/main" id="{462606AE-F097-4ACC-9FCA-31A9B492F33D}"/>
+                        </a:ext>
+                      </a:extLst>
+                    </p:cNvPr>
+                    <p:cNvCxnSpPr/>
+                    <p:nvPr/>
+                  </p:nvCxnSpPr>
+                  <p:spPr>
+                    <a:xfrm flipV="1">
+                      <a:off x="0" y="143124"/>
+                      <a:ext cx="117475" cy="165100"/>
+                    </a:xfrm>
+                    <a:prstGeom prst="line">
+                      <a:avLst/>
+                    </a:prstGeom>
+                    <a:ln w="38100"/>
+                  </p:spPr>
+                  <p:style>
+                    <a:lnRef idx="1">
+                      <a:schemeClr val="dk1"/>
+                    </a:lnRef>
+                    <a:fillRef idx="0">
+                      <a:schemeClr val="dk1"/>
+                    </a:fillRef>
+                    <a:effectRef idx="0">
+                      <a:schemeClr val="dk1"/>
+                    </a:effectRef>
+                    <a:fontRef idx="minor">
+                      <a:schemeClr val="tx1"/>
+                    </a:fontRef>
+                  </p:style>
+                </p:cxnSp>
+              </p:grpSp>
+              <p:grpSp>
+                <p:nvGrpSpPr>
+                  <p:cNvPr id="174" name="Gruppo 173">
+                    <a:extLst>
+                      <a:ext uri="{FF2B5EF4-FFF2-40B4-BE49-F238E27FC236}">
+                        <a16:creationId xmlns:a16="http://schemas.microsoft.com/office/drawing/2014/main" id="{67837C6F-1602-4EDE-A379-490E25253623}"/>
+                      </a:ext>
+                    </a:extLst>
+                  </p:cNvPr>
+                  <p:cNvGrpSpPr/>
+                  <p:nvPr/>
+                </p:nvGrpSpPr>
+                <p:grpSpPr>
+                  <a:xfrm>
+                    <a:off x="451354" y="0"/>
+                    <a:ext cx="118745" cy="308224"/>
+                    <a:chOff x="0" y="0"/>
+                    <a:chExt cx="118745" cy="308224"/>
+                  </a:xfrm>
+                </p:grpSpPr>
+                <p:cxnSp>
+                  <p:nvCxnSpPr>
+                    <p:cNvPr id="180" name="Connettore diritto 179">
+                      <a:extLst>
+                        <a:ext uri="{FF2B5EF4-FFF2-40B4-BE49-F238E27FC236}">
+                          <a16:creationId xmlns:a16="http://schemas.microsoft.com/office/drawing/2014/main" id="{90055B4E-DACC-4C93-876F-1079802BD720}"/>
+                        </a:ext>
+                      </a:extLst>
+                    </p:cNvPr>
+                    <p:cNvCxnSpPr/>
+                    <p:nvPr/>
+                  </p:nvCxnSpPr>
+                  <p:spPr>
+                    <a:xfrm>
+                      <a:off x="0" y="0"/>
+                      <a:ext cx="118745" cy="158750"/>
+                    </a:xfrm>
+                    <a:prstGeom prst="line">
+                      <a:avLst/>
+                    </a:prstGeom>
+                    <a:ln w="38100"/>
+                  </p:spPr>
+                  <p:style>
+                    <a:lnRef idx="1">
+                      <a:schemeClr val="dk1"/>
+                    </a:lnRef>
+                    <a:fillRef idx="0">
+                      <a:schemeClr val="dk1"/>
+                    </a:fillRef>
+                    <a:effectRef idx="0">
+                      <a:schemeClr val="dk1"/>
+                    </a:effectRef>
+                    <a:fontRef idx="minor">
+                      <a:schemeClr val="tx1"/>
+                    </a:fontRef>
+                  </p:style>
+                </p:cxnSp>
+                <p:cxnSp>
+                  <p:nvCxnSpPr>
+                    <p:cNvPr id="181" name="Connettore diritto 180">
+                      <a:extLst>
+                        <a:ext uri="{FF2B5EF4-FFF2-40B4-BE49-F238E27FC236}">
+                          <a16:creationId xmlns:a16="http://schemas.microsoft.com/office/drawing/2014/main" id="{422BD6C3-97E8-420C-8B70-22649BB428BD}"/>
+                        </a:ext>
+                      </a:extLst>
+                    </p:cNvPr>
+                    <p:cNvCxnSpPr/>
+                    <p:nvPr/>
+                  </p:nvCxnSpPr>
+                  <p:spPr>
+                    <a:xfrm flipV="1">
+                      <a:off x="0" y="143124"/>
+                      <a:ext cx="117475" cy="165100"/>
+                    </a:xfrm>
+                    <a:prstGeom prst="line">
+                      <a:avLst/>
+                    </a:prstGeom>
+                    <a:ln w="38100"/>
+                  </p:spPr>
+                  <p:style>
+                    <a:lnRef idx="1">
+                      <a:schemeClr val="dk1"/>
+                    </a:lnRef>
+                    <a:fillRef idx="0">
+                      <a:schemeClr val="dk1"/>
+                    </a:fillRef>
+                    <a:effectRef idx="0">
+                      <a:schemeClr val="dk1"/>
+                    </a:effectRef>
+                    <a:fontRef idx="minor">
+                      <a:schemeClr val="tx1"/>
+                    </a:fontRef>
+                  </p:style>
+                </p:cxnSp>
+              </p:grpSp>
+              <p:grpSp>
+                <p:nvGrpSpPr>
+                  <p:cNvPr id="175" name="Gruppo 174">
+                    <a:extLst>
+                      <a:ext uri="{FF2B5EF4-FFF2-40B4-BE49-F238E27FC236}">
+                        <a16:creationId xmlns:a16="http://schemas.microsoft.com/office/drawing/2014/main" id="{87712527-BBCC-402D-8792-A31431EEEEB4}"/>
+                      </a:ext>
+                    </a:extLst>
+                  </p:cNvPr>
+                  <p:cNvGrpSpPr/>
+                  <p:nvPr/>
+                </p:nvGrpSpPr>
+                <p:grpSpPr>
+                  <a:xfrm>
+                    <a:off x="0" y="7016"/>
+                    <a:ext cx="118745" cy="308224"/>
+                    <a:chOff x="0" y="0"/>
+                    <a:chExt cx="118745" cy="308224"/>
+                  </a:xfrm>
+                </p:grpSpPr>
+                <p:cxnSp>
+                  <p:nvCxnSpPr>
+                    <p:cNvPr id="178" name="Connettore diritto 177">
+                      <a:extLst>
+                        <a:ext uri="{FF2B5EF4-FFF2-40B4-BE49-F238E27FC236}">
+                          <a16:creationId xmlns:a16="http://schemas.microsoft.com/office/drawing/2014/main" id="{8980E58E-0361-486B-9781-5C0883315E1D}"/>
+                        </a:ext>
+                      </a:extLst>
+                    </p:cNvPr>
+                    <p:cNvCxnSpPr/>
+                    <p:nvPr/>
+                  </p:nvCxnSpPr>
+                  <p:spPr>
+                    <a:xfrm>
+                      <a:off x="0" y="0"/>
+                      <a:ext cx="118745" cy="158750"/>
+                    </a:xfrm>
+                    <a:prstGeom prst="line">
+                      <a:avLst/>
+                    </a:prstGeom>
+                    <a:ln w="38100"/>
+                  </p:spPr>
+                  <p:style>
+                    <a:lnRef idx="1">
+                      <a:schemeClr val="dk1"/>
+                    </a:lnRef>
+                    <a:fillRef idx="0">
+                      <a:schemeClr val="dk1"/>
+                    </a:fillRef>
+                    <a:effectRef idx="0">
+                      <a:schemeClr val="dk1"/>
+                    </a:effectRef>
+                    <a:fontRef idx="minor">
+                      <a:schemeClr val="tx1"/>
+                    </a:fontRef>
+                  </p:style>
+                </p:cxnSp>
+                <p:cxnSp>
+                  <p:nvCxnSpPr>
+                    <p:cNvPr id="179" name="Connettore diritto 178">
+                      <a:extLst>
+                        <a:ext uri="{FF2B5EF4-FFF2-40B4-BE49-F238E27FC236}">
+                          <a16:creationId xmlns:a16="http://schemas.microsoft.com/office/drawing/2014/main" id="{15D08F5D-6CB1-4B5D-B8C7-967EF28E83C5}"/>
+                        </a:ext>
+                      </a:extLst>
+                    </p:cNvPr>
+                    <p:cNvCxnSpPr/>
+                    <p:nvPr/>
+                  </p:nvCxnSpPr>
+                  <p:spPr>
+                    <a:xfrm flipV="1">
+                      <a:off x="0" y="143124"/>
+                      <a:ext cx="117475" cy="165100"/>
+                    </a:xfrm>
+                    <a:prstGeom prst="line">
+                      <a:avLst/>
+                    </a:prstGeom>
+                    <a:ln w="38100"/>
+                  </p:spPr>
+                  <p:style>
+                    <a:lnRef idx="1">
+                      <a:schemeClr val="dk1"/>
+                    </a:lnRef>
+                    <a:fillRef idx="0">
+                      <a:schemeClr val="dk1"/>
+                    </a:fillRef>
+                    <a:effectRef idx="0">
+                      <a:schemeClr val="dk1"/>
+                    </a:effectRef>
+                    <a:fontRef idx="minor">
+                      <a:schemeClr val="tx1"/>
+                    </a:fontRef>
+                  </p:style>
+                </p:cxnSp>
+              </p:grpSp>
+            </p:grpSp>
+          </p:grpSp>
+          <p:cxnSp>
+            <p:nvCxnSpPr>
+              <p:cNvPr id="161" name="Connettore diritto 160">
+                <a:extLst>
+                  <a:ext uri="{FF2B5EF4-FFF2-40B4-BE49-F238E27FC236}">
+                    <a16:creationId xmlns:a16="http://schemas.microsoft.com/office/drawing/2014/main" id="{4D00A4CE-7B76-41DF-BA93-0B6D0E5CE4CB}"/>
+                  </a:ext>
+                </a:extLst>
+              </p:cNvPr>
+              <p:cNvCxnSpPr>
+                <a:cxnSpLocks/>
+                <a:endCxn id="247" idx="3"/>
+              </p:cNvCxnSpPr>
+              <p:nvPr/>
+            </p:nvCxnSpPr>
+            <p:spPr>
+              <a:xfrm rot="760479" flipV="1">
+                <a:off x="4289142" y="3509357"/>
+                <a:ext cx="3846889" cy="2454812"/>
+              </a:xfrm>
+              <a:prstGeom prst="line">
+                <a:avLst/>
+              </a:prstGeom>
+              <a:ln w="9525" cap="flat" cmpd="sng" algn="ctr">
+                <a:solidFill>
+                  <a:schemeClr val="accent6"/>
+                </a:solidFill>
+                <a:prstDash val="dash"/>
+                <a:round/>
+                <a:headEnd type="none" w="med" len="med"/>
+                <a:tailEnd type="none" w="med" len="med"/>
+              </a:ln>
+            </p:spPr>
+            <p:style>
+              <a:lnRef idx="0">
+                <a:scrgbClr r="0" g="0" b="0"/>
+              </a:lnRef>
+              <a:fillRef idx="0">
+                <a:scrgbClr r="0" g="0" b="0"/>
+              </a:fillRef>
+              <a:effectRef idx="0">
+                <a:scrgbClr r="0" g="0" b="0"/>
+              </a:effectRef>
+              <a:fontRef idx="minor">
+                <a:schemeClr val="tx1"/>
+              </a:fontRef>
+            </p:style>
+          </p:cxnSp>
+          <p:cxnSp>
+            <p:nvCxnSpPr>
+              <p:cNvPr id="162" name="Connettore diritto 161">
+                <a:extLst>
+                  <a:ext uri="{FF2B5EF4-FFF2-40B4-BE49-F238E27FC236}">
+                    <a16:creationId xmlns:a16="http://schemas.microsoft.com/office/drawing/2014/main" id="{0AFDFFC2-5416-4FF5-81FD-1C78819124E3}"/>
+                  </a:ext>
+                </a:extLst>
+              </p:cNvPr>
+              <p:cNvCxnSpPr>
+                <a:cxnSpLocks/>
+                <a:stCxn id="247" idx="0"/>
+                <a:endCxn id="247" idx="2"/>
+              </p:cNvCxnSpPr>
+              <p:nvPr/>
+            </p:nvCxnSpPr>
+            <p:spPr>
+              <a:xfrm>
+                <a:off x="7050378" y="3786815"/>
+                <a:ext cx="413726" cy="1144876"/>
+              </a:xfrm>
+              <a:prstGeom prst="line">
+                <a:avLst/>
+              </a:prstGeom>
+              <a:ln w="9525" cap="flat" cmpd="sng" algn="ctr">
+                <a:solidFill>
+                  <a:schemeClr val="accent6"/>
+                </a:solidFill>
+                <a:prstDash val="dash"/>
+                <a:round/>
+                <a:headEnd type="none" w="med" len="med"/>
+                <a:tailEnd type="none" w="med" len="med"/>
+              </a:ln>
+            </p:spPr>
+            <p:style>
+              <a:lnRef idx="0">
+                <a:scrgbClr r="0" g="0" b="0"/>
+              </a:lnRef>
+              <a:fillRef idx="0">
+                <a:scrgbClr r="0" g="0" b="0"/>
+              </a:fillRef>
+              <a:effectRef idx="0">
+                <a:scrgbClr r="0" g="0" b="0"/>
+              </a:effectRef>
+              <a:fontRef idx="minor">
+                <a:schemeClr val="tx1"/>
+              </a:fontRef>
+            </p:style>
+          </p:cxnSp>
+        </p:grpSp>
+        <p:sp>
+          <p:nvSpPr>
+            <p:cNvPr id="138" name="Arco 137">
+              <a:extLst>
+                <a:ext uri="{FF2B5EF4-FFF2-40B4-BE49-F238E27FC236}">
+                  <a16:creationId xmlns:a16="http://schemas.microsoft.com/office/drawing/2014/main" id="{38DE40F3-5D84-4930-9EDB-C410C0AF4A4F}"/>
+                </a:ext>
+              </a:extLst>
+            </p:cNvPr>
+            <p:cNvSpPr/>
+            <p:nvPr/>
+          </p:nvSpPr>
+          <p:spPr>
+            <a:xfrm rot="982481">
+              <a:off x="3106462" y="4143479"/>
+              <a:ext cx="392072" cy="413536"/>
+            </a:xfrm>
+            <a:prstGeom prst="arc">
+              <a:avLst>
+                <a:gd name="adj1" fmla="val 15362779"/>
+                <a:gd name="adj2" fmla="val 1112190"/>
+              </a:avLst>
+            </a:prstGeom>
+            <a:ln w="9525" cap="flat" cmpd="sng" algn="ctr">
+              <a:solidFill>
+                <a:schemeClr val="accent2"/>
+              </a:solidFill>
+              <a:prstDash val="solid"/>
+              <a:round/>
+              <a:headEnd type="arrow" w="med" len="med"/>
+              <a:tailEnd type="arrow" w="med" len="med"/>
+            </a:ln>
+          </p:spPr>
+          <p:style>
+            <a:lnRef idx="0">
+              <a:scrgbClr r="0" g="0" b="0"/>
+            </a:lnRef>
+            <a:fillRef idx="0">
+              <a:scrgbClr r="0" g="0" b="0"/>
+            </a:fillRef>
+            <a:effectRef idx="0">
+              <a:scrgbClr r="0" g="0" b="0"/>
+            </a:effectRef>
+            <a:fontRef idx="minor">
+              <a:schemeClr val="tx1"/>
+            </a:fontRef>
+          </p:style>
+          <p:txBody>
+            <a:bodyPr rtlCol="0" anchor="ctr"/>
+            <a:lstStyle/>
+            <a:p>
+              <a:pPr algn="ctr"/>
+              <a:endParaRPr lang="it-IT" dirty="0"/>
+            </a:p>
+          </p:txBody>
+        </p:sp>
+        <mc:AlternateContent xmlns:mc="http://schemas.openxmlformats.org/markup-compatibility/2006" xmlns:a14="http://schemas.microsoft.com/office/drawing/2010/main">
+          <mc:Choice Requires="a14">
+            <p:sp>
+              <p:nvSpPr>
+                <p:cNvPr id="139" name="CasellaDiTesto 138">
+                  <a:extLst>
+                    <a:ext uri="{FF2B5EF4-FFF2-40B4-BE49-F238E27FC236}">
+                      <a16:creationId xmlns:a16="http://schemas.microsoft.com/office/drawing/2014/main" id="{E83B41BA-44F1-4BC8-A266-A9F2C9232E9E}"/>
+                    </a:ext>
+                  </a:extLst>
+                </p:cNvPr>
+                <p:cNvSpPr txBox="1"/>
+                <p:nvPr/>
+              </p:nvSpPr>
+              <p:spPr>
+                <a:xfrm flipH="1">
+                  <a:off x="3419717" y="3980915"/>
+                  <a:ext cx="174097" cy="646331"/>
+                </a:xfrm>
+                <a:prstGeom prst="rect">
+                  <a:avLst/>
+                </a:prstGeom>
+                <a:noFill/>
+                <a:ln>
+                  <a:noFill/>
+                </a:ln>
+              </p:spPr>
+              <p:txBody>
+                <a:bodyPr wrap="square" rtlCol="0">
+                  <a:spAutoFit/>
+                </a:bodyPr>
+                <a:lstStyle/>
+                <a:p>
+                  <a:pPr/>
+                  <a14:m>
+                    <m:oMathPara xmlns:m="http://schemas.openxmlformats.org/officeDocument/2006/math">
+                      <m:oMathParaPr>
+                        <m:jc m:val="centerGroup"/>
+                      </m:oMathParaPr>
+                      <m:oMath xmlns:m="http://schemas.openxmlformats.org/officeDocument/2006/math">
+                        <m:sSub>
+                          <m:sSubPr>
+                            <m:ctrlPr>
+                              <a:rPr lang="el-GR" i="1" dirty="0" smtClean="0">
+                                <a:solidFill>
+                                  <a:schemeClr val="accent2"/>
+                                </a:solidFill>
+                                <a:latin typeface="Cambria Math" panose="02040503050406030204" pitchFamily="18" charset="0"/>
+                                <a:ea typeface="Cambria Math" panose="02040503050406030204" pitchFamily="18" charset="0"/>
+                              </a:rPr>
+                            </m:ctrlPr>
+                          </m:sSubPr>
+                          <m:e>
+                            <m:r>
+                              <a:rPr lang="el-GR" i="1" dirty="0" smtClean="0">
+                                <a:solidFill>
+                                  <a:schemeClr val="accent2"/>
+                                </a:solidFill>
+                                <a:latin typeface="Cambria Math" panose="02040503050406030204" pitchFamily="18" charset="0"/>
+                                <a:ea typeface="Cambria Math" panose="02040503050406030204" pitchFamily="18" charset="0"/>
+                              </a:rPr>
+                              <m:t>𝜃</m:t>
+                            </m:r>
+                          </m:e>
+                          <m:sub>
+                            <m:r>
+                              <a:rPr lang="it-IT" b="0" i="1" dirty="0" smtClean="0">
+                                <a:solidFill>
+                                  <a:schemeClr val="accent2"/>
+                                </a:solidFill>
+                                <a:latin typeface="Cambria Math" panose="02040503050406030204" pitchFamily="18" charset="0"/>
+                                <a:ea typeface="Cambria Math" panose="02040503050406030204" pitchFamily="18" charset="0"/>
+                              </a:rPr>
+                              <m:t>𝑏</m:t>
+                            </m:r>
+                          </m:sub>
+                        </m:sSub>
+                      </m:oMath>
+                    </m:oMathPara>
+                  </a14:m>
+                  <a:endParaRPr lang="it-IT" dirty="0">
+                    <a:solidFill>
+                      <a:schemeClr val="accent2"/>
+                    </a:solidFill>
+                    <a:ea typeface="Cambria Math" panose="02040503050406030204" pitchFamily="18" charset="0"/>
+                  </a:endParaRPr>
+                </a:p>
+                <a:p>
+                  <a:endParaRPr lang="it-IT" dirty="0">
+                    <a:solidFill>
+                      <a:schemeClr val="accent2"/>
+                    </a:solidFill>
+                  </a:endParaRPr>
+                </a:p>
+              </p:txBody>
+            </p:sp>
+          </mc:Choice>
+          <mc:Fallback xmlns="">
+            <p:sp>
+              <p:nvSpPr>
+                <p:cNvPr id="131" name="CasellaDiTesto 130">
+                  <a:extLst>
+                    <a:ext uri="{FF2B5EF4-FFF2-40B4-BE49-F238E27FC236}">
+                      <a16:creationId xmlns:a16="http://schemas.microsoft.com/office/drawing/2014/main" id="{32991065-54A2-4FF3-B632-7A75172235E4}"/>
+                    </a:ext>
+                  </a:extLst>
+                </p:cNvPr>
+                <p:cNvSpPr txBox="1">
+                  <a:spLocks noRot="1" noChangeAspect="1" noMove="1" noResize="1" noEditPoints="1" noAdjustHandles="1" noChangeArrowheads="1" noChangeShapeType="1" noTextEdit="1"/>
+                </p:cNvSpPr>
+                <p:nvPr/>
+              </p:nvSpPr>
+              <p:spPr>
+                <a:xfrm flipH="1">
+                  <a:off x="3419717" y="3980915"/>
+                  <a:ext cx="174097" cy="646331"/>
+                </a:xfrm>
+                <a:prstGeom prst="rect">
+                  <a:avLst/>
+                </a:prstGeom>
+                <a:blipFill>
+                  <a:blip r:embed="rId4"/>
+                  <a:stretch>
+                    <a:fillRect r="-117857"/>
+                  </a:stretch>
+                </a:blipFill>
+                <a:ln>
+                  <a:noFill/>
+                </a:ln>
+              </p:spPr>
+              <p:txBody>
+                <a:bodyPr/>
+                <a:lstStyle/>
+                <a:p>
+                  <a:r>
+                    <a:rPr lang="it-IT">
+                      <a:noFill/>
+                    </a:rPr>
+                    <a:t> </a:t>
+                  </a:r>
+                </a:p>
+              </p:txBody>
+            </p:sp>
+          </mc:Fallback>
+        </mc:AlternateContent>
+        <p:cxnSp>
+          <p:nvCxnSpPr>
+            <p:cNvPr id="141" name="Connettore diritto 140">
+              <a:extLst>
+                <a:ext uri="{FF2B5EF4-FFF2-40B4-BE49-F238E27FC236}">
+                  <a16:creationId xmlns:a16="http://schemas.microsoft.com/office/drawing/2014/main" id="{EAC82460-57A3-483A-86CF-0B3684A32DB2}"/>
+                </a:ext>
+              </a:extLst>
+            </p:cNvPr>
+            <p:cNvCxnSpPr>
+              <a:cxnSpLocks/>
+            </p:cNvCxnSpPr>
+            <p:nvPr/>
+          </p:nvCxnSpPr>
+          <p:spPr>
+            <a:xfrm>
+              <a:off x="4567603" y="3284051"/>
+              <a:ext cx="0" cy="1182859"/>
+            </a:xfrm>
+            <a:prstGeom prst="line">
+              <a:avLst/>
+            </a:prstGeom>
+            <a:ln w="9525" cap="flat" cmpd="sng" algn="ctr">
+              <a:solidFill>
+                <a:schemeClr val="accent2"/>
+              </a:solidFill>
+              <a:prstDash val="dash"/>
+              <a:round/>
+              <a:headEnd type="none" w="med" len="med"/>
+              <a:tailEnd type="none" w="med" len="med"/>
+            </a:ln>
+          </p:spPr>
+          <p:style>
+            <a:lnRef idx="0">
+              <a:scrgbClr r="0" g="0" b="0"/>
+            </a:lnRef>
+            <a:fillRef idx="0">
+              <a:scrgbClr r="0" g="0" b="0"/>
+            </a:fillRef>
+            <a:effectRef idx="0">
+              <a:scrgbClr r="0" g="0" b="0"/>
+            </a:effectRef>
+            <a:fontRef idx="minor">
+              <a:schemeClr val="tx1"/>
+            </a:fontRef>
+          </p:style>
+        </p:cxnSp>
+        <p:cxnSp>
+          <p:nvCxnSpPr>
+            <p:cNvPr id="142" name="Connettore diritto 141">
+              <a:extLst>
+                <a:ext uri="{FF2B5EF4-FFF2-40B4-BE49-F238E27FC236}">
+                  <a16:creationId xmlns:a16="http://schemas.microsoft.com/office/drawing/2014/main" id="{9F07F4FC-3615-428D-8901-00C6AE02C60E}"/>
+                </a:ext>
+              </a:extLst>
+            </p:cNvPr>
+            <p:cNvCxnSpPr>
+              <a:cxnSpLocks/>
+            </p:cNvCxnSpPr>
+            <p:nvPr/>
+          </p:nvCxnSpPr>
+          <p:spPr>
+            <a:xfrm flipH="1">
+              <a:off x="2225167" y="3293664"/>
+              <a:ext cx="2336645" cy="0"/>
+            </a:xfrm>
+            <a:prstGeom prst="line">
+              <a:avLst/>
+            </a:prstGeom>
+            <a:ln w="9525" cap="flat" cmpd="sng" algn="ctr">
+              <a:solidFill>
+                <a:schemeClr val="accent2"/>
+              </a:solidFill>
+              <a:prstDash val="dash"/>
+              <a:round/>
+              <a:headEnd type="none" w="med" len="med"/>
+              <a:tailEnd type="none" w="med" len="med"/>
+            </a:ln>
+          </p:spPr>
+          <p:style>
+            <a:lnRef idx="0">
+              <a:scrgbClr r="0" g="0" b="0"/>
+            </a:lnRef>
+            <a:fillRef idx="0">
+              <a:scrgbClr r="0" g="0" b="0"/>
+            </a:fillRef>
+            <a:effectRef idx="0">
+              <a:scrgbClr r="0" g="0" b="0"/>
+            </a:effectRef>
+            <a:fontRef idx="minor">
+              <a:schemeClr val="tx1"/>
+            </a:fontRef>
+          </p:style>
+        </p:cxnSp>
+        <mc:AlternateContent xmlns:mc="http://schemas.openxmlformats.org/markup-compatibility/2006" xmlns:a14="http://schemas.microsoft.com/office/drawing/2010/main">
+          <mc:Choice Requires="a14">
+            <p:sp>
+              <p:nvSpPr>
+                <p:cNvPr id="144" name="CasellaDiTesto 143">
+                  <a:extLst>
+                    <a:ext uri="{FF2B5EF4-FFF2-40B4-BE49-F238E27FC236}">
+                      <a16:creationId xmlns:a16="http://schemas.microsoft.com/office/drawing/2014/main" id="{6041BB2F-CE13-4995-9A2D-6690DC2A776D}"/>
+                    </a:ext>
+                  </a:extLst>
+                </p:cNvPr>
+                <p:cNvSpPr txBox="1"/>
+                <p:nvPr/>
+              </p:nvSpPr>
+              <p:spPr>
+                <a:xfrm>
+                  <a:off x="3730022" y="4400014"/>
+                  <a:ext cx="317050" cy="369332"/>
+                </a:xfrm>
+                <a:prstGeom prst="rect">
+                  <a:avLst/>
+                </a:prstGeom>
+                <a:noFill/>
+              </p:spPr>
+              <p:txBody>
+                <a:bodyPr wrap="square" rtlCol="0">
+                  <a:spAutoFit/>
+                </a:bodyPr>
+                <a:lstStyle/>
+                <a:p>
+                  <a:pPr/>
+                  <a14:m>
+                    <m:oMathPara xmlns:m="http://schemas.openxmlformats.org/officeDocument/2006/math">
+                      <m:oMathParaPr>
+                        <m:jc m:val="centerGroup"/>
+                      </m:oMathParaPr>
+                      <m:oMath xmlns:m="http://schemas.openxmlformats.org/officeDocument/2006/math">
+                        <m:sSub>
+                          <m:sSubPr>
+                            <m:ctrlPr>
+                              <a:rPr lang="it-IT" b="0" i="1" dirty="0" smtClean="0">
+                                <a:solidFill>
+                                  <a:schemeClr val="accent2"/>
+                                </a:solidFill>
+                                <a:latin typeface="Cambria Math" panose="02040503050406030204" pitchFamily="18" charset="0"/>
+                              </a:rPr>
+                            </m:ctrlPr>
+                          </m:sSubPr>
+                          <m:e>
+                            <m:r>
+                              <a:rPr lang="it-IT" b="0" i="1" dirty="0" smtClean="0">
+                                <a:solidFill>
+                                  <a:schemeClr val="accent2"/>
+                                </a:solidFill>
+                                <a:latin typeface="Cambria Math" panose="02040503050406030204" pitchFamily="18" charset="0"/>
+                              </a:rPr>
+                              <m:t>𝑥</m:t>
+                            </m:r>
+                          </m:e>
+                          <m:sub>
+                            <m:r>
+                              <a:rPr lang="it-IT" b="0" i="1" dirty="0" smtClean="0">
+                                <a:solidFill>
+                                  <a:schemeClr val="accent2"/>
+                                </a:solidFill>
+                                <a:latin typeface="Cambria Math" panose="02040503050406030204" pitchFamily="18" charset="0"/>
+                              </a:rPr>
+                              <m:t>𝑏</m:t>
+                            </m:r>
+                          </m:sub>
+                        </m:sSub>
+                      </m:oMath>
+                    </m:oMathPara>
+                  </a14:m>
+                  <a:endParaRPr lang="it-IT" dirty="0">
+                    <a:solidFill>
+                      <a:schemeClr val="accent2"/>
+                    </a:solidFill>
+                  </a:endParaRPr>
+                </a:p>
+              </p:txBody>
+            </p:sp>
+          </mc:Choice>
+          <mc:Fallback xmlns="">
+            <p:sp>
+              <p:nvSpPr>
+                <p:cNvPr id="132" name="CasellaDiTesto 131">
+                  <a:extLst>
+                    <a:ext uri="{FF2B5EF4-FFF2-40B4-BE49-F238E27FC236}">
+                      <a16:creationId xmlns:a16="http://schemas.microsoft.com/office/drawing/2014/main" id="{66A16BEF-803B-49D7-BCC8-6EBC5E28BC46}"/>
+                    </a:ext>
+                  </a:extLst>
+                </p:cNvPr>
+                <p:cNvSpPr txBox="1">
+                  <a:spLocks noRot="1" noChangeAspect="1" noMove="1" noResize="1" noEditPoints="1" noAdjustHandles="1" noChangeArrowheads="1" noChangeShapeType="1" noTextEdit="1"/>
+                </p:cNvSpPr>
+                <p:nvPr/>
+              </p:nvSpPr>
+              <p:spPr>
+                <a:xfrm>
+                  <a:off x="3730022" y="4400014"/>
+                  <a:ext cx="317050" cy="369332"/>
+                </a:xfrm>
+                <a:prstGeom prst="rect">
+                  <a:avLst/>
+                </a:prstGeom>
+                <a:blipFill>
+                  <a:blip r:embed="rId6"/>
+                  <a:stretch>
+                    <a:fillRect r="-19231"/>
+                  </a:stretch>
+                </a:blipFill>
+              </p:spPr>
+              <p:txBody>
+                <a:bodyPr/>
+                <a:lstStyle/>
+                <a:p>
+                  <a:r>
+                    <a:rPr lang="it-IT">
+                      <a:noFill/>
+                    </a:rPr>
+                    <a:t> </a:t>
+                  </a:r>
+                </a:p>
+              </p:txBody>
+            </p:sp>
+          </mc:Fallback>
+        </mc:AlternateContent>
+        <mc:AlternateContent xmlns:mc="http://schemas.openxmlformats.org/markup-compatibility/2006" xmlns:a14="http://schemas.microsoft.com/office/drawing/2010/main">
+          <mc:Choice Requires="a14">
+            <p:sp>
+              <p:nvSpPr>
+                <p:cNvPr id="145" name="CasellaDiTesto 144">
+                  <a:extLst>
+                    <a:ext uri="{FF2B5EF4-FFF2-40B4-BE49-F238E27FC236}">
+                      <a16:creationId xmlns:a16="http://schemas.microsoft.com/office/drawing/2014/main" id="{1BB489F9-E7AB-4693-9D69-D23EA5D3095A}"/>
+                    </a:ext>
+                  </a:extLst>
+                </p:cNvPr>
+                <p:cNvSpPr txBox="1"/>
+                <p:nvPr/>
+              </p:nvSpPr>
+              <p:spPr>
+                <a:xfrm>
+                  <a:off x="1862295" y="3244334"/>
+                  <a:ext cx="317050" cy="369332"/>
+                </a:xfrm>
+                <a:prstGeom prst="rect">
+                  <a:avLst/>
+                </a:prstGeom>
+                <a:noFill/>
+              </p:spPr>
+              <p:txBody>
+                <a:bodyPr wrap="square" rtlCol="0">
+                  <a:spAutoFit/>
+                </a:bodyPr>
+                <a:lstStyle/>
+                <a:p>
+                  <a:pPr/>
+                  <a14:m>
+                    <m:oMathPara xmlns:m="http://schemas.openxmlformats.org/officeDocument/2006/math">
+                      <m:oMathParaPr>
+                        <m:jc m:val="centerGroup"/>
+                      </m:oMathParaPr>
+                      <m:oMath xmlns:m="http://schemas.openxmlformats.org/officeDocument/2006/math">
+                        <m:sSub>
+                          <m:sSubPr>
+                            <m:ctrlPr>
+                              <a:rPr lang="it-IT" b="0" i="1" dirty="0" smtClean="0">
+                                <a:solidFill>
+                                  <a:schemeClr val="accent2"/>
+                                </a:solidFill>
+                                <a:latin typeface="Cambria Math" panose="02040503050406030204" pitchFamily="18" charset="0"/>
+                              </a:rPr>
+                            </m:ctrlPr>
+                          </m:sSubPr>
+                          <m:e>
+                            <m:r>
+                              <a:rPr lang="it-IT" b="0" i="1" dirty="0" smtClean="0">
+                                <a:solidFill>
+                                  <a:schemeClr val="accent2"/>
+                                </a:solidFill>
+                                <a:latin typeface="Cambria Math" panose="02040503050406030204" pitchFamily="18" charset="0"/>
+                              </a:rPr>
+                              <m:t>𝑦</m:t>
+                            </m:r>
+                          </m:e>
+                          <m:sub>
+                            <m:r>
+                              <a:rPr lang="it-IT" b="0" i="1" dirty="0" smtClean="0">
+                                <a:solidFill>
+                                  <a:schemeClr val="accent2"/>
+                                </a:solidFill>
+                                <a:latin typeface="Cambria Math" panose="02040503050406030204" pitchFamily="18" charset="0"/>
+                              </a:rPr>
+                              <m:t>𝑏</m:t>
+                            </m:r>
+                          </m:sub>
+                        </m:sSub>
+                      </m:oMath>
+                    </m:oMathPara>
+                  </a14:m>
+                  <a:endParaRPr lang="it-IT" dirty="0">
+                    <a:solidFill>
+                      <a:schemeClr val="accent2"/>
+                    </a:solidFill>
+                  </a:endParaRPr>
+                </a:p>
+              </p:txBody>
+            </p:sp>
+          </mc:Choice>
+          <mc:Fallback xmlns="">
+            <p:sp>
+              <p:nvSpPr>
+                <p:cNvPr id="133" name="CasellaDiTesto 132">
+                  <a:extLst>
+                    <a:ext uri="{FF2B5EF4-FFF2-40B4-BE49-F238E27FC236}">
+                      <a16:creationId xmlns:a16="http://schemas.microsoft.com/office/drawing/2014/main" id="{08AA9919-C4D8-4C11-A1CD-1C746AA7A409}"/>
+                    </a:ext>
+                  </a:extLst>
+                </p:cNvPr>
+                <p:cNvSpPr txBox="1">
+                  <a:spLocks noRot="1" noChangeAspect="1" noMove="1" noResize="1" noEditPoints="1" noAdjustHandles="1" noChangeArrowheads="1" noChangeShapeType="1" noTextEdit="1"/>
+                </p:cNvSpPr>
+                <p:nvPr/>
+              </p:nvSpPr>
+              <p:spPr>
+                <a:xfrm>
+                  <a:off x="1862295" y="3244334"/>
+                  <a:ext cx="317050" cy="369332"/>
+                </a:xfrm>
+                <a:prstGeom prst="rect">
+                  <a:avLst/>
+                </a:prstGeom>
+                <a:blipFill>
+                  <a:blip r:embed="rId7"/>
+                  <a:stretch>
+                    <a:fillRect r="-16981" b="-6557"/>
+                  </a:stretch>
+                </a:blipFill>
+              </p:spPr>
+              <p:txBody>
+                <a:bodyPr/>
+                <a:lstStyle/>
+                <a:p>
+                  <a:r>
+                    <a:rPr lang="it-IT">
+                      <a:noFill/>
+                    </a:rPr>
+                    <a:t> </a:t>
+                  </a:r>
+                </a:p>
+              </p:txBody>
+            </p:sp>
+          </mc:Fallback>
+        </mc:AlternateContent>
+      </p:grpSp>
     </p:spTree>
     <p:extLst>
       <p:ext uri="{BB962C8B-B14F-4D97-AF65-F5344CB8AC3E}">
@@ -16062,7 +19811,7 @@
         </p:nvGrpSpPr>
         <p:grpSpPr>
           <a:xfrm>
-            <a:off x="3383390" y="1772007"/>
+            <a:off x="3440540" y="1743432"/>
             <a:ext cx="5041913" cy="2561921"/>
             <a:chOff x="3925808" y="2043989"/>
             <a:chExt cx="5041913" cy="2561921"/>

</xml_diff>

<commit_message>
cap4 quasi corretto da me quindi boh
</commit_message>
<xml_diff>
--- a/IMMAGINI/powerpointimmagini.pptx
+++ b/IMMAGINI/powerpointimmagini.pptx
@@ -262,7 +262,7 @@
           <a:p>
             <a:fld id="{5BCC69EF-8925-47FB-9BAA-DDFE83E229BC}" type="datetimeFigureOut">
               <a:rPr lang="it-IT" smtClean="0"/>
-              <a:t>12/02/2019</a:t>
+              <a:t>25/02/2019</a:t>
             </a:fld>
             <a:endParaRPr lang="it-IT"/>
           </a:p>
@@ -460,7 +460,7 @@
           <a:p>
             <a:fld id="{5BCC69EF-8925-47FB-9BAA-DDFE83E229BC}" type="datetimeFigureOut">
               <a:rPr lang="it-IT" smtClean="0"/>
-              <a:t>12/02/2019</a:t>
+              <a:t>25/02/2019</a:t>
             </a:fld>
             <a:endParaRPr lang="it-IT"/>
           </a:p>
@@ -668,7 +668,7 @@
           <a:p>
             <a:fld id="{5BCC69EF-8925-47FB-9BAA-DDFE83E229BC}" type="datetimeFigureOut">
               <a:rPr lang="it-IT" smtClean="0"/>
-              <a:t>12/02/2019</a:t>
+              <a:t>25/02/2019</a:t>
             </a:fld>
             <a:endParaRPr lang="it-IT"/>
           </a:p>
@@ -866,7 +866,7 @@
           <a:p>
             <a:fld id="{5BCC69EF-8925-47FB-9BAA-DDFE83E229BC}" type="datetimeFigureOut">
               <a:rPr lang="it-IT" smtClean="0"/>
-              <a:t>12/02/2019</a:t>
+              <a:t>25/02/2019</a:t>
             </a:fld>
             <a:endParaRPr lang="it-IT"/>
           </a:p>
@@ -1141,7 +1141,7 @@
           <a:p>
             <a:fld id="{5BCC69EF-8925-47FB-9BAA-DDFE83E229BC}" type="datetimeFigureOut">
               <a:rPr lang="it-IT" smtClean="0"/>
-              <a:t>12/02/2019</a:t>
+              <a:t>25/02/2019</a:t>
             </a:fld>
             <a:endParaRPr lang="it-IT"/>
           </a:p>
@@ -1406,7 +1406,7 @@
           <a:p>
             <a:fld id="{5BCC69EF-8925-47FB-9BAA-DDFE83E229BC}" type="datetimeFigureOut">
               <a:rPr lang="it-IT" smtClean="0"/>
-              <a:t>12/02/2019</a:t>
+              <a:t>25/02/2019</a:t>
             </a:fld>
             <a:endParaRPr lang="it-IT"/>
           </a:p>
@@ -1818,7 +1818,7 @@
           <a:p>
             <a:fld id="{5BCC69EF-8925-47FB-9BAA-DDFE83E229BC}" type="datetimeFigureOut">
               <a:rPr lang="it-IT" smtClean="0"/>
-              <a:t>12/02/2019</a:t>
+              <a:t>25/02/2019</a:t>
             </a:fld>
             <a:endParaRPr lang="it-IT"/>
           </a:p>
@@ -1959,7 +1959,7 @@
           <a:p>
             <a:fld id="{5BCC69EF-8925-47FB-9BAA-DDFE83E229BC}" type="datetimeFigureOut">
               <a:rPr lang="it-IT" smtClean="0"/>
-              <a:t>12/02/2019</a:t>
+              <a:t>25/02/2019</a:t>
             </a:fld>
             <a:endParaRPr lang="it-IT"/>
           </a:p>
@@ -2072,7 +2072,7 @@
           <a:p>
             <a:fld id="{5BCC69EF-8925-47FB-9BAA-DDFE83E229BC}" type="datetimeFigureOut">
               <a:rPr lang="it-IT" smtClean="0"/>
-              <a:t>12/02/2019</a:t>
+              <a:t>25/02/2019</a:t>
             </a:fld>
             <a:endParaRPr lang="it-IT"/>
           </a:p>
@@ -2383,7 +2383,7 @@
           <a:p>
             <a:fld id="{5BCC69EF-8925-47FB-9BAA-DDFE83E229BC}" type="datetimeFigureOut">
               <a:rPr lang="it-IT" smtClean="0"/>
-              <a:t>12/02/2019</a:t>
+              <a:t>25/02/2019</a:t>
             </a:fld>
             <a:endParaRPr lang="it-IT"/>
           </a:p>
@@ -2671,7 +2671,7 @@
           <a:p>
             <a:fld id="{5BCC69EF-8925-47FB-9BAA-DDFE83E229BC}" type="datetimeFigureOut">
               <a:rPr lang="it-IT" smtClean="0"/>
-              <a:t>12/02/2019</a:t>
+              <a:t>25/02/2019</a:t>
             </a:fld>
             <a:endParaRPr lang="it-IT"/>
           </a:p>
@@ -2912,7 +2912,7 @@
           <a:p>
             <a:fld id="{5BCC69EF-8925-47FB-9BAA-DDFE83E229BC}" type="datetimeFigureOut">
               <a:rPr lang="it-IT" smtClean="0"/>
-              <a:t>12/02/2019</a:t>
+              <a:t>25/02/2019</a:t>
             </a:fld>
             <a:endParaRPr lang="it-IT"/>
           </a:p>
@@ -7281,9 +7281,9 @@
         <p:grpSpPr>
           <a:xfrm>
             <a:off x="1935723" y="1390818"/>
-            <a:ext cx="5984498" cy="3471206"/>
+            <a:ext cx="5898577" cy="3471206"/>
             <a:chOff x="1935723" y="1390818"/>
-            <a:chExt cx="5984498" cy="3471206"/>
+            <a:chExt cx="5898577" cy="3471206"/>
           </a:xfrm>
         </p:grpSpPr>
         <p:grpSp>
@@ -10513,8 +10513,8 @@
                 </a:p>
               </p:txBody>
             </p:sp>
-            <mc:AlternateContent xmlns:mc="http://schemas.openxmlformats.org/markup-compatibility/2006" xmlns:a14="http://schemas.microsoft.com/office/drawing/2010/main">
-              <mc:Choice Requires="a14">
+            <mc:AlternateContent xmlns:mc="http://schemas.openxmlformats.org/markup-compatibility/2006">
+              <mc:Choice xmlns:a14="http://schemas.microsoft.com/office/drawing/2010/main" Requires="a14">
                 <p:sp>
                   <p:nvSpPr>
                     <p:cNvPr id="131" name="CasellaDiTesto 130">
@@ -10553,16 +10553,41 @@
                             <m:jc m:val="centerGroup"/>
                           </m:oMathParaPr>
                           <m:oMath xmlns:m="http://schemas.openxmlformats.org/officeDocument/2006/math">
-                            <m:r>
-                              <a:rPr lang="el-GR" i="1" smtClean="0">
-                                <a:solidFill>
-                                  <a:schemeClr val="accent6"/>
-                                </a:solidFill>
-                                <a:latin typeface="Cambria Math" panose="02040503050406030204" pitchFamily="18" charset="0"/>
-                                <a:ea typeface="Cambria Math" panose="02040503050406030204" pitchFamily="18" charset="0"/>
-                              </a:rPr>
-                              <m:t>𝜃</m:t>
-                            </m:r>
+                            <m:sSub>
+                              <m:sSubPr>
+                                <m:ctrlPr>
+                                  <a:rPr lang="it-IT" i="1" smtClean="0">
+                                    <a:solidFill>
+                                      <a:schemeClr val="accent6"/>
+                                    </a:solidFill>
+                                    <a:latin typeface="Cambria Math" panose="02040503050406030204" pitchFamily="18" charset="0"/>
+                                  </a:rPr>
+                                </m:ctrlPr>
+                              </m:sSubPr>
+                              <m:e>
+                                <m:r>
+                                  <a:rPr lang="it-IT" i="1" smtClean="0">
+                                    <a:solidFill>
+                                      <a:schemeClr val="accent6"/>
+                                    </a:solidFill>
+                                    <a:latin typeface="Cambria Math" panose="02040503050406030204" pitchFamily="18" charset="0"/>
+                                    <a:ea typeface="Cambria Math" panose="02040503050406030204" pitchFamily="18" charset="0"/>
+                                  </a:rPr>
+                                  <m:t>𝜃</m:t>
+                                </m:r>
+                              </m:e>
+                              <m:sub>
+                                <m:r>
+                                  <a:rPr lang="it-IT" b="0" i="1" smtClean="0">
+                                    <a:solidFill>
+                                      <a:schemeClr val="accent6"/>
+                                    </a:solidFill>
+                                    <a:latin typeface="Cambria Math" panose="02040503050406030204" pitchFamily="18" charset="0"/>
+                                  </a:rPr>
+                                  <m:t>𝑏</m:t>
+                                </m:r>
+                              </m:sub>
+                            </m:sSub>
                           </m:oMath>
                         </m:oMathPara>
                       </a14:m>
@@ -10575,7 +10600,7 @@
                   </p:txBody>
                 </p:sp>
               </mc:Choice>
-              <mc:Fallback xmlns="">
+              <mc:Fallback>
                 <p:sp>
                   <p:nvSpPr>
                     <p:cNvPr id="131" name="CasellaDiTesto 130">
@@ -10601,7 +10626,7 @@
                     <a:blipFill>
                       <a:blip r:embed="rId4"/>
                       <a:stretch>
-                        <a:fillRect/>
+                        <a:fillRect r="-24000"/>
                       </a:stretch>
                     </a:blipFill>
                     <a:ln>
@@ -10891,8 +10916,8 @@
             </mc:Fallback>
           </mc:AlternateContent>
         </p:grpSp>
-        <mc:AlternateContent xmlns:mc="http://schemas.openxmlformats.org/markup-compatibility/2006" xmlns:a14="http://schemas.microsoft.com/office/drawing/2010/main">
-          <mc:Choice Requires="a14">
+        <mc:AlternateContent xmlns:mc="http://schemas.openxmlformats.org/markup-compatibility/2006">
+          <mc:Choice xmlns:a14="http://schemas.microsoft.com/office/drawing/2010/main" Requires="a14">
             <p:sp>
               <p:nvSpPr>
                 <p:cNvPr id="217" name="CasellaDiTesto 216">
@@ -10908,7 +10933,7 @@
               <p:spPr>
                 <a:xfrm>
                   <a:off x="6858455" y="1897304"/>
-                  <a:ext cx="1061766" cy="276999"/>
+                  <a:ext cx="975845" cy="299249"/>
                 </a:xfrm>
                 <a:prstGeom prst="rect">
                   <a:avLst/>
@@ -10958,7 +10983,7 @@
                                 </a:solidFill>
                                 <a:latin typeface="Cambria Math" panose="02040503050406030204" pitchFamily="18" charset="0"/>
                               </a:rPr>
-                              <m:t>𝑅𝐸𝐹</m:t>
+                              <m:t>𝑟𝑒𝑓</m:t>
                             </m:r>
                           </m:sub>
                         </m:sSub>
@@ -11001,7 +11026,7 @@
                                 </a:solidFill>
                                 <a:latin typeface="Cambria Math" panose="02040503050406030204" pitchFamily="18" charset="0"/>
                               </a:rPr>
-                              <m:t>𝑅𝐸𝐹</m:t>
+                              <m:t>𝑟𝑒𝑓</m:t>
                             </m:r>
                           </m:sub>
                         </m:sSub>
@@ -11013,7 +11038,7 @@
               </p:txBody>
             </p:sp>
           </mc:Choice>
-          <mc:Fallback xmlns="">
+          <mc:Fallback>
             <p:sp>
               <p:nvSpPr>
                 <p:cNvPr id="217" name="CasellaDiTesto 216">
@@ -11031,7 +11056,7 @@
               <p:spPr>
                 <a:xfrm>
                   <a:off x="6858455" y="1897304"/>
-                  <a:ext cx="1061766" cy="276999"/>
+                  <a:ext cx="975845" cy="299249"/>
                 </a:xfrm>
                 <a:prstGeom prst="rect">
                   <a:avLst/>
@@ -11039,7 +11064,7 @@
                 <a:blipFill>
                   <a:blip r:embed="rId6"/>
                   <a:stretch>
-                    <a:fillRect l="-2874" r="-1724" b="-23913"/>
+                    <a:fillRect l="-3125" r="-4375" b="-28571"/>
                   </a:stretch>
                 </a:blipFill>
               </p:spPr>

</xml_diff>

<commit_message>
Aggiornato cap4 + immagini
</commit_message>
<xml_diff>
--- a/IMMAGINI/powerpointimmagini.pptx
+++ b/IMMAGINI/powerpointimmagini.pptx
@@ -9,6 +9,7 @@
     <p:sldId id="257" r:id="rId3"/>
     <p:sldId id="258" r:id="rId4"/>
     <p:sldId id="259" r:id="rId5"/>
+    <p:sldId id="260" r:id="rId6"/>
   </p:sldIdLst>
   <p:sldSz cx="12192000" cy="6858000"/>
   <p:notesSz cx="6858000" cy="9144000"/>
@@ -262,7 +263,7 @@
           <a:p>
             <a:fld id="{5BCC69EF-8925-47FB-9BAA-DDFE83E229BC}" type="datetimeFigureOut">
               <a:rPr lang="it-IT" smtClean="0"/>
-              <a:t>25/02/2019</a:t>
+              <a:t>28/02/2019</a:t>
             </a:fld>
             <a:endParaRPr lang="it-IT"/>
           </a:p>
@@ -460,7 +461,7 @@
           <a:p>
             <a:fld id="{5BCC69EF-8925-47FB-9BAA-DDFE83E229BC}" type="datetimeFigureOut">
               <a:rPr lang="it-IT" smtClean="0"/>
-              <a:t>25/02/2019</a:t>
+              <a:t>28/02/2019</a:t>
             </a:fld>
             <a:endParaRPr lang="it-IT"/>
           </a:p>
@@ -668,7 +669,7 @@
           <a:p>
             <a:fld id="{5BCC69EF-8925-47FB-9BAA-DDFE83E229BC}" type="datetimeFigureOut">
               <a:rPr lang="it-IT" smtClean="0"/>
-              <a:t>25/02/2019</a:t>
+              <a:t>28/02/2019</a:t>
             </a:fld>
             <a:endParaRPr lang="it-IT"/>
           </a:p>
@@ -866,7 +867,7 @@
           <a:p>
             <a:fld id="{5BCC69EF-8925-47FB-9BAA-DDFE83E229BC}" type="datetimeFigureOut">
               <a:rPr lang="it-IT" smtClean="0"/>
-              <a:t>25/02/2019</a:t>
+              <a:t>28/02/2019</a:t>
             </a:fld>
             <a:endParaRPr lang="it-IT"/>
           </a:p>
@@ -1141,7 +1142,7 @@
           <a:p>
             <a:fld id="{5BCC69EF-8925-47FB-9BAA-DDFE83E229BC}" type="datetimeFigureOut">
               <a:rPr lang="it-IT" smtClean="0"/>
-              <a:t>25/02/2019</a:t>
+              <a:t>28/02/2019</a:t>
             </a:fld>
             <a:endParaRPr lang="it-IT"/>
           </a:p>
@@ -1406,7 +1407,7 @@
           <a:p>
             <a:fld id="{5BCC69EF-8925-47FB-9BAA-DDFE83E229BC}" type="datetimeFigureOut">
               <a:rPr lang="it-IT" smtClean="0"/>
-              <a:t>25/02/2019</a:t>
+              <a:t>28/02/2019</a:t>
             </a:fld>
             <a:endParaRPr lang="it-IT"/>
           </a:p>
@@ -1818,7 +1819,7 @@
           <a:p>
             <a:fld id="{5BCC69EF-8925-47FB-9BAA-DDFE83E229BC}" type="datetimeFigureOut">
               <a:rPr lang="it-IT" smtClean="0"/>
-              <a:t>25/02/2019</a:t>
+              <a:t>28/02/2019</a:t>
             </a:fld>
             <a:endParaRPr lang="it-IT"/>
           </a:p>
@@ -1959,7 +1960,7 @@
           <a:p>
             <a:fld id="{5BCC69EF-8925-47FB-9BAA-DDFE83E229BC}" type="datetimeFigureOut">
               <a:rPr lang="it-IT" smtClean="0"/>
-              <a:t>25/02/2019</a:t>
+              <a:t>28/02/2019</a:t>
             </a:fld>
             <a:endParaRPr lang="it-IT"/>
           </a:p>
@@ -2072,7 +2073,7 @@
           <a:p>
             <a:fld id="{5BCC69EF-8925-47FB-9BAA-DDFE83E229BC}" type="datetimeFigureOut">
               <a:rPr lang="it-IT" smtClean="0"/>
-              <a:t>25/02/2019</a:t>
+              <a:t>28/02/2019</a:t>
             </a:fld>
             <a:endParaRPr lang="it-IT"/>
           </a:p>
@@ -2383,7 +2384,7 @@
           <a:p>
             <a:fld id="{5BCC69EF-8925-47FB-9BAA-DDFE83E229BC}" type="datetimeFigureOut">
               <a:rPr lang="it-IT" smtClean="0"/>
-              <a:t>25/02/2019</a:t>
+              <a:t>28/02/2019</a:t>
             </a:fld>
             <a:endParaRPr lang="it-IT"/>
           </a:p>
@@ -2671,7 +2672,7 @@
           <a:p>
             <a:fld id="{5BCC69EF-8925-47FB-9BAA-DDFE83E229BC}" type="datetimeFigureOut">
               <a:rPr lang="it-IT" smtClean="0"/>
-              <a:t>25/02/2019</a:t>
+              <a:t>28/02/2019</a:t>
             </a:fld>
             <a:endParaRPr lang="it-IT"/>
           </a:p>
@@ -2912,7 +2913,7 @@
           <a:p>
             <a:fld id="{5BCC69EF-8925-47FB-9BAA-DDFE83E229BC}" type="datetimeFigureOut">
               <a:rPr lang="it-IT" smtClean="0"/>
-              <a:t>25/02/2019</a:t>
+              <a:t>28/02/2019</a:t>
             </a:fld>
             <a:endParaRPr lang="it-IT"/>
           </a:p>
@@ -10513,8 +10514,8 @@
                 </a:p>
               </p:txBody>
             </p:sp>
-            <mc:AlternateContent xmlns:mc="http://schemas.openxmlformats.org/markup-compatibility/2006">
-              <mc:Choice xmlns:a14="http://schemas.microsoft.com/office/drawing/2010/main" Requires="a14">
+            <mc:AlternateContent xmlns:mc="http://schemas.openxmlformats.org/markup-compatibility/2006" xmlns:a14="http://schemas.microsoft.com/office/drawing/2010/main">
+              <mc:Choice Requires="a14">
                 <p:sp>
                   <p:nvSpPr>
                     <p:cNvPr id="131" name="CasellaDiTesto 130">
@@ -10600,7 +10601,7 @@
                   </p:txBody>
                 </p:sp>
               </mc:Choice>
-              <mc:Fallback>
+              <mc:Fallback xmlns="">
                 <p:sp>
                   <p:nvSpPr>
                     <p:cNvPr id="131" name="CasellaDiTesto 130">
@@ -10916,8 +10917,8 @@
             </mc:Fallback>
           </mc:AlternateContent>
         </p:grpSp>
-        <mc:AlternateContent xmlns:mc="http://schemas.openxmlformats.org/markup-compatibility/2006">
-          <mc:Choice xmlns:a14="http://schemas.microsoft.com/office/drawing/2010/main" Requires="a14">
+        <mc:AlternateContent xmlns:mc="http://schemas.openxmlformats.org/markup-compatibility/2006" xmlns:a14="http://schemas.microsoft.com/office/drawing/2010/main">
+          <mc:Choice Requires="a14">
             <p:sp>
               <p:nvSpPr>
                 <p:cNvPr id="217" name="CasellaDiTesto 216">
@@ -11038,7 +11039,7 @@
               </p:txBody>
             </p:sp>
           </mc:Choice>
-          <mc:Fallback>
+          <mc:Fallback xmlns="">
             <p:sp>
               <p:nvSpPr>
                 <p:cNvPr id="217" name="CasellaDiTesto 216">
@@ -23136,6 +23137,106 @@
 </p:sld>
 </file>
 
+<file path=ppt/slides/slide5.xml><?xml version="1.0" encoding="utf-8"?>
+<p:sld xmlns:a="http://schemas.openxmlformats.org/drawingml/2006/main" xmlns:r="http://schemas.openxmlformats.org/officeDocument/2006/relationships" xmlns:p="http://schemas.openxmlformats.org/presentationml/2006/main">
+  <p:cSld>
+    <p:spTree>
+      <p:nvGrpSpPr>
+        <p:cNvPr id="1" name=""/>
+        <p:cNvGrpSpPr/>
+        <p:nvPr/>
+      </p:nvGrpSpPr>
+      <p:grpSpPr>
+        <a:xfrm>
+          <a:off x="0" y="0"/>
+          <a:ext cx="0" cy="0"/>
+          <a:chOff x="0" y="0"/>
+          <a:chExt cx="0" cy="0"/>
+        </a:xfrm>
+      </p:grpSpPr>
+      <p:pic>
+        <p:nvPicPr>
+          <p:cNvPr id="5" name="Immagine 4">
+            <a:extLst>
+              <a:ext uri="{FF2B5EF4-FFF2-40B4-BE49-F238E27FC236}">
+                <a16:creationId xmlns:a16="http://schemas.microsoft.com/office/drawing/2014/main" id="{A689C8FD-F815-40B0-9340-C60CCED523EE}"/>
+              </a:ext>
+            </a:extLst>
+          </p:cNvPr>
+          <p:cNvPicPr>
+            <a:picLocks noChangeAspect="1"/>
+          </p:cNvPicPr>
+          <p:nvPr/>
+        </p:nvPicPr>
+        <p:blipFill rotWithShape="1">
+          <a:blip r:embed="rId2">
+            <a:extLst>
+              <a:ext uri="{28A0092B-C50C-407E-A947-70E740481C1C}">
+                <a14:useLocalDpi xmlns:a14="http://schemas.microsoft.com/office/drawing/2010/main" val="0"/>
+              </a:ext>
+            </a:extLst>
+          </a:blip>
+          <a:srcRect l="37729" r="2192" b="299"/>
+          <a:stretch/>
+        </p:blipFill>
+        <p:spPr>
+          <a:xfrm flipH="1">
+            <a:off x="2092960" y="1243012"/>
+            <a:ext cx="3322319" cy="3478872"/>
+          </a:xfrm>
+          <a:prstGeom prst="rect">
+            <a:avLst/>
+          </a:prstGeom>
+        </p:spPr>
+      </p:pic>
+      <p:pic>
+        <p:nvPicPr>
+          <p:cNvPr id="7" name="Immagine 6">
+            <a:extLst>
+              <a:ext uri="{FF2B5EF4-FFF2-40B4-BE49-F238E27FC236}">
+                <a16:creationId xmlns:a16="http://schemas.microsoft.com/office/drawing/2014/main" id="{1F69D160-B5B5-42AC-9A39-0CED8D9B1891}"/>
+              </a:ext>
+            </a:extLst>
+          </p:cNvPr>
+          <p:cNvPicPr>
+            <a:picLocks noChangeAspect="1"/>
+          </p:cNvPicPr>
+          <p:nvPr/>
+        </p:nvPicPr>
+        <p:blipFill rotWithShape="1">
+          <a:blip r:embed="rId3">
+            <a:extLst>
+              <a:ext uri="{28A0092B-C50C-407E-A947-70E740481C1C}">
+                <a14:useLocalDpi xmlns:a14="http://schemas.microsoft.com/office/drawing/2010/main" val="0"/>
+              </a:ext>
+            </a:extLst>
+          </a:blip>
+          <a:srcRect l="13458" t="4735" r="15140" b="4548"/>
+          <a:stretch/>
+        </p:blipFill>
+        <p:spPr>
+          <a:xfrm>
+            <a:off x="5648960" y="1243012"/>
+            <a:ext cx="3650904" cy="3478872"/>
+          </a:xfrm>
+          <a:prstGeom prst="rect">
+            <a:avLst/>
+          </a:prstGeom>
+        </p:spPr>
+      </p:pic>
+    </p:spTree>
+    <p:extLst>
+      <p:ext uri="{BB962C8B-B14F-4D97-AF65-F5344CB8AC3E}">
+        <p14:creationId xmlns:p14="http://schemas.microsoft.com/office/powerpoint/2010/main" val="3073429269"/>
+      </p:ext>
+    </p:extLst>
+  </p:cSld>
+  <p:clrMapOvr>
+    <a:masterClrMapping/>
+  </p:clrMapOvr>
+</p:sld>
+</file>
+
 <file path=ppt/theme/theme1.xml><?xml version="1.0" encoding="utf-8"?>
 <a:theme xmlns:a="http://schemas.openxmlformats.org/drawingml/2006/main" name="Tema di Office">
   <a:themeElements>

</xml_diff>

<commit_message>
riletto cap6. si può bascettare
</commit_message>
<xml_diff>
--- a/IMMAGINI/powerpointimmagini.pptx
+++ b/IMMAGINI/powerpointimmagini.pptx
@@ -23475,292 +23475,218 @@
           <a:chExt cx="0" cy="0"/>
         </a:xfrm>
       </p:grpSpPr>
-      <p:sp>
-        <p:nvSpPr>
-          <p:cNvPr id="2" name="Rettangolo 1">
+      <p:grpSp>
+        <p:nvGrpSpPr>
+          <p:cNvPr id="13" name="Gruppo 12">
             <a:extLst>
               <a:ext uri="{FF2B5EF4-FFF2-40B4-BE49-F238E27FC236}">
-                <a16:creationId xmlns:a16="http://schemas.microsoft.com/office/drawing/2014/main" id="{875FCC39-36C2-4199-B2D8-D646093381C7}"/>
+                <a16:creationId xmlns:a16="http://schemas.microsoft.com/office/drawing/2014/main" id="{8C4827D2-A910-448E-8D3F-657193C2E1A1}"/>
               </a:ext>
             </a:extLst>
           </p:cNvPr>
-          <p:cNvSpPr/>
+          <p:cNvGrpSpPr/>
           <p:nvPr/>
-        </p:nvSpPr>
-        <p:spPr>
+        </p:nvGrpSpPr>
+        <p:grpSpPr>
           <a:xfrm>
-            <a:off x="2209800" y="1628775"/>
-            <a:ext cx="6934200" cy="4476750"/>
+            <a:off x="-6" y="2236218"/>
+            <a:ext cx="14944725" cy="2924175"/>
+            <a:chOff x="-6" y="2236218"/>
+            <a:chExt cx="14944725" cy="2924175"/>
           </a:xfrm>
-          <a:prstGeom prst="rect">
-            <a:avLst/>
-          </a:prstGeom>
-          <a:ln w="38100"/>
-        </p:spPr>
-        <p:style>
-          <a:lnRef idx="2">
-            <a:schemeClr val="accent6"/>
-          </a:lnRef>
-          <a:fillRef idx="1">
-            <a:schemeClr val="lt1"/>
-          </a:fillRef>
-          <a:effectRef idx="0">
-            <a:schemeClr val="accent6"/>
-          </a:effectRef>
-          <a:fontRef idx="minor">
-            <a:schemeClr val="dk1"/>
-          </a:fontRef>
-        </p:style>
-        <p:txBody>
-          <a:bodyPr rtlCol="0" anchor="ctr"/>
-          <a:lstStyle/>
-          <a:p>
-            <a:pPr algn="ctr"/>
-            <a:endParaRPr lang="it-IT"/>
-          </a:p>
-        </p:txBody>
-      </p:sp>
-      <p:sp>
-        <p:nvSpPr>
-          <p:cNvPr id="3" name="Rettangolo 2">
-            <a:extLst>
-              <a:ext uri="{FF2B5EF4-FFF2-40B4-BE49-F238E27FC236}">
-                <a16:creationId xmlns:a16="http://schemas.microsoft.com/office/drawing/2014/main" id="{99E09D78-2D18-4BCD-B696-D8326AD3A5DE}"/>
-              </a:ext>
-            </a:extLst>
-          </p:cNvPr>
-          <p:cNvSpPr/>
-          <p:nvPr/>
-        </p:nvSpPr>
-        <p:spPr>
-          <a:xfrm>
-            <a:off x="2343150" y="1771650"/>
-            <a:ext cx="2924175" cy="4229100"/>
-          </a:xfrm>
-          <a:prstGeom prst="rect">
-            <a:avLst/>
-          </a:prstGeom>
-          <a:ln w="28575"/>
-        </p:spPr>
-        <p:style>
-          <a:lnRef idx="2">
-            <a:schemeClr val="accent2"/>
-          </a:lnRef>
-          <a:fillRef idx="1">
-            <a:schemeClr val="lt1"/>
-          </a:fillRef>
-          <a:effectRef idx="0">
-            <a:schemeClr val="accent2"/>
-          </a:effectRef>
-          <a:fontRef idx="minor">
-            <a:schemeClr val="dk1"/>
-          </a:fontRef>
-        </p:style>
-        <p:txBody>
-          <a:bodyPr rtlCol="0" anchor="ctr"/>
-          <a:lstStyle/>
-          <a:p>
-            <a:pPr algn="ctr"/>
-            <a:endParaRPr lang="it-IT"/>
-          </a:p>
-        </p:txBody>
-      </p:sp>
-      <p:sp>
-        <p:nvSpPr>
-          <p:cNvPr id="4" name="Rettangolo 3">
-            <a:extLst>
-              <a:ext uri="{FF2B5EF4-FFF2-40B4-BE49-F238E27FC236}">
-                <a16:creationId xmlns:a16="http://schemas.microsoft.com/office/drawing/2014/main" id="{7352CF91-A73E-4E95-A58F-C89984622820}"/>
-              </a:ext>
-            </a:extLst>
-          </p:cNvPr>
-          <p:cNvSpPr/>
-          <p:nvPr/>
-        </p:nvSpPr>
-        <p:spPr>
-          <a:xfrm>
-            <a:off x="5267325" y="4429125"/>
-            <a:ext cx="2076450" cy="1571625"/>
-          </a:xfrm>
-          <a:prstGeom prst="rect">
-            <a:avLst/>
-          </a:prstGeom>
-          <a:ln w="57150"/>
-        </p:spPr>
-        <p:style>
-          <a:lnRef idx="2">
-            <a:schemeClr val="accent5"/>
-          </a:lnRef>
-          <a:fillRef idx="1">
-            <a:schemeClr val="lt1"/>
-          </a:fillRef>
-          <a:effectRef idx="0">
-            <a:schemeClr val="accent5"/>
-          </a:effectRef>
-          <a:fontRef idx="minor">
-            <a:schemeClr val="dk1"/>
-          </a:fontRef>
-        </p:style>
-        <p:txBody>
-          <a:bodyPr rtlCol="0" anchor="ctr"/>
-          <a:lstStyle/>
-          <a:p>
-            <a:pPr algn="ctr"/>
-            <a:endParaRPr lang="it-IT"/>
-          </a:p>
-        </p:txBody>
-      </p:sp>
-      <p:sp>
-        <p:nvSpPr>
-          <p:cNvPr id="5" name="CasellaDiTesto 4">
-            <a:extLst>
-              <a:ext uri="{FF2B5EF4-FFF2-40B4-BE49-F238E27FC236}">
-                <a16:creationId xmlns:a16="http://schemas.microsoft.com/office/drawing/2014/main" id="{A4D8F804-CBDF-490D-969A-5A6D67E7B97A}"/>
-              </a:ext>
-            </a:extLst>
-          </p:cNvPr>
-          <p:cNvSpPr txBox="1"/>
-          <p:nvPr/>
-        </p:nvSpPr>
-        <p:spPr>
-          <a:xfrm>
-            <a:off x="4524375" y="1188006"/>
-            <a:ext cx="5124450" cy="369332"/>
-          </a:xfrm>
-          <a:prstGeom prst="rect">
-            <a:avLst/>
-          </a:prstGeom>
-          <a:noFill/>
-        </p:spPr>
-        <p:txBody>
-          <a:bodyPr wrap="square" rtlCol="0">
-            <a:spAutoFit/>
-          </a:bodyPr>
-          <a:lstStyle/>
-          <a:p>
-            <a:r>
-              <a:rPr lang="it-IT" dirty="0">
+        </p:grpSpPr>
+        <p:pic>
+          <p:nvPicPr>
+            <p:cNvPr id="9" name="Immagine 8">
+              <a:extLst>
+                <a:ext uri="{FF2B5EF4-FFF2-40B4-BE49-F238E27FC236}">
+                  <a16:creationId xmlns:a16="http://schemas.microsoft.com/office/drawing/2014/main" id="{B1BC1CC7-9C2F-4389-B5BC-F90A95F7FD58}"/>
+                </a:ext>
+              </a:extLst>
+            </p:cNvPr>
+            <p:cNvPicPr>
+              <a:picLocks noChangeAspect="1"/>
+            </p:cNvPicPr>
+            <p:nvPr/>
+          </p:nvPicPr>
+          <p:blipFill>
+            <a:blip r:embed="rId2">
+              <a:extLst>
+                <a:ext uri="{28A0092B-C50C-407E-A947-70E740481C1C}">
+                  <a14:useLocalDpi xmlns:a14="http://schemas.microsoft.com/office/drawing/2010/main" val="0"/>
+                </a:ext>
+              </a:extLst>
+            </a:blip>
+            <a:stretch>
+              <a:fillRect/>
+            </a:stretch>
+          </p:blipFill>
+          <p:spPr>
+            <a:xfrm>
+              <a:off x="-6" y="2236218"/>
+              <a:ext cx="14944725" cy="2924175"/>
+            </a:xfrm>
+            <a:prstGeom prst="rect">
+              <a:avLst/>
+            </a:prstGeom>
+          </p:spPr>
+        </p:pic>
+        <p:sp>
+          <p:nvSpPr>
+            <p:cNvPr id="11" name="Rettangolo 10">
+              <a:extLst>
+                <a:ext uri="{FF2B5EF4-FFF2-40B4-BE49-F238E27FC236}">
+                  <a16:creationId xmlns:a16="http://schemas.microsoft.com/office/drawing/2014/main" id="{960095E7-6D3D-4102-A619-713BAC6F3E98}"/>
+                </a:ext>
+              </a:extLst>
+            </p:cNvPr>
+            <p:cNvSpPr/>
+            <p:nvPr/>
+          </p:nvSpPr>
+          <p:spPr>
+            <a:xfrm>
+              <a:off x="4744720" y="3830320"/>
+              <a:ext cx="2804160" cy="203200"/>
+            </a:xfrm>
+            <a:prstGeom prst="rect">
+              <a:avLst/>
+            </a:prstGeom>
+            <a:solidFill>
+              <a:schemeClr val="bg1"/>
+            </a:solidFill>
+            <a:ln>
+              <a:noFill/>
+            </a:ln>
+          </p:spPr>
+          <p:style>
+            <a:lnRef idx="2">
+              <a:schemeClr val="accent1">
+                <a:shade val="50000"/>
+              </a:schemeClr>
+            </a:lnRef>
+            <a:fillRef idx="1">
+              <a:schemeClr val="accent1"/>
+            </a:fillRef>
+            <a:effectRef idx="0">
+              <a:schemeClr val="accent1"/>
+            </a:effectRef>
+            <a:fontRef idx="minor">
+              <a:schemeClr val="lt1"/>
+            </a:fontRef>
+          </p:style>
+          <p:txBody>
+            <a:bodyPr rtlCol="0" anchor="ctr"/>
+            <a:lstStyle/>
+            <a:p>
+              <a:pPr algn="ctr"/>
+              <a:endParaRPr lang="it-IT"/>
+            </a:p>
+          </p:txBody>
+        </p:sp>
+        <p:sp>
+          <p:nvSpPr>
+            <p:cNvPr id="10" name="CasellaDiTesto 9">
+              <a:extLst>
+                <a:ext uri="{FF2B5EF4-FFF2-40B4-BE49-F238E27FC236}">
+                  <a16:creationId xmlns:a16="http://schemas.microsoft.com/office/drawing/2014/main" id="{609CA064-EA44-48C1-8696-9C7B3B2665C4}"/>
+                </a:ext>
+              </a:extLst>
+            </p:cNvPr>
+            <p:cNvSpPr txBox="1"/>
+            <p:nvPr/>
+          </p:nvSpPr>
+          <p:spPr>
+            <a:xfrm>
+              <a:off x="5485130" y="3779520"/>
+              <a:ext cx="1221740" cy="307777"/>
+            </a:xfrm>
+            <a:prstGeom prst="rect">
+              <a:avLst/>
+            </a:prstGeom>
+            <a:solidFill>
+              <a:schemeClr val="bg1"/>
+            </a:solidFill>
+          </p:spPr>
+          <p:txBody>
+            <a:bodyPr wrap="square" rtlCol="0">
+              <a:spAutoFit/>
+            </a:bodyPr>
+            <a:lstStyle/>
+            <a:p>
+              <a:pPr algn="ctr"/>
+              <a:r>
+                <a:rPr lang="it-IT" sz="1400" b="1" dirty="0">
+                  <a:solidFill>
+                    <a:srgbClr val="FF0000"/>
+                  </a:solidFill>
+                  <a:latin typeface="Calibri" panose="020F0502020204030204" pitchFamily="34" charset="0"/>
+                  <a:cs typeface="Calibri" panose="020F0502020204030204" pitchFamily="34" charset="0"/>
+                </a:rPr>
+                <a:t>CONTROLLER</a:t>
+              </a:r>
+              <a:endParaRPr lang="it-IT" b="1" dirty="0">
                 <a:solidFill>
-                  <a:schemeClr val="accent6">
-                    <a:lumMod val="75000"/>
-                  </a:schemeClr>
+                  <a:srgbClr val="FF0000"/>
                 </a:solidFill>
-              </a:rPr>
-              <a:t>Possibili soluzioni del problema di ottimizzazione</a:t>
-            </a:r>
-          </a:p>
-        </p:txBody>
-      </p:sp>
-      <p:sp>
-        <p:nvSpPr>
-          <p:cNvPr id="6" name="CasellaDiTesto 5">
-            <a:extLst>
-              <a:ext uri="{FF2B5EF4-FFF2-40B4-BE49-F238E27FC236}">
-                <a16:creationId xmlns:a16="http://schemas.microsoft.com/office/drawing/2014/main" id="{4A8FF26F-D064-46DC-A177-33A5D4A349D7}"/>
-              </a:ext>
-            </a:extLst>
-          </p:cNvPr>
-          <p:cNvSpPr txBox="1"/>
-          <p:nvPr/>
-        </p:nvSpPr>
-        <p:spPr>
-          <a:xfrm flipH="1">
-            <a:off x="5676900" y="4791075"/>
-            <a:ext cx="1621156" cy="646331"/>
-          </a:xfrm>
-          <a:prstGeom prst="rect">
-            <a:avLst/>
-          </a:prstGeom>
-          <a:noFill/>
-        </p:spPr>
-        <p:txBody>
-          <a:bodyPr wrap="square" rtlCol="0">
-            <a:spAutoFit/>
-          </a:bodyPr>
-          <a:lstStyle/>
-          <a:p>
-            <a:r>
-              <a:rPr lang="it-IT" dirty="0">
-                <a:solidFill>
-                  <a:schemeClr val="accent1"/>
-                </a:solidFill>
-              </a:rPr>
-              <a:t>SOLUZIONI OTTIME</a:t>
-            </a:r>
-          </a:p>
-        </p:txBody>
-      </p:sp>
-      <p:sp>
-        <p:nvSpPr>
-          <p:cNvPr id="7" name="CasellaDiTesto 6">
-            <a:extLst>
-              <a:ext uri="{FF2B5EF4-FFF2-40B4-BE49-F238E27FC236}">
-                <a16:creationId xmlns:a16="http://schemas.microsoft.com/office/drawing/2014/main" id="{B238268D-CBD3-4B31-AF60-7F0BF1B315C7}"/>
-              </a:ext>
-            </a:extLst>
-          </p:cNvPr>
-          <p:cNvSpPr txBox="1"/>
-          <p:nvPr/>
-        </p:nvSpPr>
-        <p:spPr>
-          <a:xfrm>
-            <a:off x="2538412" y="2600325"/>
-            <a:ext cx="2533650" cy="646331"/>
-          </a:xfrm>
-          <a:prstGeom prst="rect">
-            <a:avLst/>
-          </a:prstGeom>
-          <a:noFill/>
-        </p:spPr>
-        <p:txBody>
-          <a:bodyPr wrap="square" rtlCol="0">
-            <a:spAutoFit/>
-          </a:bodyPr>
-          <a:lstStyle/>
-          <a:p>
-            <a:r>
-              <a:rPr lang="it-IT" dirty="0">
-                <a:solidFill>
-                  <a:schemeClr val="accent2">
-                    <a:lumMod val="75000"/>
-                  </a:schemeClr>
-                </a:solidFill>
-              </a:rPr>
-              <a:t>Soluzioni al problema con </a:t>
-            </a:r>
-            <a:r>
-              <a:rPr lang="el-GR" dirty="0">
-                <a:solidFill>
-                  <a:schemeClr val="accent2">
-                    <a:lumMod val="75000"/>
-                  </a:schemeClr>
-                </a:solidFill>
-              </a:rPr>
-              <a:t>π</a:t>
-            </a:r>
-            <a:r>
-              <a:rPr lang="it-IT" baseline="-25000" dirty="0">
-                <a:solidFill>
-                  <a:schemeClr val="accent2">
-                    <a:lumMod val="75000"/>
-                  </a:schemeClr>
-                </a:solidFill>
-              </a:rPr>
-              <a:t>k</a:t>
-            </a:r>
-            <a:r>
-              <a:rPr lang="it-IT" dirty="0">
-                <a:solidFill>
-                  <a:schemeClr val="accent2">
-                    <a:lumMod val="75000"/>
-                  </a:schemeClr>
-                </a:solidFill>
-              </a:rPr>
-              <a:t> = N-1</a:t>
-            </a:r>
-          </a:p>
-        </p:txBody>
-      </p:sp>
+                <a:latin typeface="Calibri" panose="020F0502020204030204" pitchFamily="34" charset="0"/>
+                <a:cs typeface="Calibri" panose="020F0502020204030204" pitchFamily="34" charset="0"/>
+              </a:endParaRPr>
+            </a:p>
+          </p:txBody>
+        </p:sp>
+        <p:sp>
+          <p:nvSpPr>
+            <p:cNvPr id="12" name="Ovale 11">
+              <a:extLst>
+                <a:ext uri="{FF2B5EF4-FFF2-40B4-BE49-F238E27FC236}">
+                  <a16:creationId xmlns:a16="http://schemas.microsoft.com/office/drawing/2014/main" id="{DC026FB7-1B8D-4D18-9692-A8F2A97516D3}"/>
+                </a:ext>
+              </a:extLst>
+            </p:cNvPr>
+            <p:cNvSpPr/>
+            <p:nvPr/>
+          </p:nvSpPr>
+          <p:spPr>
+            <a:xfrm>
+              <a:off x="9926320" y="3952240"/>
+              <a:ext cx="660400" cy="389057"/>
+            </a:xfrm>
+            <a:prstGeom prst="ellipse">
+              <a:avLst/>
+            </a:prstGeom>
+            <a:noFill/>
+            <a:ln w="38100">
+              <a:solidFill>
+                <a:srgbClr val="FF0000"/>
+              </a:solidFill>
+            </a:ln>
+          </p:spPr>
+          <p:style>
+            <a:lnRef idx="2">
+              <a:schemeClr val="accent1">
+                <a:shade val="50000"/>
+              </a:schemeClr>
+            </a:lnRef>
+            <a:fillRef idx="1">
+              <a:schemeClr val="accent1"/>
+            </a:fillRef>
+            <a:effectRef idx="0">
+              <a:schemeClr val="accent1"/>
+            </a:effectRef>
+            <a:fontRef idx="minor">
+              <a:schemeClr val="lt1"/>
+            </a:fontRef>
+          </p:style>
+          <p:txBody>
+            <a:bodyPr rtlCol="0" anchor="ctr"/>
+            <a:lstStyle/>
+            <a:p>
+              <a:pPr algn="ctr"/>
+              <a:endParaRPr lang="it-IT"/>
+            </a:p>
+          </p:txBody>
+        </p:sp>
+      </p:grpSp>
     </p:spTree>
     <p:extLst>
       <p:ext uri="{BB962C8B-B14F-4D97-AF65-F5344CB8AC3E}">

</xml_diff>

<commit_message>
corretto cap3 e 4
</commit_message>
<xml_diff>
--- a/IMMAGINI/powerpointimmagini.pptx
+++ b/IMMAGINI/powerpointimmagini.pptx
@@ -13,6 +13,7 @@
     <p:sldId id="261" r:id="rId7"/>
     <p:sldId id="263" r:id="rId8"/>
     <p:sldId id="264" r:id="rId9"/>
+    <p:sldId id="265" r:id="rId10"/>
   </p:sldIdLst>
   <p:sldSz cx="12192000" cy="6858000"/>
   <p:notesSz cx="6858000" cy="9144000"/>
@@ -266,7 +267,7 @@
           <a:p>
             <a:fld id="{5BCC69EF-8925-47FB-9BAA-DDFE83E229BC}" type="datetimeFigureOut">
               <a:rPr lang="it-IT" smtClean="0"/>
-              <a:t>30/03/2019</a:t>
+              <a:t>31/03/2019</a:t>
             </a:fld>
             <a:endParaRPr lang="it-IT"/>
           </a:p>
@@ -464,7 +465,7 @@
           <a:p>
             <a:fld id="{5BCC69EF-8925-47FB-9BAA-DDFE83E229BC}" type="datetimeFigureOut">
               <a:rPr lang="it-IT" smtClean="0"/>
-              <a:t>30/03/2019</a:t>
+              <a:t>31/03/2019</a:t>
             </a:fld>
             <a:endParaRPr lang="it-IT"/>
           </a:p>
@@ -672,7 +673,7 @@
           <a:p>
             <a:fld id="{5BCC69EF-8925-47FB-9BAA-DDFE83E229BC}" type="datetimeFigureOut">
               <a:rPr lang="it-IT" smtClean="0"/>
-              <a:t>30/03/2019</a:t>
+              <a:t>31/03/2019</a:t>
             </a:fld>
             <a:endParaRPr lang="it-IT"/>
           </a:p>
@@ -870,7 +871,7 @@
           <a:p>
             <a:fld id="{5BCC69EF-8925-47FB-9BAA-DDFE83E229BC}" type="datetimeFigureOut">
               <a:rPr lang="it-IT" smtClean="0"/>
-              <a:t>30/03/2019</a:t>
+              <a:t>31/03/2019</a:t>
             </a:fld>
             <a:endParaRPr lang="it-IT"/>
           </a:p>
@@ -1145,7 +1146,7 @@
           <a:p>
             <a:fld id="{5BCC69EF-8925-47FB-9BAA-DDFE83E229BC}" type="datetimeFigureOut">
               <a:rPr lang="it-IT" smtClean="0"/>
-              <a:t>30/03/2019</a:t>
+              <a:t>31/03/2019</a:t>
             </a:fld>
             <a:endParaRPr lang="it-IT"/>
           </a:p>
@@ -1410,7 +1411,7 @@
           <a:p>
             <a:fld id="{5BCC69EF-8925-47FB-9BAA-DDFE83E229BC}" type="datetimeFigureOut">
               <a:rPr lang="it-IT" smtClean="0"/>
-              <a:t>30/03/2019</a:t>
+              <a:t>31/03/2019</a:t>
             </a:fld>
             <a:endParaRPr lang="it-IT"/>
           </a:p>
@@ -1822,7 +1823,7 @@
           <a:p>
             <a:fld id="{5BCC69EF-8925-47FB-9BAA-DDFE83E229BC}" type="datetimeFigureOut">
               <a:rPr lang="it-IT" smtClean="0"/>
-              <a:t>30/03/2019</a:t>
+              <a:t>31/03/2019</a:t>
             </a:fld>
             <a:endParaRPr lang="it-IT"/>
           </a:p>
@@ -1963,7 +1964,7 @@
           <a:p>
             <a:fld id="{5BCC69EF-8925-47FB-9BAA-DDFE83E229BC}" type="datetimeFigureOut">
               <a:rPr lang="it-IT" smtClean="0"/>
-              <a:t>30/03/2019</a:t>
+              <a:t>31/03/2019</a:t>
             </a:fld>
             <a:endParaRPr lang="it-IT"/>
           </a:p>
@@ -2076,7 +2077,7 @@
           <a:p>
             <a:fld id="{5BCC69EF-8925-47FB-9BAA-DDFE83E229BC}" type="datetimeFigureOut">
               <a:rPr lang="it-IT" smtClean="0"/>
-              <a:t>30/03/2019</a:t>
+              <a:t>31/03/2019</a:t>
             </a:fld>
             <a:endParaRPr lang="it-IT"/>
           </a:p>
@@ -2387,7 +2388,7 @@
           <a:p>
             <a:fld id="{5BCC69EF-8925-47FB-9BAA-DDFE83E229BC}" type="datetimeFigureOut">
               <a:rPr lang="it-IT" smtClean="0"/>
-              <a:t>30/03/2019</a:t>
+              <a:t>31/03/2019</a:t>
             </a:fld>
             <a:endParaRPr lang="it-IT"/>
           </a:p>
@@ -2675,7 +2676,7 @@
           <a:p>
             <a:fld id="{5BCC69EF-8925-47FB-9BAA-DDFE83E229BC}" type="datetimeFigureOut">
               <a:rPr lang="it-IT" smtClean="0"/>
-              <a:t>30/03/2019</a:t>
+              <a:t>31/03/2019</a:t>
             </a:fld>
             <a:endParaRPr lang="it-IT"/>
           </a:p>
@@ -2916,7 +2917,7 @@
           <a:p>
             <a:fld id="{5BCC69EF-8925-47FB-9BAA-DDFE83E229BC}" type="datetimeFigureOut">
               <a:rPr lang="it-IT" smtClean="0"/>
-              <a:t>30/03/2019</a:t>
+              <a:t>31/03/2019</a:t>
             </a:fld>
             <a:endParaRPr lang="it-IT"/>
           </a:p>
@@ -19816,8 +19817,8 @@
             </mc:Fallback>
           </mc:AlternateContent>
         </p:grpSp>
-        <mc:AlternateContent xmlns:mc="http://schemas.openxmlformats.org/markup-compatibility/2006">
-          <mc:Choice xmlns:a14="http://schemas.microsoft.com/office/drawing/2010/main" Requires="a14">
+        <mc:AlternateContent xmlns:mc="http://schemas.openxmlformats.org/markup-compatibility/2006" xmlns:a14="http://schemas.microsoft.com/office/drawing/2010/main">
+          <mc:Choice Requires="a14">
             <p:sp>
               <p:nvSpPr>
                 <p:cNvPr id="256" name="CasellaDiTesto 255">
@@ -19905,7 +19906,7 @@
               </p:txBody>
             </p:sp>
           </mc:Choice>
-          <mc:Fallback>
+          <mc:Fallback xmlns="">
             <p:sp>
               <p:nvSpPr>
                 <p:cNvPr id="256" name="CasellaDiTesto 255">
@@ -19953,8 +19954,8 @@
             </p:sp>
           </mc:Fallback>
         </mc:AlternateContent>
-        <mc:AlternateContent xmlns:mc="http://schemas.openxmlformats.org/markup-compatibility/2006">
-          <mc:Choice xmlns:a14="http://schemas.microsoft.com/office/drawing/2010/main" Requires="a14">
+        <mc:AlternateContent xmlns:mc="http://schemas.openxmlformats.org/markup-compatibility/2006" xmlns:a14="http://schemas.microsoft.com/office/drawing/2010/main">
+          <mc:Choice Requires="a14">
             <p:sp>
               <p:nvSpPr>
                 <p:cNvPr id="257" name="CasellaDiTesto 256">
@@ -20042,7 +20043,7 @@
               </p:txBody>
             </p:sp>
           </mc:Choice>
-          <mc:Fallback>
+          <mc:Fallback xmlns="">
             <p:sp>
               <p:nvSpPr>
                 <p:cNvPr id="257" name="CasellaDiTesto 256">
@@ -24161,6 +24162,655 @@
 </p:sld>
 </file>
 
+<file path=ppt/slides/slide9.xml><?xml version="1.0" encoding="utf-8"?>
+<p:sld xmlns:a="http://schemas.openxmlformats.org/drawingml/2006/main" xmlns:r="http://schemas.openxmlformats.org/officeDocument/2006/relationships" xmlns:p="http://schemas.openxmlformats.org/presentationml/2006/main">
+  <p:cSld>
+    <p:spTree>
+      <p:nvGrpSpPr>
+        <p:cNvPr id="1" name=""/>
+        <p:cNvGrpSpPr/>
+        <p:nvPr/>
+      </p:nvGrpSpPr>
+      <p:grpSpPr>
+        <a:xfrm>
+          <a:off x="0" y="0"/>
+          <a:ext cx="0" cy="0"/>
+          <a:chOff x="0" y="0"/>
+          <a:chExt cx="0" cy="0"/>
+        </a:xfrm>
+      </p:grpSpPr>
+      <p:grpSp>
+        <p:nvGrpSpPr>
+          <p:cNvPr id="9" name="Gruppo 8">
+            <a:extLst>
+              <a:ext uri="{FF2B5EF4-FFF2-40B4-BE49-F238E27FC236}">
+                <a16:creationId xmlns:a16="http://schemas.microsoft.com/office/drawing/2014/main" id="{EEFA1637-2C05-4310-BD48-7653A93EBD12}"/>
+              </a:ext>
+            </a:extLst>
+          </p:cNvPr>
+          <p:cNvGrpSpPr/>
+          <p:nvPr/>
+        </p:nvGrpSpPr>
+        <p:grpSpPr>
+          <a:xfrm>
+            <a:off x="326874" y="-416560"/>
+            <a:ext cx="11538251" cy="6858000"/>
+            <a:chOff x="326874" y="-162560"/>
+            <a:chExt cx="11538251" cy="6858000"/>
+          </a:xfrm>
+        </p:grpSpPr>
+        <p:pic>
+          <p:nvPicPr>
+            <p:cNvPr id="3" name="Immagine 2">
+              <a:extLst>
+                <a:ext uri="{FF2B5EF4-FFF2-40B4-BE49-F238E27FC236}">
+                  <a16:creationId xmlns:a16="http://schemas.microsoft.com/office/drawing/2014/main" id="{A90FAB71-DCE5-4067-BC58-63CEE05DB24B}"/>
+                </a:ext>
+              </a:extLst>
+            </p:cNvPr>
+            <p:cNvPicPr>
+              <a:picLocks noChangeAspect="1"/>
+            </p:cNvPicPr>
+            <p:nvPr/>
+          </p:nvPicPr>
+          <p:blipFill>
+            <a:blip r:embed="rId2">
+              <a:extLst>
+                <a:ext uri="{28A0092B-C50C-407E-A947-70E740481C1C}">
+                  <a14:useLocalDpi xmlns:a14="http://schemas.microsoft.com/office/drawing/2010/main" val="0"/>
+                </a:ext>
+              </a:extLst>
+            </a:blip>
+            <a:stretch>
+              <a:fillRect/>
+            </a:stretch>
+          </p:blipFill>
+          <p:spPr>
+            <a:xfrm>
+              <a:off x="326874" y="-162560"/>
+              <a:ext cx="11538251" cy="6858000"/>
+            </a:xfrm>
+            <a:prstGeom prst="rect">
+              <a:avLst/>
+            </a:prstGeom>
+          </p:spPr>
+        </p:pic>
+        <mc:AlternateContent xmlns:mc="http://schemas.openxmlformats.org/markup-compatibility/2006">
+          <mc:Choice xmlns:a14="http://schemas.microsoft.com/office/drawing/2010/main" Requires="a14">
+            <p:sp>
+              <p:nvSpPr>
+                <p:cNvPr id="4" name="CasellaDiTesto 3">
+                  <a:extLst>
+                    <a:ext uri="{FF2B5EF4-FFF2-40B4-BE49-F238E27FC236}">
+                      <a16:creationId xmlns:a16="http://schemas.microsoft.com/office/drawing/2014/main" id="{AC4BB6FD-2258-49DF-87D2-BD4367E459E9}"/>
+                    </a:ext>
+                  </a:extLst>
+                </p:cNvPr>
+                <p:cNvSpPr txBox="1"/>
+                <p:nvPr/>
+              </p:nvSpPr>
+              <p:spPr>
+                <a:xfrm>
+                  <a:off x="4072892" y="3865880"/>
+                  <a:ext cx="518158" cy="394210"/>
+                </a:xfrm>
+                <a:prstGeom prst="rect">
+                  <a:avLst/>
+                </a:prstGeom>
+                <a:solidFill>
+                  <a:schemeClr val="bg1"/>
+                </a:solidFill>
+              </p:spPr>
+              <p:txBody>
+                <a:bodyPr wrap="square" rtlCol="0">
+                  <a:spAutoFit/>
+                </a:bodyPr>
+                <a:lstStyle/>
+                <a:p>
+                  <a14:m>
+                    <m:oMathPara xmlns:m="http://schemas.openxmlformats.org/officeDocument/2006/math">
+                      <m:oMathParaPr>
+                        <m:jc m:val="centerGroup"/>
+                      </m:oMathParaPr>
+                      <m:oMath xmlns:m="http://schemas.openxmlformats.org/officeDocument/2006/math">
+                        <m:sSub>
+                          <m:sSubPr>
+                            <m:ctrlPr>
+                              <a:rPr lang="it-IT" b="0" i="1" smtClean="0">
+                                <a:latin typeface="Cambria Math" panose="02040503050406030204" pitchFamily="18" charset="0"/>
+                              </a:rPr>
+                            </m:ctrlPr>
+                          </m:sSubPr>
+                          <m:e>
+                            <m:r>
+                              <a:rPr lang="it-IT" b="0" i="1" smtClean="0">
+                                <a:latin typeface="Cambria Math" panose="02040503050406030204" pitchFamily="18" charset="0"/>
+                              </a:rPr>
+                              <m:t>𝑦</m:t>
+                            </m:r>
+                          </m:e>
+                          <m:sub>
+                            <m:r>
+                              <a:rPr lang="it-IT" b="0" i="1" smtClean="0">
+                                <a:latin typeface="Cambria Math" panose="02040503050406030204" pitchFamily="18" charset="0"/>
+                              </a:rPr>
+                              <m:t>𝑘</m:t>
+                            </m:r>
+                            <m:r>
+                              <a:rPr lang="it-IT" b="0" i="1" smtClean="0">
+                                <a:latin typeface="Cambria Math" panose="02040503050406030204" pitchFamily="18" charset="0"/>
+                              </a:rPr>
+                              <m:t>|0</m:t>
+                            </m:r>
+                          </m:sub>
+                        </m:sSub>
+                      </m:oMath>
+                    </m:oMathPara>
+                  </a14:m>
+                  <a:endParaRPr lang="it-IT" dirty="0"/>
+                </a:p>
+              </p:txBody>
+            </p:sp>
+          </mc:Choice>
+          <mc:Fallback>
+            <p:sp>
+              <p:nvSpPr>
+                <p:cNvPr id="4" name="CasellaDiTesto 3">
+                  <a:extLst>
+                    <a:ext uri="{FF2B5EF4-FFF2-40B4-BE49-F238E27FC236}">
+                      <a16:creationId xmlns:a16="http://schemas.microsoft.com/office/drawing/2014/main" id="{AC4BB6FD-2258-49DF-87D2-BD4367E459E9}"/>
+                    </a:ext>
+                  </a:extLst>
+                </p:cNvPr>
+                <p:cNvSpPr txBox="1">
+                  <a:spLocks noRot="1" noChangeAspect="1" noMove="1" noResize="1" noEditPoints="1" noAdjustHandles="1" noChangeArrowheads="1" noChangeShapeType="1" noTextEdit="1"/>
+                </p:cNvSpPr>
+                <p:nvPr/>
+              </p:nvSpPr>
+              <p:spPr>
+                <a:xfrm>
+                  <a:off x="4072892" y="3865880"/>
+                  <a:ext cx="518158" cy="394210"/>
+                </a:xfrm>
+                <a:prstGeom prst="rect">
+                  <a:avLst/>
+                </a:prstGeom>
+                <a:blipFill>
+                  <a:blip r:embed="rId3"/>
+                  <a:stretch>
+                    <a:fillRect r="-2353" b="-9375"/>
+                  </a:stretch>
+                </a:blipFill>
+              </p:spPr>
+              <p:txBody>
+                <a:bodyPr/>
+                <a:lstStyle/>
+                <a:p>
+                  <a:r>
+                    <a:rPr lang="it-IT">
+                      <a:noFill/>
+                    </a:rPr>
+                    <a:t> </a:t>
+                  </a:r>
+                </a:p>
+              </p:txBody>
+            </p:sp>
+          </mc:Fallback>
+        </mc:AlternateContent>
+        <mc:AlternateContent xmlns:mc="http://schemas.openxmlformats.org/markup-compatibility/2006">
+          <mc:Choice xmlns:a14="http://schemas.microsoft.com/office/drawing/2010/main" Requires="a14">
+            <p:sp>
+              <p:nvSpPr>
+                <p:cNvPr id="5" name="CasellaDiTesto 4">
+                  <a:extLst>
+                    <a:ext uri="{FF2B5EF4-FFF2-40B4-BE49-F238E27FC236}">
+                      <a16:creationId xmlns:a16="http://schemas.microsoft.com/office/drawing/2014/main" id="{2611D135-1FFF-4A07-B33B-8508533D4A0F}"/>
+                    </a:ext>
+                  </a:extLst>
+                </p:cNvPr>
+                <p:cNvSpPr txBox="1"/>
+                <p:nvPr/>
+              </p:nvSpPr>
+              <p:spPr>
+                <a:xfrm>
+                  <a:off x="4177667" y="100455"/>
+                  <a:ext cx="883920" cy="394210"/>
+                </a:xfrm>
+                <a:prstGeom prst="rect">
+                  <a:avLst/>
+                </a:prstGeom>
+                <a:solidFill>
+                  <a:schemeClr val="bg1"/>
+                </a:solidFill>
+              </p:spPr>
+              <p:txBody>
+                <a:bodyPr wrap="square" rtlCol="0">
+                  <a:spAutoFit/>
+                </a:bodyPr>
+                <a:lstStyle/>
+                <a:p>
+                  <a14:m>
+                    <m:oMathPara xmlns:m="http://schemas.openxmlformats.org/officeDocument/2006/math">
+                      <m:oMathParaPr>
+                        <m:jc m:val="centerGroup"/>
+                      </m:oMathParaPr>
+                      <m:oMath xmlns:m="http://schemas.openxmlformats.org/officeDocument/2006/math">
+                        <m:sSub>
+                          <m:sSubPr>
+                            <m:ctrlPr>
+                              <a:rPr lang="it-IT" b="0" i="1" smtClean="0">
+                                <a:latin typeface="Cambria Math" panose="02040503050406030204" pitchFamily="18" charset="0"/>
+                              </a:rPr>
+                            </m:ctrlPr>
+                          </m:sSubPr>
+                          <m:e>
+                            <m:r>
+                              <a:rPr lang="it-IT" b="0" i="1" smtClean="0">
+                                <a:latin typeface="Cambria Math" panose="02040503050406030204" pitchFamily="18" charset="0"/>
+                              </a:rPr>
+                              <m:t>𝑢</m:t>
+                            </m:r>
+                          </m:e>
+                          <m:sub>
+                            <m:r>
+                              <a:rPr lang="it-IT" b="0" i="1" smtClean="0">
+                                <a:latin typeface="Cambria Math" panose="02040503050406030204" pitchFamily="18" charset="0"/>
+                              </a:rPr>
+                              <m:t>𝑘</m:t>
+                            </m:r>
+                            <m:r>
+                              <a:rPr lang="it-IT" b="0" i="1" smtClean="0">
+                                <a:latin typeface="Cambria Math" panose="02040503050406030204" pitchFamily="18" charset="0"/>
+                              </a:rPr>
+                              <m:t>|0</m:t>
+                            </m:r>
+                          </m:sub>
+                        </m:sSub>
+                      </m:oMath>
+                    </m:oMathPara>
+                  </a14:m>
+                  <a:endParaRPr lang="it-IT" dirty="0"/>
+                </a:p>
+              </p:txBody>
+            </p:sp>
+          </mc:Choice>
+          <mc:Fallback>
+            <p:sp>
+              <p:nvSpPr>
+                <p:cNvPr id="5" name="CasellaDiTesto 4">
+                  <a:extLst>
+                    <a:ext uri="{FF2B5EF4-FFF2-40B4-BE49-F238E27FC236}">
+                      <a16:creationId xmlns:a16="http://schemas.microsoft.com/office/drawing/2014/main" id="{2611D135-1FFF-4A07-B33B-8508533D4A0F}"/>
+                    </a:ext>
+                  </a:extLst>
+                </p:cNvPr>
+                <p:cNvSpPr txBox="1">
+                  <a:spLocks noRot="1" noChangeAspect="1" noMove="1" noResize="1" noEditPoints="1" noAdjustHandles="1" noChangeArrowheads="1" noChangeShapeType="1" noTextEdit="1"/>
+                </p:cNvSpPr>
+                <p:nvPr/>
+              </p:nvSpPr>
+              <p:spPr>
+                <a:xfrm>
+                  <a:off x="4177667" y="100455"/>
+                  <a:ext cx="883920" cy="394210"/>
+                </a:xfrm>
+                <a:prstGeom prst="rect">
+                  <a:avLst/>
+                </a:prstGeom>
+                <a:blipFill>
+                  <a:blip r:embed="rId4"/>
+                  <a:stretch>
+                    <a:fillRect b="-10938"/>
+                  </a:stretch>
+                </a:blipFill>
+              </p:spPr>
+              <p:txBody>
+                <a:bodyPr/>
+                <a:lstStyle/>
+                <a:p>
+                  <a:r>
+                    <a:rPr lang="it-IT">
+                      <a:noFill/>
+                    </a:rPr>
+                    <a:t> </a:t>
+                  </a:r>
+                </a:p>
+              </p:txBody>
+            </p:sp>
+          </mc:Fallback>
+        </mc:AlternateContent>
+        <mc:AlternateContent xmlns:mc="http://schemas.openxmlformats.org/markup-compatibility/2006">
+          <mc:Choice xmlns:a14="http://schemas.microsoft.com/office/drawing/2010/main" Requires="a14">
+            <p:sp>
+              <p:nvSpPr>
+                <p:cNvPr id="6" name="CasellaDiTesto 5">
+                  <a:extLst>
+                    <a:ext uri="{FF2B5EF4-FFF2-40B4-BE49-F238E27FC236}">
+                      <a16:creationId xmlns:a16="http://schemas.microsoft.com/office/drawing/2014/main" id="{80AD1395-19D7-48FA-80E3-B228D72684F9}"/>
+                    </a:ext>
+                  </a:extLst>
+                </p:cNvPr>
+                <p:cNvSpPr txBox="1"/>
+                <p:nvPr/>
+              </p:nvSpPr>
+              <p:spPr>
+                <a:xfrm>
+                  <a:off x="6553200" y="704975"/>
+                  <a:ext cx="1087757" cy="394210"/>
+                </a:xfrm>
+                <a:prstGeom prst="rect">
+                  <a:avLst/>
+                </a:prstGeom>
+                <a:solidFill>
+                  <a:schemeClr val="bg1"/>
+                </a:solidFill>
+              </p:spPr>
+              <p:txBody>
+                <a:bodyPr wrap="square" rtlCol="0">
+                  <a:spAutoFit/>
+                </a:bodyPr>
+                <a:lstStyle/>
+                <a:p>
+                  <a14:m>
+                    <m:oMathPara xmlns:m="http://schemas.openxmlformats.org/officeDocument/2006/math">
+                      <m:oMathParaPr>
+                        <m:jc m:val="centerGroup"/>
+                      </m:oMathParaPr>
+                      <m:oMath xmlns:m="http://schemas.openxmlformats.org/officeDocument/2006/math">
+                        <m:sSub>
+                          <m:sSubPr>
+                            <m:ctrlPr>
+                              <a:rPr lang="it-IT" b="0" i="1" smtClean="0">
+                                <a:latin typeface="Cambria Math" panose="02040503050406030204" pitchFamily="18" charset="0"/>
+                              </a:rPr>
+                            </m:ctrlPr>
+                          </m:sSubPr>
+                          <m:e>
+                            <m:r>
+                              <a:rPr lang="it-IT" b="0" i="1" smtClean="0">
+                                <a:latin typeface="Cambria Math" panose="02040503050406030204" pitchFamily="18" charset="0"/>
+                              </a:rPr>
+                              <m:t>𝑢</m:t>
+                            </m:r>
+                          </m:e>
+                          <m:sub>
+                            <m:r>
+                              <a:rPr lang="it-IT" b="0" i="1" smtClean="0">
+                                <a:latin typeface="Cambria Math" panose="02040503050406030204" pitchFamily="18" charset="0"/>
+                              </a:rPr>
+                              <m:t>𝑘</m:t>
+                            </m:r>
+                            <m:r>
+                              <a:rPr lang="it-IT" b="0" i="1" smtClean="0">
+                                <a:latin typeface="Cambria Math" panose="02040503050406030204" pitchFamily="18" charset="0"/>
+                              </a:rPr>
+                              <m:t>|</m:t>
+                            </m:r>
+                            <m:r>
+                              <a:rPr lang="it-IT" b="0" i="1" smtClean="0">
+                                <a:latin typeface="Cambria Math" panose="02040503050406030204" pitchFamily="18" charset="0"/>
+                              </a:rPr>
+                              <m:t>𝑖</m:t>
+                            </m:r>
+                          </m:sub>
+                        </m:sSub>
+                      </m:oMath>
+                    </m:oMathPara>
+                  </a14:m>
+                  <a:endParaRPr lang="it-IT" dirty="0"/>
+                </a:p>
+              </p:txBody>
+            </p:sp>
+          </mc:Choice>
+          <mc:Fallback>
+            <p:sp>
+              <p:nvSpPr>
+                <p:cNvPr id="6" name="CasellaDiTesto 5">
+                  <a:extLst>
+                    <a:ext uri="{FF2B5EF4-FFF2-40B4-BE49-F238E27FC236}">
+                      <a16:creationId xmlns:a16="http://schemas.microsoft.com/office/drawing/2014/main" id="{80AD1395-19D7-48FA-80E3-B228D72684F9}"/>
+                    </a:ext>
+                  </a:extLst>
+                </p:cNvPr>
+                <p:cNvSpPr txBox="1">
+                  <a:spLocks noRot="1" noChangeAspect="1" noMove="1" noResize="1" noEditPoints="1" noAdjustHandles="1" noChangeArrowheads="1" noChangeShapeType="1" noTextEdit="1"/>
+                </p:cNvSpPr>
+                <p:nvPr/>
+              </p:nvSpPr>
+              <p:spPr>
+                <a:xfrm>
+                  <a:off x="6553200" y="704975"/>
+                  <a:ext cx="1087757" cy="394210"/>
+                </a:xfrm>
+                <a:prstGeom prst="rect">
+                  <a:avLst/>
+                </a:prstGeom>
+                <a:blipFill>
+                  <a:blip r:embed="rId5"/>
+                  <a:stretch>
+                    <a:fillRect b="-9231"/>
+                  </a:stretch>
+                </a:blipFill>
+              </p:spPr>
+              <p:txBody>
+                <a:bodyPr/>
+                <a:lstStyle/>
+                <a:p>
+                  <a:r>
+                    <a:rPr lang="it-IT">
+                      <a:noFill/>
+                    </a:rPr>
+                    <a:t> </a:t>
+                  </a:r>
+                </a:p>
+              </p:txBody>
+            </p:sp>
+          </mc:Fallback>
+        </mc:AlternateContent>
+        <mc:AlternateContent xmlns:mc="http://schemas.openxmlformats.org/markup-compatibility/2006">
+          <mc:Choice xmlns:a14="http://schemas.microsoft.com/office/drawing/2010/main" Requires="a14">
+            <p:sp>
+              <p:nvSpPr>
+                <p:cNvPr id="7" name="CasellaDiTesto 6">
+                  <a:extLst>
+                    <a:ext uri="{FF2B5EF4-FFF2-40B4-BE49-F238E27FC236}">
+                      <a16:creationId xmlns:a16="http://schemas.microsoft.com/office/drawing/2014/main" id="{4C54E582-9C5C-4901-B6F4-6276641B96C4}"/>
+                    </a:ext>
+                  </a:extLst>
+                </p:cNvPr>
+                <p:cNvSpPr txBox="1"/>
+                <p:nvPr/>
+              </p:nvSpPr>
+              <p:spPr>
+                <a:xfrm>
+                  <a:off x="6515100" y="1866515"/>
+                  <a:ext cx="883920" cy="394210"/>
+                </a:xfrm>
+                <a:prstGeom prst="rect">
+                  <a:avLst/>
+                </a:prstGeom>
+                <a:noFill/>
+              </p:spPr>
+              <p:txBody>
+                <a:bodyPr wrap="square" rtlCol="0">
+                  <a:spAutoFit/>
+                </a:bodyPr>
+                <a:lstStyle/>
+                <a:p>
+                  <a14:m>
+                    <m:oMathPara xmlns:m="http://schemas.openxmlformats.org/officeDocument/2006/math">
+                      <m:oMathParaPr>
+                        <m:jc m:val="centerGroup"/>
+                      </m:oMathParaPr>
+                      <m:oMath xmlns:m="http://schemas.openxmlformats.org/officeDocument/2006/math">
+                        <m:sSub>
+                          <m:sSubPr>
+                            <m:ctrlPr>
+                              <a:rPr lang="it-IT" b="0" i="1" smtClean="0">
+                                <a:latin typeface="Cambria Math" panose="02040503050406030204" pitchFamily="18" charset="0"/>
+                              </a:rPr>
+                            </m:ctrlPr>
+                          </m:sSubPr>
+                          <m:e>
+                            <m:acc>
+                              <m:accPr>
+                                <m:chr m:val="̂"/>
+                                <m:ctrlPr>
+                                  <a:rPr lang="it-IT" b="0" i="1" smtClean="0">
+                                    <a:latin typeface="Cambria Math" panose="02040503050406030204" pitchFamily="18" charset="0"/>
+                                  </a:rPr>
+                                </m:ctrlPr>
+                              </m:accPr>
+                              <m:e>
+                                <m:r>
+                                  <a:rPr lang="it-IT" b="0" i="1" smtClean="0">
+                                    <a:latin typeface="Cambria Math" panose="02040503050406030204" pitchFamily="18" charset="0"/>
+                                  </a:rPr>
+                                  <m:t>𝑦</m:t>
+                                </m:r>
+                              </m:e>
+                            </m:acc>
+                          </m:e>
+                          <m:sub>
+                            <m:r>
+                              <a:rPr lang="it-IT" b="0" i="1" smtClean="0">
+                                <a:latin typeface="Cambria Math" panose="02040503050406030204" pitchFamily="18" charset="0"/>
+                              </a:rPr>
+                              <m:t>𝑘</m:t>
+                            </m:r>
+                            <m:r>
+                              <a:rPr lang="it-IT" b="0" i="1" smtClean="0">
+                                <a:latin typeface="Cambria Math" panose="02040503050406030204" pitchFamily="18" charset="0"/>
+                              </a:rPr>
+                              <m:t>|</m:t>
+                            </m:r>
+                            <m:r>
+                              <a:rPr lang="it-IT" b="0" i="1" smtClean="0">
+                                <a:latin typeface="Cambria Math" panose="02040503050406030204" pitchFamily="18" charset="0"/>
+                              </a:rPr>
+                              <m:t>𝑖</m:t>
+                            </m:r>
+                          </m:sub>
+                        </m:sSub>
+                      </m:oMath>
+                    </m:oMathPara>
+                  </a14:m>
+                  <a:endParaRPr lang="it-IT" dirty="0"/>
+                </a:p>
+              </p:txBody>
+            </p:sp>
+          </mc:Choice>
+          <mc:Fallback>
+            <p:sp>
+              <p:nvSpPr>
+                <p:cNvPr id="7" name="CasellaDiTesto 6">
+                  <a:extLst>
+                    <a:ext uri="{FF2B5EF4-FFF2-40B4-BE49-F238E27FC236}">
+                      <a16:creationId xmlns:a16="http://schemas.microsoft.com/office/drawing/2014/main" id="{4C54E582-9C5C-4901-B6F4-6276641B96C4}"/>
+                    </a:ext>
+                  </a:extLst>
+                </p:cNvPr>
+                <p:cNvSpPr txBox="1">
+                  <a:spLocks noRot="1" noChangeAspect="1" noMove="1" noResize="1" noEditPoints="1" noAdjustHandles="1" noChangeArrowheads="1" noChangeShapeType="1" noTextEdit="1"/>
+                </p:cNvSpPr>
+                <p:nvPr/>
+              </p:nvSpPr>
+              <p:spPr>
+                <a:xfrm>
+                  <a:off x="6515100" y="1866515"/>
+                  <a:ext cx="883920" cy="394210"/>
+                </a:xfrm>
+                <a:prstGeom prst="rect">
+                  <a:avLst/>
+                </a:prstGeom>
+                <a:blipFill>
+                  <a:blip r:embed="rId6"/>
+                  <a:stretch>
+                    <a:fillRect t="-4688" b="-10938"/>
+                  </a:stretch>
+                </a:blipFill>
+              </p:spPr>
+              <p:txBody>
+                <a:bodyPr/>
+                <a:lstStyle/>
+                <a:p>
+                  <a:r>
+                    <a:rPr lang="it-IT">
+                      <a:noFill/>
+                    </a:rPr>
+                    <a:t> </a:t>
+                  </a:r>
+                </a:p>
+              </p:txBody>
+            </p:sp>
+          </mc:Fallback>
+        </mc:AlternateContent>
+        <p:sp>
+          <p:nvSpPr>
+            <p:cNvPr id="8" name="Rettangolo 7">
+              <a:extLst>
+                <a:ext uri="{FF2B5EF4-FFF2-40B4-BE49-F238E27FC236}">
+                  <a16:creationId xmlns:a16="http://schemas.microsoft.com/office/drawing/2014/main" id="{90C83203-620A-4458-8546-AAA4FF27BB26}"/>
+                </a:ext>
+              </a:extLst>
+            </p:cNvPr>
+            <p:cNvSpPr/>
+            <p:nvPr/>
+          </p:nvSpPr>
+          <p:spPr>
+            <a:xfrm>
+              <a:off x="6096000" y="3209925"/>
+              <a:ext cx="1087757" cy="394210"/>
+            </a:xfrm>
+            <a:prstGeom prst="rect">
+              <a:avLst/>
+            </a:prstGeom>
+            <a:solidFill>
+              <a:schemeClr val="bg1"/>
+            </a:solidFill>
+            <a:ln>
+              <a:noFill/>
+            </a:ln>
+          </p:spPr>
+          <p:style>
+            <a:lnRef idx="2">
+              <a:schemeClr val="accent1">
+                <a:shade val="50000"/>
+              </a:schemeClr>
+            </a:lnRef>
+            <a:fillRef idx="1">
+              <a:schemeClr val="accent1"/>
+            </a:fillRef>
+            <a:effectRef idx="0">
+              <a:schemeClr val="accent1"/>
+            </a:effectRef>
+            <a:fontRef idx="minor">
+              <a:schemeClr val="lt1"/>
+            </a:fontRef>
+          </p:style>
+          <p:txBody>
+            <a:bodyPr rtlCol="0" anchor="ctr"/>
+            <a:lstStyle/>
+            <a:p>
+              <a:pPr algn="ctr"/>
+              <a:endParaRPr lang="it-IT"/>
+            </a:p>
+          </p:txBody>
+        </p:sp>
+      </p:grpSp>
+    </p:spTree>
+    <p:extLst>
+      <p:ext uri="{BB962C8B-B14F-4D97-AF65-F5344CB8AC3E}">
+        <p14:creationId xmlns:p14="http://schemas.microsoft.com/office/powerpoint/2010/main" val="3927078557"/>
+      </p:ext>
+    </p:extLst>
+  </p:cSld>
+  <p:clrMapOvr>
+    <a:masterClrMapping/>
+  </p:clrMapOvr>
+</p:sld>
+</file>
+
 <file path=ppt/theme/theme1.xml><?xml version="1.0" encoding="utf-8"?>
 <a:theme xmlns:a="http://schemas.openxmlformats.org/drawingml/2006/main" name="Tema di Office">
   <a:themeElements>

</xml_diff>